<commit_message>
Re render fig 3 with updated schematic
</commit_message>
<xml_diff>
--- a/results/figures/1_Day_PEG_Schematic.pptx
+++ b/results/figures/1_Day_PEG_Schematic.pptx
@@ -2,7 +2,7 @@
 <file path=ppt/presentation.xml><?xml version="1.0" encoding="utf-8"?>
 <p:presentation xmlns:a="http://schemas.openxmlformats.org/drawingml/2006/main" xmlns:r="http://schemas.openxmlformats.org/officeDocument/2006/relationships" xmlns:p="http://schemas.openxmlformats.org/presentationml/2006/main" saveSubsetFonts="1">
   <p:sldMasterIdLst>
-    <p:sldMasterId id="2147483648" r:id="rId1"/>
+    <p:sldMasterId id="2147483756" r:id="rId1"/>
   </p:sldMasterIdLst>
   <p:notesMasterIdLst>
     <p:notesMasterId r:id="rId3"/>
@@ -10,13 +10,13 @@
   <p:sldIdLst>
     <p:sldId id="531" r:id="rId2"/>
   </p:sldIdLst>
-  <p:sldSz cx="12192000" cy="6858000"/>
+  <p:sldSz cx="6013450" cy="3108325"/>
   <p:notesSz cx="6858000" cy="9144000"/>
   <p:defaultTextStyle>
     <a:defPPr>
       <a:defRPr lang="en-US"/>
     </a:defPPr>
-    <a:lvl1pPr marL="0" algn="l" defTabSz="914400" rtl="0" eaLnBrk="1" latinLnBrk="0" hangingPunct="1">
+    <a:lvl1pPr marL="0" algn="l" defTabSz="457200" rtl="0" eaLnBrk="1" latinLnBrk="0" hangingPunct="1">
       <a:defRPr sz="1800" kern="1200">
         <a:solidFill>
           <a:schemeClr val="tx1"/>
@@ -26,7 +26,7 @@
         <a:cs typeface="+mn-cs"/>
       </a:defRPr>
     </a:lvl1pPr>
-    <a:lvl2pPr marL="457200" algn="l" defTabSz="914400" rtl="0" eaLnBrk="1" latinLnBrk="0" hangingPunct="1">
+    <a:lvl2pPr marL="457200" algn="l" defTabSz="457200" rtl="0" eaLnBrk="1" latinLnBrk="0" hangingPunct="1">
       <a:defRPr sz="1800" kern="1200">
         <a:solidFill>
           <a:schemeClr val="tx1"/>
@@ -36,7 +36,7 @@
         <a:cs typeface="+mn-cs"/>
       </a:defRPr>
     </a:lvl2pPr>
-    <a:lvl3pPr marL="914400" algn="l" defTabSz="914400" rtl="0" eaLnBrk="1" latinLnBrk="0" hangingPunct="1">
+    <a:lvl3pPr marL="914400" algn="l" defTabSz="457200" rtl="0" eaLnBrk="1" latinLnBrk="0" hangingPunct="1">
       <a:defRPr sz="1800" kern="1200">
         <a:solidFill>
           <a:schemeClr val="tx1"/>
@@ -46,7 +46,7 @@
         <a:cs typeface="+mn-cs"/>
       </a:defRPr>
     </a:lvl3pPr>
-    <a:lvl4pPr marL="1371600" algn="l" defTabSz="914400" rtl="0" eaLnBrk="1" latinLnBrk="0" hangingPunct="1">
+    <a:lvl4pPr marL="1371600" algn="l" defTabSz="457200" rtl="0" eaLnBrk="1" latinLnBrk="0" hangingPunct="1">
       <a:defRPr sz="1800" kern="1200">
         <a:solidFill>
           <a:schemeClr val="tx1"/>
@@ -56,7 +56,7 @@
         <a:cs typeface="+mn-cs"/>
       </a:defRPr>
     </a:lvl4pPr>
-    <a:lvl5pPr marL="1828800" algn="l" defTabSz="914400" rtl="0" eaLnBrk="1" latinLnBrk="0" hangingPunct="1">
+    <a:lvl5pPr marL="1828800" algn="l" defTabSz="457200" rtl="0" eaLnBrk="1" latinLnBrk="0" hangingPunct="1">
       <a:defRPr sz="1800" kern="1200">
         <a:solidFill>
           <a:schemeClr val="tx1"/>
@@ -66,7 +66,7 @@
         <a:cs typeface="+mn-cs"/>
       </a:defRPr>
     </a:lvl5pPr>
-    <a:lvl6pPr marL="2286000" algn="l" defTabSz="914400" rtl="0" eaLnBrk="1" latinLnBrk="0" hangingPunct="1">
+    <a:lvl6pPr marL="2286000" algn="l" defTabSz="457200" rtl="0" eaLnBrk="1" latinLnBrk="0" hangingPunct="1">
       <a:defRPr sz="1800" kern="1200">
         <a:solidFill>
           <a:schemeClr val="tx1"/>
@@ -76,7 +76,7 @@
         <a:cs typeface="+mn-cs"/>
       </a:defRPr>
     </a:lvl6pPr>
-    <a:lvl7pPr marL="2743200" algn="l" defTabSz="914400" rtl="0" eaLnBrk="1" latinLnBrk="0" hangingPunct="1">
+    <a:lvl7pPr marL="2743200" algn="l" defTabSz="457200" rtl="0" eaLnBrk="1" latinLnBrk="0" hangingPunct="1">
       <a:defRPr sz="1800" kern="1200">
         <a:solidFill>
           <a:schemeClr val="tx1"/>
@@ -86,7 +86,7 @@
         <a:cs typeface="+mn-cs"/>
       </a:defRPr>
     </a:lvl7pPr>
-    <a:lvl8pPr marL="3200400" algn="l" defTabSz="914400" rtl="0" eaLnBrk="1" latinLnBrk="0" hangingPunct="1">
+    <a:lvl8pPr marL="3200400" algn="l" defTabSz="457200" rtl="0" eaLnBrk="1" latinLnBrk="0" hangingPunct="1">
       <a:defRPr sz="1800" kern="1200">
         <a:solidFill>
           <a:schemeClr val="tx1"/>
@@ -96,7 +96,7 @@
         <a:cs typeface="+mn-cs"/>
       </a:defRPr>
     </a:lvl8pPr>
-    <a:lvl9pPr marL="3657600" algn="l" defTabSz="914400" rtl="0" eaLnBrk="1" latinLnBrk="0" hangingPunct="1">
+    <a:lvl9pPr marL="3657600" algn="l" defTabSz="457200" rtl="0" eaLnBrk="1" latinLnBrk="0" hangingPunct="1">
       <a:defRPr sz="1800" kern="1200">
         <a:solidFill>
           <a:schemeClr val="tx1"/>
@@ -197,7 +197,7 @@
           <a:p>
             <a:fld id="{77734EDB-3B6B-CA48-BB41-C96E8374FD30}" type="datetimeFigureOut">
               <a:rPr lang="en-US" smtClean="0"/>
-              <a:t>2/20/21</a:t>
+              <a:t>3/2/21</a:t>
             </a:fld>
             <a:endParaRPr lang="en-US"/>
           </a:p>
@@ -215,8 +215,8 @@
         </p:nvSpPr>
         <p:spPr>
           <a:xfrm>
-            <a:off x="685800" y="1143000"/>
-            <a:ext cx="5486400" cy="3086100"/>
+            <a:off x="444500" y="1143000"/>
+            <a:ext cx="5969000" cy="3086100"/>
           </a:xfrm>
           <a:prstGeom prst="rect">
             <a:avLst/>
@@ -370,8 +370,8 @@
   </p:cSld>
   <p:clrMap bg1="lt1" tx1="dk1" bg2="lt2" tx2="dk2" accent1="accent1" accent2="accent2" accent3="accent3" accent4="accent4" accent5="accent5" accent6="accent6" hlink="hlink" folHlink="folHlink"/>
   <p:notesStyle>
-    <a:lvl1pPr marL="0" algn="l" defTabSz="914400" rtl="0" eaLnBrk="1" latinLnBrk="0" hangingPunct="1">
-      <a:defRPr sz="1200" kern="1200">
+    <a:lvl1pPr marL="0" algn="l" defTabSz="797618" rtl="0" eaLnBrk="1" latinLnBrk="0" hangingPunct="1">
+      <a:defRPr sz="1046" kern="1200">
         <a:solidFill>
           <a:schemeClr val="tx1"/>
         </a:solidFill>
@@ -380,8 +380,8 @@
         <a:cs typeface="+mn-cs"/>
       </a:defRPr>
     </a:lvl1pPr>
-    <a:lvl2pPr marL="457200" algn="l" defTabSz="914400" rtl="0" eaLnBrk="1" latinLnBrk="0" hangingPunct="1">
-      <a:defRPr sz="1200" kern="1200">
+    <a:lvl2pPr marL="398809" algn="l" defTabSz="797618" rtl="0" eaLnBrk="1" latinLnBrk="0" hangingPunct="1">
+      <a:defRPr sz="1046" kern="1200">
         <a:solidFill>
           <a:schemeClr val="tx1"/>
         </a:solidFill>
@@ -390,8 +390,8 @@
         <a:cs typeface="+mn-cs"/>
       </a:defRPr>
     </a:lvl2pPr>
-    <a:lvl3pPr marL="914400" algn="l" defTabSz="914400" rtl="0" eaLnBrk="1" latinLnBrk="0" hangingPunct="1">
-      <a:defRPr sz="1200" kern="1200">
+    <a:lvl3pPr marL="797618" algn="l" defTabSz="797618" rtl="0" eaLnBrk="1" latinLnBrk="0" hangingPunct="1">
+      <a:defRPr sz="1046" kern="1200">
         <a:solidFill>
           <a:schemeClr val="tx1"/>
         </a:solidFill>
@@ -400,8 +400,8 @@
         <a:cs typeface="+mn-cs"/>
       </a:defRPr>
     </a:lvl3pPr>
-    <a:lvl4pPr marL="1371600" algn="l" defTabSz="914400" rtl="0" eaLnBrk="1" latinLnBrk="0" hangingPunct="1">
-      <a:defRPr sz="1200" kern="1200">
+    <a:lvl4pPr marL="1196427" algn="l" defTabSz="797618" rtl="0" eaLnBrk="1" latinLnBrk="0" hangingPunct="1">
+      <a:defRPr sz="1046" kern="1200">
         <a:solidFill>
           <a:schemeClr val="tx1"/>
         </a:solidFill>
@@ -410,8 +410,8 @@
         <a:cs typeface="+mn-cs"/>
       </a:defRPr>
     </a:lvl4pPr>
-    <a:lvl5pPr marL="1828800" algn="l" defTabSz="914400" rtl="0" eaLnBrk="1" latinLnBrk="0" hangingPunct="1">
-      <a:defRPr sz="1200" kern="1200">
+    <a:lvl5pPr marL="1595235" algn="l" defTabSz="797618" rtl="0" eaLnBrk="1" latinLnBrk="0" hangingPunct="1">
+      <a:defRPr sz="1046" kern="1200">
         <a:solidFill>
           <a:schemeClr val="tx1"/>
         </a:solidFill>
@@ -420,8 +420,8 @@
         <a:cs typeface="+mn-cs"/>
       </a:defRPr>
     </a:lvl5pPr>
-    <a:lvl6pPr marL="2286000" algn="l" defTabSz="914400" rtl="0" eaLnBrk="1" latinLnBrk="0" hangingPunct="1">
-      <a:defRPr sz="1200" kern="1200">
+    <a:lvl6pPr marL="1994044" algn="l" defTabSz="797618" rtl="0" eaLnBrk="1" latinLnBrk="0" hangingPunct="1">
+      <a:defRPr sz="1046" kern="1200">
         <a:solidFill>
           <a:schemeClr val="tx1"/>
         </a:solidFill>
@@ -430,8 +430,8 @@
         <a:cs typeface="+mn-cs"/>
       </a:defRPr>
     </a:lvl6pPr>
-    <a:lvl7pPr marL="2743200" algn="l" defTabSz="914400" rtl="0" eaLnBrk="1" latinLnBrk="0" hangingPunct="1">
-      <a:defRPr sz="1200" kern="1200">
+    <a:lvl7pPr marL="2392854" algn="l" defTabSz="797618" rtl="0" eaLnBrk="1" latinLnBrk="0" hangingPunct="1">
+      <a:defRPr sz="1046" kern="1200">
         <a:solidFill>
           <a:schemeClr val="tx1"/>
         </a:solidFill>
@@ -440,8 +440,8 @@
         <a:cs typeface="+mn-cs"/>
       </a:defRPr>
     </a:lvl7pPr>
-    <a:lvl8pPr marL="3200400" algn="l" defTabSz="914400" rtl="0" eaLnBrk="1" latinLnBrk="0" hangingPunct="1">
-      <a:defRPr sz="1200" kern="1200">
+    <a:lvl8pPr marL="2791662" algn="l" defTabSz="797618" rtl="0" eaLnBrk="1" latinLnBrk="0" hangingPunct="1">
+      <a:defRPr sz="1046" kern="1200">
         <a:solidFill>
           <a:schemeClr val="tx1"/>
         </a:solidFill>
@@ -450,8 +450,8 @@
         <a:cs typeface="+mn-cs"/>
       </a:defRPr>
     </a:lvl8pPr>
-    <a:lvl9pPr marL="3657600" algn="l" defTabSz="914400" rtl="0" eaLnBrk="1" latinLnBrk="0" hangingPunct="1">
-      <a:defRPr sz="1200" kern="1200">
+    <a:lvl9pPr marL="3190471" algn="l" defTabSz="797618" rtl="0" eaLnBrk="1" latinLnBrk="0" hangingPunct="1">
+      <a:defRPr sz="1046" kern="1200">
         <a:solidFill>
           <a:schemeClr val="tx1"/>
         </a:solidFill>
@@ -493,8 +493,8 @@
         </p:nvSpPr>
         <p:spPr>
           <a:xfrm>
-            <a:off x="685800" y="1143000"/>
-            <a:ext cx="5486400" cy="3086100"/>
+            <a:off x="444500" y="1143000"/>
+            <a:ext cx="5969000" cy="3086100"/>
           </a:xfrm>
           <a:custGeom>
             <a:avLst/>
@@ -694,13 +694,7 @@
       </p:grpSpPr>
       <p:sp>
         <p:nvSpPr>
-          <p:cNvPr id="2" name="Title 1">
-            <a:extLst>
-              <a:ext uri="{FF2B5EF4-FFF2-40B4-BE49-F238E27FC236}">
-                <a16:creationId xmlns:a16="http://schemas.microsoft.com/office/drawing/2014/main" id="{60638E27-98E8-41B2-87AA-9862C197658B}"/>
-              </a:ext>
-            </a:extLst>
-          </p:cNvPr>
+          <p:cNvPr id="2" name="Title 1"/>
           <p:cNvSpPr>
             <a:spLocks noGrp="1"/>
           </p:cNvSpPr>
@@ -710,15 +704,15 @@
         </p:nvSpPr>
         <p:spPr>
           <a:xfrm>
-            <a:off x="1524000" y="1122363"/>
-            <a:ext cx="9144000" cy="2387600"/>
+            <a:off x="751681" y="508700"/>
+            <a:ext cx="4510088" cy="1082158"/>
           </a:xfrm>
         </p:spPr>
         <p:txBody>
           <a:bodyPr anchor="b"/>
           <a:lstStyle>
             <a:lvl1pPr algn="ctr">
-              <a:defRPr sz="6000"/>
+              <a:defRPr sz="2719"/>
             </a:lvl1pPr>
           </a:lstStyle>
           <a:p>
@@ -726,18 +720,13 @@
               <a:rPr lang="en-US"/>
               <a:t>Click to edit Master title style</a:t>
             </a:r>
-          </a:p>
-        </p:txBody>
-      </p:sp>
-      <p:sp>
-        <p:nvSpPr>
-          <p:cNvPr id="3" name="Subtitle 2">
-            <a:extLst>
-              <a:ext uri="{FF2B5EF4-FFF2-40B4-BE49-F238E27FC236}">
-                <a16:creationId xmlns:a16="http://schemas.microsoft.com/office/drawing/2014/main" id="{8DAF4E42-DD90-4B97-9A68-FA6C8FC247AC}"/>
-              </a:ext>
-            </a:extLst>
-          </p:cNvPr>
+            <a:endParaRPr lang="en-US" dirty="0"/>
+          </a:p>
+        </p:txBody>
+      </p:sp>
+      <p:sp>
+        <p:nvSpPr>
+          <p:cNvPr id="3" name="Subtitle 2"/>
           <p:cNvSpPr>
             <a:spLocks noGrp="1"/>
           </p:cNvSpPr>
@@ -747,8 +736,8 @@
         </p:nvSpPr>
         <p:spPr>
           <a:xfrm>
-            <a:off x="1524000" y="3602038"/>
-            <a:ext cx="9144000" cy="1655762"/>
+            <a:off x="751681" y="1632590"/>
+            <a:ext cx="4510088" cy="750459"/>
           </a:xfrm>
         </p:spPr>
         <p:txBody>
@@ -756,39 +745,39 @@
           <a:lstStyle>
             <a:lvl1pPr marL="0" indent="0" algn="ctr">
               <a:buNone/>
-              <a:defRPr sz="2400"/>
+              <a:defRPr sz="1088"/>
             </a:lvl1pPr>
-            <a:lvl2pPr marL="457200" indent="0" algn="ctr">
-              <a:buNone/>
-              <a:defRPr sz="2000"/>
+            <a:lvl2pPr marL="207203" indent="0" algn="ctr">
+              <a:buNone/>
+              <a:defRPr sz="906"/>
             </a:lvl2pPr>
-            <a:lvl3pPr marL="914400" indent="0" algn="ctr">
-              <a:buNone/>
-              <a:defRPr sz="1800"/>
+            <a:lvl3pPr marL="414406" indent="0" algn="ctr">
+              <a:buNone/>
+              <a:defRPr sz="816"/>
             </a:lvl3pPr>
-            <a:lvl4pPr marL="1371600" indent="0" algn="ctr">
-              <a:buNone/>
-              <a:defRPr sz="1600"/>
+            <a:lvl4pPr marL="621609" indent="0" algn="ctr">
+              <a:buNone/>
+              <a:defRPr sz="725"/>
             </a:lvl4pPr>
-            <a:lvl5pPr marL="1828800" indent="0" algn="ctr">
-              <a:buNone/>
-              <a:defRPr sz="1600"/>
+            <a:lvl5pPr marL="828812" indent="0" algn="ctr">
+              <a:buNone/>
+              <a:defRPr sz="725"/>
             </a:lvl5pPr>
-            <a:lvl6pPr marL="2286000" indent="0" algn="ctr">
-              <a:buNone/>
-              <a:defRPr sz="1600"/>
+            <a:lvl6pPr marL="1036015" indent="0" algn="ctr">
+              <a:buNone/>
+              <a:defRPr sz="725"/>
             </a:lvl6pPr>
-            <a:lvl7pPr marL="2743200" indent="0" algn="ctr">
-              <a:buNone/>
-              <a:defRPr sz="1600"/>
+            <a:lvl7pPr marL="1243218" indent="0" algn="ctr">
+              <a:buNone/>
+              <a:defRPr sz="725"/>
             </a:lvl7pPr>
-            <a:lvl8pPr marL="3200400" indent="0" algn="ctr">
-              <a:buNone/>
-              <a:defRPr sz="1600"/>
+            <a:lvl8pPr marL="1450421" indent="0" algn="ctr">
+              <a:buNone/>
+              <a:defRPr sz="725"/>
             </a:lvl8pPr>
-            <a:lvl9pPr marL="3657600" indent="0" algn="ctr">
-              <a:buNone/>
-              <a:defRPr sz="1600"/>
+            <a:lvl9pPr marL="1657624" indent="0" algn="ctr">
+              <a:buNone/>
+              <a:defRPr sz="725"/>
             </a:lvl9pPr>
           </a:lstStyle>
           <a:p>
@@ -796,18 +785,13 @@
               <a:rPr lang="en-US"/>
               <a:t>Click to edit Master subtitle style</a:t>
             </a:r>
-          </a:p>
-        </p:txBody>
-      </p:sp>
-      <p:sp>
-        <p:nvSpPr>
-          <p:cNvPr id="4" name="Date Placeholder 3">
-            <a:extLst>
-              <a:ext uri="{FF2B5EF4-FFF2-40B4-BE49-F238E27FC236}">
-                <a16:creationId xmlns:a16="http://schemas.microsoft.com/office/drawing/2014/main" id="{24933277-ED80-4E1D-B4BE-4235176BCAC9}"/>
-              </a:ext>
-            </a:extLst>
-          </p:cNvPr>
+            <a:endParaRPr lang="en-US" dirty="0"/>
+          </a:p>
+        </p:txBody>
+      </p:sp>
+      <p:sp>
+        <p:nvSpPr>
+          <p:cNvPr id="4" name="Date Placeholder 3"/>
           <p:cNvSpPr>
             <a:spLocks noGrp="1"/>
           </p:cNvSpPr>
@@ -822,7 +806,7 @@
           <a:p>
             <a:fld id="{30AF97BF-8750-4713-9C5B-3A2A8059BBA3}" type="datetimeFigureOut">
               <a:rPr lang="en-US" smtClean="0"/>
-              <a:t>2/20/21</a:t>
+              <a:t>3/2/21</a:t>
             </a:fld>
             <a:endParaRPr lang="en-US"/>
           </a:p>
@@ -830,13 +814,7 @@
       </p:sp>
       <p:sp>
         <p:nvSpPr>
-          <p:cNvPr id="5" name="Footer Placeholder 4">
-            <a:extLst>
-              <a:ext uri="{FF2B5EF4-FFF2-40B4-BE49-F238E27FC236}">
-                <a16:creationId xmlns:a16="http://schemas.microsoft.com/office/drawing/2014/main" id="{D20887E4-2843-4315-A088-F6D17C551E98}"/>
-              </a:ext>
-            </a:extLst>
-          </p:cNvPr>
+          <p:cNvPr id="5" name="Footer Placeholder 4"/>
           <p:cNvSpPr>
             <a:spLocks noGrp="1"/>
           </p:cNvSpPr>
@@ -855,13 +833,7 @@
       </p:sp>
       <p:sp>
         <p:nvSpPr>
-          <p:cNvPr id="6" name="Slide Number Placeholder 5">
-            <a:extLst>
-              <a:ext uri="{FF2B5EF4-FFF2-40B4-BE49-F238E27FC236}">
-                <a16:creationId xmlns:a16="http://schemas.microsoft.com/office/drawing/2014/main" id="{8794DCA3-4E24-476D-8E12-5E3BBD0F1006}"/>
-              </a:ext>
-            </a:extLst>
-          </p:cNvPr>
+          <p:cNvPr id="6" name="Slide Number Placeholder 5"/>
           <p:cNvSpPr>
             <a:spLocks noGrp="1"/>
           </p:cNvSpPr>
@@ -885,7 +857,7 @@
     </p:spTree>
     <p:extLst>
       <p:ext uri="{BB962C8B-B14F-4D97-AF65-F5344CB8AC3E}">
-        <p14:creationId xmlns:p14="http://schemas.microsoft.com/office/powerpoint/2010/main" val="1210729977"/>
+        <p14:creationId xmlns:p14="http://schemas.microsoft.com/office/powerpoint/2010/main" val="2642068462"/>
       </p:ext>
     </p:extLst>
   </p:cSld>
@@ -914,13 +886,7 @@
       </p:grpSpPr>
       <p:sp>
         <p:nvSpPr>
-          <p:cNvPr id="2" name="Title 1">
-            <a:extLst>
-              <a:ext uri="{FF2B5EF4-FFF2-40B4-BE49-F238E27FC236}">
-                <a16:creationId xmlns:a16="http://schemas.microsoft.com/office/drawing/2014/main" id="{8BC70DBE-40B5-42E8-A6DA-245657453AB5}"/>
-              </a:ext>
-            </a:extLst>
-          </p:cNvPr>
+          <p:cNvPr id="2" name="Title 1"/>
           <p:cNvSpPr>
             <a:spLocks noGrp="1"/>
           </p:cNvSpPr>
@@ -937,18 +903,13 @@
               <a:rPr lang="en-US"/>
               <a:t>Click to edit Master title style</a:t>
             </a:r>
-          </a:p>
-        </p:txBody>
-      </p:sp>
-      <p:sp>
-        <p:nvSpPr>
-          <p:cNvPr id="3" name="Vertical Text Placeholder 2">
-            <a:extLst>
-              <a:ext uri="{FF2B5EF4-FFF2-40B4-BE49-F238E27FC236}">
-                <a16:creationId xmlns:a16="http://schemas.microsoft.com/office/drawing/2014/main" id="{23551D32-8B50-468D-A992-6EA9DC8A945F}"/>
-              </a:ext>
-            </a:extLst>
-          </p:cNvPr>
+            <a:endParaRPr lang="en-US" dirty="0"/>
+          </a:p>
+        </p:txBody>
+      </p:sp>
+      <p:sp>
+        <p:nvSpPr>
+          <p:cNvPr id="3" name="Vertical Text Placeholder 2"/>
           <p:cNvSpPr>
             <a:spLocks noGrp="1"/>
           </p:cNvSpPr>
@@ -964,7 +925,7 @@
             <a:pPr lvl="0"/>
             <a:r>
               <a:rPr lang="en-US"/>
-              <a:t>Edit Master text styles</a:t>
+              <a:t>Click to edit Master text styles</a:t>
             </a:r>
           </a:p>
           <a:p>
@@ -994,18 +955,13 @@
               <a:rPr lang="en-US"/>
               <a:t>Fifth level</a:t>
             </a:r>
-          </a:p>
-        </p:txBody>
-      </p:sp>
-      <p:sp>
-        <p:nvSpPr>
-          <p:cNvPr id="4" name="Date Placeholder 3">
-            <a:extLst>
-              <a:ext uri="{FF2B5EF4-FFF2-40B4-BE49-F238E27FC236}">
-                <a16:creationId xmlns:a16="http://schemas.microsoft.com/office/drawing/2014/main" id="{EB787A92-4262-4209-BCB6-E2FC6AC7C20B}"/>
-              </a:ext>
-            </a:extLst>
-          </p:cNvPr>
+            <a:endParaRPr lang="en-US" dirty="0"/>
+          </a:p>
+        </p:txBody>
+      </p:sp>
+      <p:sp>
+        <p:nvSpPr>
+          <p:cNvPr id="4" name="Date Placeholder 3"/>
           <p:cNvSpPr>
             <a:spLocks noGrp="1"/>
           </p:cNvSpPr>
@@ -1020,7 +976,7 @@
           <a:p>
             <a:fld id="{30AF97BF-8750-4713-9C5B-3A2A8059BBA3}" type="datetimeFigureOut">
               <a:rPr lang="en-US" smtClean="0"/>
-              <a:t>2/20/21</a:t>
+              <a:t>3/2/21</a:t>
             </a:fld>
             <a:endParaRPr lang="en-US"/>
           </a:p>
@@ -1028,13 +984,7 @@
       </p:sp>
       <p:sp>
         <p:nvSpPr>
-          <p:cNvPr id="5" name="Footer Placeholder 4">
-            <a:extLst>
-              <a:ext uri="{FF2B5EF4-FFF2-40B4-BE49-F238E27FC236}">
-                <a16:creationId xmlns:a16="http://schemas.microsoft.com/office/drawing/2014/main" id="{9D57B071-4079-4663-8CB8-F3B7DDE4847F}"/>
-              </a:ext>
-            </a:extLst>
-          </p:cNvPr>
+          <p:cNvPr id="5" name="Footer Placeholder 4"/>
           <p:cNvSpPr>
             <a:spLocks noGrp="1"/>
           </p:cNvSpPr>
@@ -1053,13 +1003,7 @@
       </p:sp>
       <p:sp>
         <p:nvSpPr>
-          <p:cNvPr id="6" name="Slide Number Placeholder 5">
-            <a:extLst>
-              <a:ext uri="{FF2B5EF4-FFF2-40B4-BE49-F238E27FC236}">
-                <a16:creationId xmlns:a16="http://schemas.microsoft.com/office/drawing/2014/main" id="{C192D138-19B7-46F2-A6A8-2305DCAE8A54}"/>
-              </a:ext>
-            </a:extLst>
-          </p:cNvPr>
+          <p:cNvPr id="6" name="Slide Number Placeholder 5"/>
           <p:cNvSpPr>
             <a:spLocks noGrp="1"/>
           </p:cNvSpPr>
@@ -1083,7 +1027,7 @@
     </p:spTree>
     <p:extLst>
       <p:ext uri="{BB962C8B-B14F-4D97-AF65-F5344CB8AC3E}">
-        <p14:creationId xmlns:p14="http://schemas.microsoft.com/office/powerpoint/2010/main" val="2065413202"/>
+        <p14:creationId xmlns:p14="http://schemas.microsoft.com/office/powerpoint/2010/main" val="1413948889"/>
       </p:ext>
     </p:extLst>
   </p:cSld>
@@ -1112,13 +1056,7 @@
       </p:grpSpPr>
       <p:sp>
         <p:nvSpPr>
-          <p:cNvPr id="2" name="Vertical Title 1">
-            <a:extLst>
-              <a:ext uri="{FF2B5EF4-FFF2-40B4-BE49-F238E27FC236}">
-                <a16:creationId xmlns:a16="http://schemas.microsoft.com/office/drawing/2014/main" id="{DFC38887-1AB3-43D5-AD7A-34BB04C7A8D4}"/>
-              </a:ext>
-            </a:extLst>
-          </p:cNvPr>
+          <p:cNvPr id="2" name="Vertical Title 1"/>
           <p:cNvSpPr>
             <a:spLocks noGrp="1"/>
           </p:cNvSpPr>
@@ -1128,8 +1066,8 @@
         </p:nvSpPr>
         <p:spPr>
           <a:xfrm>
-            <a:off x="8724900" y="365125"/>
-            <a:ext cx="2628900" cy="5811838"/>
+            <a:off x="4303375" y="165489"/>
+            <a:ext cx="1296650" cy="2634162"/>
           </a:xfrm>
         </p:spPr>
         <p:txBody>
@@ -1140,18 +1078,13 @@
               <a:rPr lang="en-US"/>
               <a:t>Click to edit Master title style</a:t>
             </a:r>
-          </a:p>
-        </p:txBody>
-      </p:sp>
-      <p:sp>
-        <p:nvSpPr>
-          <p:cNvPr id="3" name="Vertical Text Placeholder 2">
-            <a:extLst>
-              <a:ext uri="{FF2B5EF4-FFF2-40B4-BE49-F238E27FC236}">
-                <a16:creationId xmlns:a16="http://schemas.microsoft.com/office/drawing/2014/main" id="{37725A74-A2F2-4EE5-9C72-3D8AD8445248}"/>
-              </a:ext>
-            </a:extLst>
-          </p:cNvPr>
+            <a:endParaRPr lang="en-US" dirty="0"/>
+          </a:p>
+        </p:txBody>
+      </p:sp>
+      <p:sp>
+        <p:nvSpPr>
+          <p:cNvPr id="3" name="Vertical Text Placeholder 2"/>
           <p:cNvSpPr>
             <a:spLocks noGrp="1"/>
           </p:cNvSpPr>
@@ -1161,8 +1094,8 @@
         </p:nvSpPr>
         <p:spPr>
           <a:xfrm>
-            <a:off x="838200" y="365125"/>
-            <a:ext cx="7734300" cy="5811838"/>
+            <a:off x="413425" y="165489"/>
+            <a:ext cx="3814782" cy="2634162"/>
           </a:xfrm>
         </p:spPr>
         <p:txBody>
@@ -1172,7 +1105,7 @@
             <a:pPr lvl="0"/>
             <a:r>
               <a:rPr lang="en-US"/>
-              <a:t>Edit Master text styles</a:t>
+              <a:t>Click to edit Master text styles</a:t>
             </a:r>
           </a:p>
           <a:p>
@@ -1202,18 +1135,13 @@
               <a:rPr lang="en-US"/>
               <a:t>Fifth level</a:t>
             </a:r>
-          </a:p>
-        </p:txBody>
-      </p:sp>
-      <p:sp>
-        <p:nvSpPr>
-          <p:cNvPr id="4" name="Date Placeholder 3">
-            <a:extLst>
-              <a:ext uri="{FF2B5EF4-FFF2-40B4-BE49-F238E27FC236}">
-                <a16:creationId xmlns:a16="http://schemas.microsoft.com/office/drawing/2014/main" id="{53B2DA09-5575-4833-9611-8DE53F90C8E8}"/>
-              </a:ext>
-            </a:extLst>
-          </p:cNvPr>
+            <a:endParaRPr lang="en-US" dirty="0"/>
+          </a:p>
+        </p:txBody>
+      </p:sp>
+      <p:sp>
+        <p:nvSpPr>
+          <p:cNvPr id="4" name="Date Placeholder 3"/>
           <p:cNvSpPr>
             <a:spLocks noGrp="1"/>
           </p:cNvSpPr>
@@ -1228,7 +1156,7 @@
           <a:p>
             <a:fld id="{30AF97BF-8750-4713-9C5B-3A2A8059BBA3}" type="datetimeFigureOut">
               <a:rPr lang="en-US" smtClean="0"/>
-              <a:t>2/20/21</a:t>
+              <a:t>3/2/21</a:t>
             </a:fld>
             <a:endParaRPr lang="en-US"/>
           </a:p>
@@ -1236,13 +1164,7 @@
       </p:sp>
       <p:sp>
         <p:nvSpPr>
-          <p:cNvPr id="5" name="Footer Placeholder 4">
-            <a:extLst>
-              <a:ext uri="{FF2B5EF4-FFF2-40B4-BE49-F238E27FC236}">
-                <a16:creationId xmlns:a16="http://schemas.microsoft.com/office/drawing/2014/main" id="{8F3BDFE0-A51B-4570-8088-D981E79EFA6B}"/>
-              </a:ext>
-            </a:extLst>
-          </p:cNvPr>
+          <p:cNvPr id="5" name="Footer Placeholder 4"/>
           <p:cNvSpPr>
             <a:spLocks noGrp="1"/>
           </p:cNvSpPr>
@@ -1261,13 +1183,7 @@
       </p:sp>
       <p:sp>
         <p:nvSpPr>
-          <p:cNvPr id="6" name="Slide Number Placeholder 5">
-            <a:extLst>
-              <a:ext uri="{FF2B5EF4-FFF2-40B4-BE49-F238E27FC236}">
-                <a16:creationId xmlns:a16="http://schemas.microsoft.com/office/drawing/2014/main" id="{A92E0E12-698B-44E1-B42F-EB0CB2CCF548}"/>
-              </a:ext>
-            </a:extLst>
-          </p:cNvPr>
+          <p:cNvPr id="6" name="Slide Number Placeholder 5"/>
           <p:cNvSpPr>
             <a:spLocks noGrp="1"/>
           </p:cNvSpPr>
@@ -1291,7 +1207,7 @@
     </p:spTree>
     <p:extLst>
       <p:ext uri="{BB962C8B-B14F-4D97-AF65-F5344CB8AC3E}">
-        <p14:creationId xmlns:p14="http://schemas.microsoft.com/office/powerpoint/2010/main" val="1030824392"/>
+        <p14:creationId xmlns:p14="http://schemas.microsoft.com/office/powerpoint/2010/main" val="703648770"/>
       </p:ext>
     </p:extLst>
   </p:cSld>
@@ -1320,13 +1236,7 @@
       </p:grpSpPr>
       <p:sp>
         <p:nvSpPr>
-          <p:cNvPr id="2" name="Title 1">
-            <a:extLst>
-              <a:ext uri="{FF2B5EF4-FFF2-40B4-BE49-F238E27FC236}">
-                <a16:creationId xmlns:a16="http://schemas.microsoft.com/office/drawing/2014/main" id="{DFD5516F-1514-46C4-B063-84B6388E649B}"/>
-              </a:ext>
-            </a:extLst>
-          </p:cNvPr>
+          <p:cNvPr id="2" name="Title 1"/>
           <p:cNvSpPr>
             <a:spLocks noGrp="1"/>
           </p:cNvSpPr>
@@ -1343,18 +1253,13 @@
               <a:rPr lang="en-US"/>
               <a:t>Click to edit Master title style</a:t>
             </a:r>
-          </a:p>
-        </p:txBody>
-      </p:sp>
-      <p:sp>
-        <p:nvSpPr>
-          <p:cNvPr id="3" name="Content Placeholder 2">
-            <a:extLst>
-              <a:ext uri="{FF2B5EF4-FFF2-40B4-BE49-F238E27FC236}">
-                <a16:creationId xmlns:a16="http://schemas.microsoft.com/office/drawing/2014/main" id="{2587902F-F13A-4BBD-86EF-6DB354654848}"/>
-              </a:ext>
-            </a:extLst>
-          </p:cNvPr>
+            <a:endParaRPr lang="en-US" dirty="0"/>
+          </a:p>
+        </p:txBody>
+      </p:sp>
+      <p:sp>
+        <p:nvSpPr>
+          <p:cNvPr id="3" name="Content Placeholder 2"/>
           <p:cNvSpPr>
             <a:spLocks noGrp="1"/>
           </p:cNvSpPr>
@@ -1370,7 +1275,7 @@
             <a:pPr lvl="0"/>
             <a:r>
               <a:rPr lang="en-US"/>
-              <a:t>Edit Master text styles</a:t>
+              <a:t>Click to edit Master text styles</a:t>
             </a:r>
           </a:p>
           <a:p>
@@ -1400,18 +1305,13 @@
               <a:rPr lang="en-US"/>
               <a:t>Fifth level</a:t>
             </a:r>
-          </a:p>
-        </p:txBody>
-      </p:sp>
-      <p:sp>
-        <p:nvSpPr>
-          <p:cNvPr id="4" name="Date Placeholder 3">
-            <a:extLst>
-              <a:ext uri="{FF2B5EF4-FFF2-40B4-BE49-F238E27FC236}">
-                <a16:creationId xmlns:a16="http://schemas.microsoft.com/office/drawing/2014/main" id="{C173ED28-BCB2-470B-B320-0840A9DD5A64}"/>
-              </a:ext>
-            </a:extLst>
-          </p:cNvPr>
+            <a:endParaRPr lang="en-US" dirty="0"/>
+          </a:p>
+        </p:txBody>
+      </p:sp>
+      <p:sp>
+        <p:nvSpPr>
+          <p:cNvPr id="4" name="Date Placeholder 3"/>
           <p:cNvSpPr>
             <a:spLocks noGrp="1"/>
           </p:cNvSpPr>
@@ -1426,7 +1326,7 @@
           <a:p>
             <a:fld id="{30AF97BF-8750-4713-9C5B-3A2A8059BBA3}" type="datetimeFigureOut">
               <a:rPr lang="en-US" smtClean="0"/>
-              <a:t>2/20/21</a:t>
+              <a:t>3/2/21</a:t>
             </a:fld>
             <a:endParaRPr lang="en-US"/>
           </a:p>
@@ -1434,13 +1334,7 @@
       </p:sp>
       <p:sp>
         <p:nvSpPr>
-          <p:cNvPr id="5" name="Footer Placeholder 4">
-            <a:extLst>
-              <a:ext uri="{FF2B5EF4-FFF2-40B4-BE49-F238E27FC236}">
-                <a16:creationId xmlns:a16="http://schemas.microsoft.com/office/drawing/2014/main" id="{98037B08-899C-4F94-8F2B-87238B2615E4}"/>
-              </a:ext>
-            </a:extLst>
-          </p:cNvPr>
+          <p:cNvPr id="5" name="Footer Placeholder 4"/>
           <p:cNvSpPr>
             <a:spLocks noGrp="1"/>
           </p:cNvSpPr>
@@ -1459,13 +1353,7 @@
       </p:sp>
       <p:sp>
         <p:nvSpPr>
-          <p:cNvPr id="6" name="Slide Number Placeholder 5">
-            <a:extLst>
-              <a:ext uri="{FF2B5EF4-FFF2-40B4-BE49-F238E27FC236}">
-                <a16:creationId xmlns:a16="http://schemas.microsoft.com/office/drawing/2014/main" id="{C0E77A08-3875-46F2-8F01-24D75EBF07AF}"/>
-              </a:ext>
-            </a:extLst>
-          </p:cNvPr>
+          <p:cNvPr id="6" name="Slide Number Placeholder 5"/>
           <p:cNvSpPr>
             <a:spLocks noGrp="1"/>
           </p:cNvSpPr>
@@ -1489,7 +1377,7 @@
     </p:spTree>
     <p:extLst>
       <p:ext uri="{BB962C8B-B14F-4D97-AF65-F5344CB8AC3E}">
-        <p14:creationId xmlns:p14="http://schemas.microsoft.com/office/powerpoint/2010/main" val="2871662520"/>
+        <p14:creationId xmlns:p14="http://schemas.microsoft.com/office/powerpoint/2010/main" val="474148414"/>
       </p:ext>
     </p:extLst>
   </p:cSld>
@@ -1518,13 +1406,7 @@
       </p:grpSpPr>
       <p:sp>
         <p:nvSpPr>
-          <p:cNvPr id="2" name="Title 1">
-            <a:extLst>
-              <a:ext uri="{FF2B5EF4-FFF2-40B4-BE49-F238E27FC236}">
-                <a16:creationId xmlns:a16="http://schemas.microsoft.com/office/drawing/2014/main" id="{14730CA9-4488-4692-B49E-6A8979BC3DA3}"/>
-              </a:ext>
-            </a:extLst>
-          </p:cNvPr>
+          <p:cNvPr id="2" name="Title 1"/>
           <p:cNvSpPr>
             <a:spLocks noGrp="1"/>
           </p:cNvSpPr>
@@ -1534,15 +1416,15 @@
         </p:nvSpPr>
         <p:spPr>
           <a:xfrm>
-            <a:off x="831850" y="1709738"/>
-            <a:ext cx="10515600" cy="2852737"/>
+            <a:off x="410292" y="774923"/>
+            <a:ext cx="5186601" cy="1292977"/>
           </a:xfrm>
         </p:spPr>
         <p:txBody>
           <a:bodyPr anchor="b"/>
           <a:lstStyle>
             <a:lvl1pPr>
-              <a:defRPr sz="6000"/>
+              <a:defRPr sz="2719"/>
             </a:lvl1pPr>
           </a:lstStyle>
           <a:p>
@@ -1550,18 +1432,13 @@
               <a:rPr lang="en-US"/>
               <a:t>Click to edit Master title style</a:t>
             </a:r>
-          </a:p>
-        </p:txBody>
-      </p:sp>
-      <p:sp>
-        <p:nvSpPr>
-          <p:cNvPr id="3" name="Text Placeholder 2">
-            <a:extLst>
-              <a:ext uri="{FF2B5EF4-FFF2-40B4-BE49-F238E27FC236}">
-                <a16:creationId xmlns:a16="http://schemas.microsoft.com/office/drawing/2014/main" id="{05285FAA-D7EA-4E75-8F8F-79712D1D4D9E}"/>
-              </a:ext>
-            </a:extLst>
-          </p:cNvPr>
+            <a:endParaRPr lang="en-US" dirty="0"/>
+          </a:p>
+        </p:txBody>
+      </p:sp>
+      <p:sp>
+        <p:nvSpPr>
+          <p:cNvPr id="3" name="Text Placeholder 2"/>
           <p:cNvSpPr>
             <a:spLocks noGrp="1"/>
           </p:cNvSpPr>
@@ -1571,8 +1448,8 @@
         </p:nvSpPr>
         <p:spPr>
           <a:xfrm>
-            <a:off x="831850" y="4589463"/>
-            <a:ext cx="10515600" cy="1500187"/>
+            <a:off x="410292" y="2080132"/>
+            <a:ext cx="5186601" cy="679946"/>
           </a:xfrm>
         </p:spPr>
         <p:txBody>
@@ -1580,7 +1457,7 @@
           <a:lstStyle>
             <a:lvl1pPr marL="0" indent="0">
               <a:buNone/>
-              <a:defRPr sz="2400">
+              <a:defRPr sz="1088">
                 <a:solidFill>
                   <a:schemeClr val="tx1">
                     <a:tint val="75000"/>
@@ -1588,9 +1465,9 @@
                 </a:solidFill>
               </a:defRPr>
             </a:lvl1pPr>
-            <a:lvl2pPr marL="457200" indent="0">
-              <a:buNone/>
-              <a:defRPr sz="2000">
+            <a:lvl2pPr marL="207203" indent="0">
+              <a:buNone/>
+              <a:defRPr sz="906">
                 <a:solidFill>
                   <a:schemeClr val="tx1">
                     <a:tint val="75000"/>
@@ -1598,9 +1475,9 @@
                 </a:solidFill>
               </a:defRPr>
             </a:lvl2pPr>
-            <a:lvl3pPr marL="914400" indent="0">
-              <a:buNone/>
-              <a:defRPr sz="1800">
+            <a:lvl3pPr marL="414406" indent="0">
+              <a:buNone/>
+              <a:defRPr sz="816">
                 <a:solidFill>
                   <a:schemeClr val="tx1">
                     <a:tint val="75000"/>
@@ -1608,9 +1485,9 @@
                 </a:solidFill>
               </a:defRPr>
             </a:lvl3pPr>
-            <a:lvl4pPr marL="1371600" indent="0">
-              <a:buNone/>
-              <a:defRPr sz="1600">
+            <a:lvl4pPr marL="621609" indent="0">
+              <a:buNone/>
+              <a:defRPr sz="725">
                 <a:solidFill>
                   <a:schemeClr val="tx1">
                     <a:tint val="75000"/>
@@ -1618,9 +1495,9 @@
                 </a:solidFill>
               </a:defRPr>
             </a:lvl4pPr>
-            <a:lvl5pPr marL="1828800" indent="0">
-              <a:buNone/>
-              <a:defRPr sz="1600">
+            <a:lvl5pPr marL="828812" indent="0">
+              <a:buNone/>
+              <a:defRPr sz="725">
                 <a:solidFill>
                   <a:schemeClr val="tx1">
                     <a:tint val="75000"/>
@@ -1628,9 +1505,9 @@
                 </a:solidFill>
               </a:defRPr>
             </a:lvl5pPr>
-            <a:lvl6pPr marL="2286000" indent="0">
-              <a:buNone/>
-              <a:defRPr sz="1600">
+            <a:lvl6pPr marL="1036015" indent="0">
+              <a:buNone/>
+              <a:defRPr sz="725">
                 <a:solidFill>
                   <a:schemeClr val="tx1">
                     <a:tint val="75000"/>
@@ -1638,9 +1515,9 @@
                 </a:solidFill>
               </a:defRPr>
             </a:lvl6pPr>
-            <a:lvl7pPr marL="2743200" indent="0">
-              <a:buNone/>
-              <a:defRPr sz="1600">
+            <a:lvl7pPr marL="1243218" indent="0">
+              <a:buNone/>
+              <a:defRPr sz="725">
                 <a:solidFill>
                   <a:schemeClr val="tx1">
                     <a:tint val="75000"/>
@@ -1648,9 +1525,9 @@
                 </a:solidFill>
               </a:defRPr>
             </a:lvl7pPr>
-            <a:lvl8pPr marL="3200400" indent="0">
-              <a:buNone/>
-              <a:defRPr sz="1600">
+            <a:lvl8pPr marL="1450421" indent="0">
+              <a:buNone/>
+              <a:defRPr sz="725">
                 <a:solidFill>
                   <a:schemeClr val="tx1">
                     <a:tint val="75000"/>
@@ -1658,9 +1535,9 @@
                 </a:solidFill>
               </a:defRPr>
             </a:lvl8pPr>
-            <a:lvl9pPr marL="3657600" indent="0">
-              <a:buNone/>
-              <a:defRPr sz="1600">
+            <a:lvl9pPr marL="1657624" indent="0">
+              <a:buNone/>
+              <a:defRPr sz="725">
                 <a:solidFill>
                   <a:schemeClr val="tx1">
                     <a:tint val="75000"/>
@@ -1673,20 +1550,14 @@
             <a:pPr lvl="0"/>
             <a:r>
               <a:rPr lang="en-US"/>
-              <a:t>Edit Master text styles</a:t>
-            </a:r>
-          </a:p>
-        </p:txBody>
-      </p:sp>
-      <p:sp>
-        <p:nvSpPr>
-          <p:cNvPr id="4" name="Date Placeholder 3">
-            <a:extLst>
-              <a:ext uri="{FF2B5EF4-FFF2-40B4-BE49-F238E27FC236}">
-                <a16:creationId xmlns:a16="http://schemas.microsoft.com/office/drawing/2014/main" id="{2302F34A-76B6-417B-BA4B-7517D85DEEDC}"/>
-              </a:ext>
-            </a:extLst>
-          </p:cNvPr>
+              <a:t>Click to edit Master text styles</a:t>
+            </a:r>
+          </a:p>
+        </p:txBody>
+      </p:sp>
+      <p:sp>
+        <p:nvSpPr>
+          <p:cNvPr id="4" name="Date Placeholder 3"/>
           <p:cNvSpPr>
             <a:spLocks noGrp="1"/>
           </p:cNvSpPr>
@@ -1701,7 +1572,7 @@
           <a:p>
             <a:fld id="{30AF97BF-8750-4713-9C5B-3A2A8059BBA3}" type="datetimeFigureOut">
               <a:rPr lang="en-US" smtClean="0"/>
-              <a:t>2/20/21</a:t>
+              <a:t>3/2/21</a:t>
             </a:fld>
             <a:endParaRPr lang="en-US"/>
           </a:p>
@@ -1709,13 +1580,7 @@
       </p:sp>
       <p:sp>
         <p:nvSpPr>
-          <p:cNvPr id="5" name="Footer Placeholder 4">
-            <a:extLst>
-              <a:ext uri="{FF2B5EF4-FFF2-40B4-BE49-F238E27FC236}">
-                <a16:creationId xmlns:a16="http://schemas.microsoft.com/office/drawing/2014/main" id="{914DF8CB-5B04-4273-89D7-423400FC81B8}"/>
-              </a:ext>
-            </a:extLst>
-          </p:cNvPr>
+          <p:cNvPr id="5" name="Footer Placeholder 4"/>
           <p:cNvSpPr>
             <a:spLocks noGrp="1"/>
           </p:cNvSpPr>
@@ -1734,13 +1599,7 @@
       </p:sp>
       <p:sp>
         <p:nvSpPr>
-          <p:cNvPr id="6" name="Slide Number Placeholder 5">
-            <a:extLst>
-              <a:ext uri="{FF2B5EF4-FFF2-40B4-BE49-F238E27FC236}">
-                <a16:creationId xmlns:a16="http://schemas.microsoft.com/office/drawing/2014/main" id="{883A64FF-3D45-407D-BC2B-2BD5908A4889}"/>
-              </a:ext>
-            </a:extLst>
-          </p:cNvPr>
+          <p:cNvPr id="6" name="Slide Number Placeholder 5"/>
           <p:cNvSpPr>
             <a:spLocks noGrp="1"/>
           </p:cNvSpPr>
@@ -1764,7 +1623,7 @@
     </p:spTree>
     <p:extLst>
       <p:ext uri="{BB962C8B-B14F-4D97-AF65-F5344CB8AC3E}">
-        <p14:creationId xmlns:p14="http://schemas.microsoft.com/office/powerpoint/2010/main" val="3243085605"/>
+        <p14:creationId xmlns:p14="http://schemas.microsoft.com/office/powerpoint/2010/main" val="1094110445"/>
       </p:ext>
     </p:extLst>
   </p:cSld>
@@ -1793,13 +1652,7 @@
       </p:grpSpPr>
       <p:sp>
         <p:nvSpPr>
-          <p:cNvPr id="2" name="Title 1">
-            <a:extLst>
-              <a:ext uri="{FF2B5EF4-FFF2-40B4-BE49-F238E27FC236}">
-                <a16:creationId xmlns:a16="http://schemas.microsoft.com/office/drawing/2014/main" id="{AF62F211-5434-40C4-B24A-49C6E0C63DED}"/>
-              </a:ext>
-            </a:extLst>
-          </p:cNvPr>
+          <p:cNvPr id="2" name="Title 1"/>
           <p:cNvSpPr>
             <a:spLocks noGrp="1"/>
           </p:cNvSpPr>
@@ -1816,18 +1669,13 @@
               <a:rPr lang="en-US"/>
               <a:t>Click to edit Master title style</a:t>
             </a:r>
-          </a:p>
-        </p:txBody>
-      </p:sp>
-      <p:sp>
-        <p:nvSpPr>
-          <p:cNvPr id="3" name="Content Placeholder 2">
-            <a:extLst>
-              <a:ext uri="{FF2B5EF4-FFF2-40B4-BE49-F238E27FC236}">
-                <a16:creationId xmlns:a16="http://schemas.microsoft.com/office/drawing/2014/main" id="{F05AE7E0-BD50-4568-8C05-F295F6086FAF}"/>
-              </a:ext>
-            </a:extLst>
-          </p:cNvPr>
+            <a:endParaRPr lang="en-US" dirty="0"/>
+          </a:p>
+        </p:txBody>
+      </p:sp>
+      <p:sp>
+        <p:nvSpPr>
+          <p:cNvPr id="3" name="Content Placeholder 2"/>
           <p:cNvSpPr>
             <a:spLocks noGrp="1"/>
           </p:cNvSpPr>
@@ -1837,8 +1685,8 @@
         </p:nvSpPr>
         <p:spPr>
           <a:xfrm>
-            <a:off x="838200" y="1825625"/>
-            <a:ext cx="5181600" cy="4351338"/>
+            <a:off x="413425" y="827447"/>
+            <a:ext cx="2555716" cy="1972204"/>
           </a:xfrm>
         </p:spPr>
         <p:txBody>
@@ -1848,7 +1696,7 @@
             <a:pPr lvl="0"/>
             <a:r>
               <a:rPr lang="en-US"/>
-              <a:t>Edit Master text styles</a:t>
+              <a:t>Click to edit Master text styles</a:t>
             </a:r>
           </a:p>
           <a:p>
@@ -1878,18 +1726,13 @@
               <a:rPr lang="en-US"/>
               <a:t>Fifth level</a:t>
             </a:r>
-          </a:p>
-        </p:txBody>
-      </p:sp>
-      <p:sp>
-        <p:nvSpPr>
-          <p:cNvPr id="4" name="Content Placeholder 3">
-            <a:extLst>
-              <a:ext uri="{FF2B5EF4-FFF2-40B4-BE49-F238E27FC236}">
-                <a16:creationId xmlns:a16="http://schemas.microsoft.com/office/drawing/2014/main" id="{AB4DB87D-6647-41FA-8865-0C9F286EF9C6}"/>
-              </a:ext>
-            </a:extLst>
-          </p:cNvPr>
+            <a:endParaRPr lang="en-US" dirty="0"/>
+          </a:p>
+        </p:txBody>
+      </p:sp>
+      <p:sp>
+        <p:nvSpPr>
+          <p:cNvPr id="4" name="Content Placeholder 3"/>
           <p:cNvSpPr>
             <a:spLocks noGrp="1"/>
           </p:cNvSpPr>
@@ -1899,8 +1742,8 @@
         </p:nvSpPr>
         <p:spPr>
           <a:xfrm>
-            <a:off x="6172200" y="1825625"/>
-            <a:ext cx="5181600" cy="4351338"/>
+            <a:off x="3044309" y="827447"/>
+            <a:ext cx="2555716" cy="1972204"/>
           </a:xfrm>
         </p:spPr>
         <p:txBody>
@@ -1910,7 +1753,7 @@
             <a:pPr lvl="0"/>
             <a:r>
               <a:rPr lang="en-US"/>
-              <a:t>Edit Master text styles</a:t>
+              <a:t>Click to edit Master text styles</a:t>
             </a:r>
           </a:p>
           <a:p>
@@ -1940,18 +1783,13 @@
               <a:rPr lang="en-US"/>
               <a:t>Fifth level</a:t>
             </a:r>
-          </a:p>
-        </p:txBody>
-      </p:sp>
-      <p:sp>
-        <p:nvSpPr>
-          <p:cNvPr id="5" name="Date Placeholder 4">
-            <a:extLst>
-              <a:ext uri="{FF2B5EF4-FFF2-40B4-BE49-F238E27FC236}">
-                <a16:creationId xmlns:a16="http://schemas.microsoft.com/office/drawing/2014/main" id="{B9E8761B-9896-4990-AFFD-8D33B4AD3067}"/>
-              </a:ext>
-            </a:extLst>
-          </p:cNvPr>
+            <a:endParaRPr lang="en-US" dirty="0"/>
+          </a:p>
+        </p:txBody>
+      </p:sp>
+      <p:sp>
+        <p:nvSpPr>
+          <p:cNvPr id="5" name="Date Placeholder 4"/>
           <p:cNvSpPr>
             <a:spLocks noGrp="1"/>
           </p:cNvSpPr>
@@ -1966,7 +1804,7 @@
           <a:p>
             <a:fld id="{30AF97BF-8750-4713-9C5B-3A2A8059BBA3}" type="datetimeFigureOut">
               <a:rPr lang="en-US" smtClean="0"/>
-              <a:t>2/20/21</a:t>
+              <a:t>3/2/21</a:t>
             </a:fld>
             <a:endParaRPr lang="en-US"/>
           </a:p>
@@ -1974,13 +1812,7 @@
       </p:sp>
       <p:sp>
         <p:nvSpPr>
-          <p:cNvPr id="6" name="Footer Placeholder 5">
-            <a:extLst>
-              <a:ext uri="{FF2B5EF4-FFF2-40B4-BE49-F238E27FC236}">
-                <a16:creationId xmlns:a16="http://schemas.microsoft.com/office/drawing/2014/main" id="{ED9E6B7B-E2B4-4911-ACEC-10A6974A18FC}"/>
-              </a:ext>
-            </a:extLst>
-          </p:cNvPr>
+          <p:cNvPr id="6" name="Footer Placeholder 5"/>
           <p:cNvSpPr>
             <a:spLocks noGrp="1"/>
           </p:cNvSpPr>
@@ -1999,13 +1831,7 @@
       </p:sp>
       <p:sp>
         <p:nvSpPr>
-          <p:cNvPr id="7" name="Slide Number Placeholder 6">
-            <a:extLst>
-              <a:ext uri="{FF2B5EF4-FFF2-40B4-BE49-F238E27FC236}">
-                <a16:creationId xmlns:a16="http://schemas.microsoft.com/office/drawing/2014/main" id="{AF29C9A5-45CE-4F5C-A215-58F7DC5757D6}"/>
-              </a:ext>
-            </a:extLst>
-          </p:cNvPr>
+          <p:cNvPr id="7" name="Slide Number Placeholder 6"/>
           <p:cNvSpPr>
             <a:spLocks noGrp="1"/>
           </p:cNvSpPr>
@@ -2029,7 +1855,7 @@
     </p:spTree>
     <p:extLst>
       <p:ext uri="{BB962C8B-B14F-4D97-AF65-F5344CB8AC3E}">
-        <p14:creationId xmlns:p14="http://schemas.microsoft.com/office/powerpoint/2010/main" val="3752602213"/>
+        <p14:creationId xmlns:p14="http://schemas.microsoft.com/office/powerpoint/2010/main" val="67749645"/>
       </p:ext>
     </p:extLst>
   </p:cSld>
@@ -2058,13 +1884,7 @@
       </p:grpSpPr>
       <p:sp>
         <p:nvSpPr>
-          <p:cNvPr id="2" name="Title 1">
-            <a:extLst>
-              <a:ext uri="{FF2B5EF4-FFF2-40B4-BE49-F238E27FC236}">
-                <a16:creationId xmlns:a16="http://schemas.microsoft.com/office/drawing/2014/main" id="{6C0EDAA5-A20B-411A-BBC1-ECBF8FA9BE17}"/>
-              </a:ext>
-            </a:extLst>
-          </p:cNvPr>
+          <p:cNvPr id="2" name="Title 1"/>
           <p:cNvSpPr>
             <a:spLocks noGrp="1"/>
           </p:cNvSpPr>
@@ -2074,8 +1894,8 @@
         </p:nvSpPr>
         <p:spPr>
           <a:xfrm>
-            <a:off x="839788" y="365125"/>
-            <a:ext cx="10515600" cy="1325563"/>
+            <a:off x="414208" y="165490"/>
+            <a:ext cx="5186601" cy="600799"/>
           </a:xfrm>
         </p:spPr>
         <p:txBody>
@@ -2086,18 +1906,13 @@
               <a:rPr lang="en-US"/>
               <a:t>Click to edit Master title style</a:t>
             </a:r>
-          </a:p>
-        </p:txBody>
-      </p:sp>
-      <p:sp>
-        <p:nvSpPr>
-          <p:cNvPr id="3" name="Text Placeholder 2">
-            <a:extLst>
-              <a:ext uri="{FF2B5EF4-FFF2-40B4-BE49-F238E27FC236}">
-                <a16:creationId xmlns:a16="http://schemas.microsoft.com/office/drawing/2014/main" id="{5A9BF772-67E3-4DE8-95AB-F9281BFE375D}"/>
-              </a:ext>
-            </a:extLst>
-          </p:cNvPr>
+            <a:endParaRPr lang="en-US" dirty="0"/>
+          </a:p>
+        </p:txBody>
+      </p:sp>
+      <p:sp>
+        <p:nvSpPr>
+          <p:cNvPr id="3" name="Text Placeholder 2"/>
           <p:cNvSpPr>
             <a:spLocks noGrp="1"/>
           </p:cNvSpPr>
@@ -2107,8 +1922,8 @@
         </p:nvSpPr>
         <p:spPr>
           <a:xfrm>
-            <a:off x="839788" y="1681163"/>
-            <a:ext cx="5157787" cy="823912"/>
+            <a:off x="414208" y="761972"/>
+            <a:ext cx="2543971" cy="373430"/>
           </a:xfrm>
         </p:spPr>
         <p:txBody>
@@ -2116,59 +1931,53 @@
           <a:lstStyle>
             <a:lvl1pPr marL="0" indent="0">
               <a:buNone/>
-              <a:defRPr sz="2400" b="1"/>
+              <a:defRPr sz="1088" b="1"/>
             </a:lvl1pPr>
-            <a:lvl2pPr marL="457200" indent="0">
-              <a:buNone/>
-              <a:defRPr sz="2000" b="1"/>
+            <a:lvl2pPr marL="207203" indent="0">
+              <a:buNone/>
+              <a:defRPr sz="906" b="1"/>
             </a:lvl2pPr>
-            <a:lvl3pPr marL="914400" indent="0">
-              <a:buNone/>
-              <a:defRPr sz="1800" b="1"/>
+            <a:lvl3pPr marL="414406" indent="0">
+              <a:buNone/>
+              <a:defRPr sz="816" b="1"/>
             </a:lvl3pPr>
-            <a:lvl4pPr marL="1371600" indent="0">
-              <a:buNone/>
-              <a:defRPr sz="1600" b="1"/>
+            <a:lvl4pPr marL="621609" indent="0">
+              <a:buNone/>
+              <a:defRPr sz="725" b="1"/>
             </a:lvl4pPr>
-            <a:lvl5pPr marL="1828800" indent="0">
-              <a:buNone/>
-              <a:defRPr sz="1600" b="1"/>
+            <a:lvl5pPr marL="828812" indent="0">
+              <a:buNone/>
+              <a:defRPr sz="725" b="1"/>
             </a:lvl5pPr>
-            <a:lvl6pPr marL="2286000" indent="0">
-              <a:buNone/>
-              <a:defRPr sz="1600" b="1"/>
+            <a:lvl6pPr marL="1036015" indent="0">
+              <a:buNone/>
+              <a:defRPr sz="725" b="1"/>
             </a:lvl6pPr>
-            <a:lvl7pPr marL="2743200" indent="0">
-              <a:buNone/>
-              <a:defRPr sz="1600" b="1"/>
+            <a:lvl7pPr marL="1243218" indent="0">
+              <a:buNone/>
+              <a:defRPr sz="725" b="1"/>
             </a:lvl7pPr>
-            <a:lvl8pPr marL="3200400" indent="0">
-              <a:buNone/>
-              <a:defRPr sz="1600" b="1"/>
+            <a:lvl8pPr marL="1450421" indent="0">
+              <a:buNone/>
+              <a:defRPr sz="725" b="1"/>
             </a:lvl8pPr>
-            <a:lvl9pPr marL="3657600" indent="0">
-              <a:buNone/>
-              <a:defRPr sz="1600" b="1"/>
+            <a:lvl9pPr marL="1657624" indent="0">
+              <a:buNone/>
+              <a:defRPr sz="725" b="1"/>
             </a:lvl9pPr>
           </a:lstStyle>
           <a:p>
             <a:pPr lvl="0"/>
             <a:r>
               <a:rPr lang="en-US"/>
-              <a:t>Edit Master text styles</a:t>
-            </a:r>
-          </a:p>
-        </p:txBody>
-      </p:sp>
-      <p:sp>
-        <p:nvSpPr>
-          <p:cNvPr id="4" name="Content Placeholder 3">
-            <a:extLst>
-              <a:ext uri="{FF2B5EF4-FFF2-40B4-BE49-F238E27FC236}">
-                <a16:creationId xmlns:a16="http://schemas.microsoft.com/office/drawing/2014/main" id="{D2C9F96D-7F05-446E-AC29-00AE77E9F7D8}"/>
-              </a:ext>
-            </a:extLst>
-          </p:cNvPr>
+              <a:t>Click to edit Master text styles</a:t>
+            </a:r>
+          </a:p>
+        </p:txBody>
+      </p:sp>
+      <p:sp>
+        <p:nvSpPr>
+          <p:cNvPr id="4" name="Content Placeholder 3"/>
           <p:cNvSpPr>
             <a:spLocks noGrp="1"/>
           </p:cNvSpPr>
@@ -2178,8 +1987,8 @@
         </p:nvSpPr>
         <p:spPr>
           <a:xfrm>
-            <a:off x="839788" y="2505075"/>
-            <a:ext cx="5157787" cy="3684588"/>
+            <a:off x="414208" y="1135402"/>
+            <a:ext cx="2543971" cy="1670005"/>
           </a:xfrm>
         </p:spPr>
         <p:txBody>
@@ -2189,7 +1998,7 @@
             <a:pPr lvl="0"/>
             <a:r>
               <a:rPr lang="en-US"/>
-              <a:t>Edit Master text styles</a:t>
+              <a:t>Click to edit Master text styles</a:t>
             </a:r>
           </a:p>
           <a:p>
@@ -2219,18 +2028,13 @@
               <a:rPr lang="en-US"/>
               <a:t>Fifth level</a:t>
             </a:r>
-          </a:p>
-        </p:txBody>
-      </p:sp>
-      <p:sp>
-        <p:nvSpPr>
-          <p:cNvPr id="5" name="Text Placeholder 4">
-            <a:extLst>
-              <a:ext uri="{FF2B5EF4-FFF2-40B4-BE49-F238E27FC236}">
-                <a16:creationId xmlns:a16="http://schemas.microsoft.com/office/drawing/2014/main" id="{AC8E5881-2C75-4666-95E6-E9B30FED48DC}"/>
-              </a:ext>
-            </a:extLst>
-          </p:cNvPr>
+            <a:endParaRPr lang="en-US" dirty="0"/>
+          </a:p>
+        </p:txBody>
+      </p:sp>
+      <p:sp>
+        <p:nvSpPr>
+          <p:cNvPr id="5" name="Text Placeholder 4"/>
           <p:cNvSpPr>
             <a:spLocks noGrp="1"/>
           </p:cNvSpPr>
@@ -2240,8 +2044,8 @@
         </p:nvSpPr>
         <p:spPr>
           <a:xfrm>
-            <a:off x="6172200" y="1681163"/>
-            <a:ext cx="5183188" cy="823912"/>
+            <a:off x="3044309" y="761972"/>
+            <a:ext cx="2556499" cy="373430"/>
           </a:xfrm>
         </p:spPr>
         <p:txBody>
@@ -2249,59 +2053,53 @@
           <a:lstStyle>
             <a:lvl1pPr marL="0" indent="0">
               <a:buNone/>
-              <a:defRPr sz="2400" b="1"/>
+              <a:defRPr sz="1088" b="1"/>
             </a:lvl1pPr>
-            <a:lvl2pPr marL="457200" indent="0">
-              <a:buNone/>
-              <a:defRPr sz="2000" b="1"/>
+            <a:lvl2pPr marL="207203" indent="0">
+              <a:buNone/>
+              <a:defRPr sz="906" b="1"/>
             </a:lvl2pPr>
-            <a:lvl3pPr marL="914400" indent="0">
-              <a:buNone/>
-              <a:defRPr sz="1800" b="1"/>
+            <a:lvl3pPr marL="414406" indent="0">
+              <a:buNone/>
+              <a:defRPr sz="816" b="1"/>
             </a:lvl3pPr>
-            <a:lvl4pPr marL="1371600" indent="0">
-              <a:buNone/>
-              <a:defRPr sz="1600" b="1"/>
+            <a:lvl4pPr marL="621609" indent="0">
+              <a:buNone/>
+              <a:defRPr sz="725" b="1"/>
             </a:lvl4pPr>
-            <a:lvl5pPr marL="1828800" indent="0">
-              <a:buNone/>
-              <a:defRPr sz="1600" b="1"/>
+            <a:lvl5pPr marL="828812" indent="0">
+              <a:buNone/>
+              <a:defRPr sz="725" b="1"/>
             </a:lvl5pPr>
-            <a:lvl6pPr marL="2286000" indent="0">
-              <a:buNone/>
-              <a:defRPr sz="1600" b="1"/>
+            <a:lvl6pPr marL="1036015" indent="0">
+              <a:buNone/>
+              <a:defRPr sz="725" b="1"/>
             </a:lvl6pPr>
-            <a:lvl7pPr marL="2743200" indent="0">
-              <a:buNone/>
-              <a:defRPr sz="1600" b="1"/>
+            <a:lvl7pPr marL="1243218" indent="0">
+              <a:buNone/>
+              <a:defRPr sz="725" b="1"/>
             </a:lvl7pPr>
-            <a:lvl8pPr marL="3200400" indent="0">
-              <a:buNone/>
-              <a:defRPr sz="1600" b="1"/>
+            <a:lvl8pPr marL="1450421" indent="0">
+              <a:buNone/>
+              <a:defRPr sz="725" b="1"/>
             </a:lvl8pPr>
-            <a:lvl9pPr marL="3657600" indent="0">
-              <a:buNone/>
-              <a:defRPr sz="1600" b="1"/>
+            <a:lvl9pPr marL="1657624" indent="0">
+              <a:buNone/>
+              <a:defRPr sz="725" b="1"/>
             </a:lvl9pPr>
           </a:lstStyle>
           <a:p>
             <a:pPr lvl="0"/>
             <a:r>
               <a:rPr lang="en-US"/>
-              <a:t>Edit Master text styles</a:t>
-            </a:r>
-          </a:p>
-        </p:txBody>
-      </p:sp>
-      <p:sp>
-        <p:nvSpPr>
-          <p:cNvPr id="6" name="Content Placeholder 5">
-            <a:extLst>
-              <a:ext uri="{FF2B5EF4-FFF2-40B4-BE49-F238E27FC236}">
-                <a16:creationId xmlns:a16="http://schemas.microsoft.com/office/drawing/2014/main" id="{E5BEFEBD-0F78-445F-BD91-8B1AF11E50E8}"/>
-              </a:ext>
-            </a:extLst>
-          </p:cNvPr>
+              <a:t>Click to edit Master text styles</a:t>
+            </a:r>
+          </a:p>
+        </p:txBody>
+      </p:sp>
+      <p:sp>
+        <p:nvSpPr>
+          <p:cNvPr id="6" name="Content Placeholder 5"/>
           <p:cNvSpPr>
             <a:spLocks noGrp="1"/>
           </p:cNvSpPr>
@@ -2311,8 +2109,8 @@
         </p:nvSpPr>
         <p:spPr>
           <a:xfrm>
-            <a:off x="6172200" y="2505075"/>
-            <a:ext cx="5183188" cy="3684588"/>
+            <a:off x="3044309" y="1135402"/>
+            <a:ext cx="2556499" cy="1670005"/>
           </a:xfrm>
         </p:spPr>
         <p:txBody>
@@ -2322,7 +2120,7 @@
             <a:pPr lvl="0"/>
             <a:r>
               <a:rPr lang="en-US"/>
-              <a:t>Edit Master text styles</a:t>
+              <a:t>Click to edit Master text styles</a:t>
             </a:r>
           </a:p>
           <a:p>
@@ -2352,18 +2150,13 @@
               <a:rPr lang="en-US"/>
               <a:t>Fifth level</a:t>
             </a:r>
-          </a:p>
-        </p:txBody>
-      </p:sp>
-      <p:sp>
-        <p:nvSpPr>
-          <p:cNvPr id="7" name="Date Placeholder 6">
-            <a:extLst>
-              <a:ext uri="{FF2B5EF4-FFF2-40B4-BE49-F238E27FC236}">
-                <a16:creationId xmlns:a16="http://schemas.microsoft.com/office/drawing/2014/main" id="{389FEAFA-DEB6-4601-B4F4-8D105E9C5E77}"/>
-              </a:ext>
-            </a:extLst>
-          </p:cNvPr>
+            <a:endParaRPr lang="en-US" dirty="0"/>
+          </a:p>
+        </p:txBody>
+      </p:sp>
+      <p:sp>
+        <p:nvSpPr>
+          <p:cNvPr id="7" name="Date Placeholder 6"/>
           <p:cNvSpPr>
             <a:spLocks noGrp="1"/>
           </p:cNvSpPr>
@@ -2378,7 +2171,7 @@
           <a:p>
             <a:fld id="{30AF97BF-8750-4713-9C5B-3A2A8059BBA3}" type="datetimeFigureOut">
               <a:rPr lang="en-US" smtClean="0"/>
-              <a:t>2/20/21</a:t>
+              <a:t>3/2/21</a:t>
             </a:fld>
             <a:endParaRPr lang="en-US"/>
           </a:p>
@@ -2386,13 +2179,7 @@
       </p:sp>
       <p:sp>
         <p:nvSpPr>
-          <p:cNvPr id="8" name="Footer Placeholder 7">
-            <a:extLst>
-              <a:ext uri="{FF2B5EF4-FFF2-40B4-BE49-F238E27FC236}">
-                <a16:creationId xmlns:a16="http://schemas.microsoft.com/office/drawing/2014/main" id="{25F0724C-B033-426E-9251-CEC146B6830F}"/>
-              </a:ext>
-            </a:extLst>
-          </p:cNvPr>
+          <p:cNvPr id="8" name="Footer Placeholder 7"/>
           <p:cNvSpPr>
             <a:spLocks noGrp="1"/>
           </p:cNvSpPr>
@@ -2411,13 +2198,7 @@
       </p:sp>
       <p:sp>
         <p:nvSpPr>
-          <p:cNvPr id="9" name="Slide Number Placeholder 8">
-            <a:extLst>
-              <a:ext uri="{FF2B5EF4-FFF2-40B4-BE49-F238E27FC236}">
-                <a16:creationId xmlns:a16="http://schemas.microsoft.com/office/drawing/2014/main" id="{0AFBC85F-9C28-445C-A45F-4CC653DDE1DE}"/>
-              </a:ext>
-            </a:extLst>
-          </p:cNvPr>
+          <p:cNvPr id="9" name="Slide Number Placeholder 8"/>
           <p:cNvSpPr>
             <a:spLocks noGrp="1"/>
           </p:cNvSpPr>
@@ -2441,7 +2222,7 @@
     </p:spTree>
     <p:extLst>
       <p:ext uri="{BB962C8B-B14F-4D97-AF65-F5344CB8AC3E}">
-        <p14:creationId xmlns:p14="http://schemas.microsoft.com/office/powerpoint/2010/main" val="1450256080"/>
+        <p14:creationId xmlns:p14="http://schemas.microsoft.com/office/powerpoint/2010/main" val="1722345590"/>
       </p:ext>
     </p:extLst>
   </p:cSld>
@@ -2470,13 +2251,7 @@
       </p:grpSpPr>
       <p:sp>
         <p:nvSpPr>
-          <p:cNvPr id="2" name="Title 1">
-            <a:extLst>
-              <a:ext uri="{FF2B5EF4-FFF2-40B4-BE49-F238E27FC236}">
-                <a16:creationId xmlns:a16="http://schemas.microsoft.com/office/drawing/2014/main" id="{587F2D6C-F708-489B-9E7B-1E4D78EB1E99}"/>
-              </a:ext>
-            </a:extLst>
-          </p:cNvPr>
+          <p:cNvPr id="2" name="Title 1"/>
           <p:cNvSpPr>
             <a:spLocks noGrp="1"/>
           </p:cNvSpPr>
@@ -2493,18 +2268,13 @@
               <a:rPr lang="en-US"/>
               <a:t>Click to edit Master title style</a:t>
             </a:r>
-          </a:p>
-        </p:txBody>
-      </p:sp>
-      <p:sp>
-        <p:nvSpPr>
-          <p:cNvPr id="3" name="Date Placeholder 2">
-            <a:extLst>
-              <a:ext uri="{FF2B5EF4-FFF2-40B4-BE49-F238E27FC236}">
-                <a16:creationId xmlns:a16="http://schemas.microsoft.com/office/drawing/2014/main" id="{62321D53-98DE-4005-A993-640C017860D0}"/>
-              </a:ext>
-            </a:extLst>
-          </p:cNvPr>
+            <a:endParaRPr lang="en-US" dirty="0"/>
+          </a:p>
+        </p:txBody>
+      </p:sp>
+      <p:sp>
+        <p:nvSpPr>
+          <p:cNvPr id="3" name="Date Placeholder 2"/>
           <p:cNvSpPr>
             <a:spLocks noGrp="1"/>
           </p:cNvSpPr>
@@ -2519,7 +2289,7 @@
           <a:p>
             <a:fld id="{30AF97BF-8750-4713-9C5B-3A2A8059BBA3}" type="datetimeFigureOut">
               <a:rPr lang="en-US" smtClean="0"/>
-              <a:t>2/20/21</a:t>
+              <a:t>3/2/21</a:t>
             </a:fld>
             <a:endParaRPr lang="en-US"/>
           </a:p>
@@ -2527,13 +2297,7 @@
       </p:sp>
       <p:sp>
         <p:nvSpPr>
-          <p:cNvPr id="4" name="Footer Placeholder 3">
-            <a:extLst>
-              <a:ext uri="{FF2B5EF4-FFF2-40B4-BE49-F238E27FC236}">
-                <a16:creationId xmlns:a16="http://schemas.microsoft.com/office/drawing/2014/main" id="{1F924794-52F4-4CDD-90BA-02D442476028}"/>
-              </a:ext>
-            </a:extLst>
-          </p:cNvPr>
+          <p:cNvPr id="4" name="Footer Placeholder 3"/>
           <p:cNvSpPr>
             <a:spLocks noGrp="1"/>
           </p:cNvSpPr>
@@ -2552,13 +2316,7 @@
       </p:sp>
       <p:sp>
         <p:nvSpPr>
-          <p:cNvPr id="5" name="Slide Number Placeholder 4">
-            <a:extLst>
-              <a:ext uri="{FF2B5EF4-FFF2-40B4-BE49-F238E27FC236}">
-                <a16:creationId xmlns:a16="http://schemas.microsoft.com/office/drawing/2014/main" id="{5CECF6C0-A9E7-4377-9463-9DAD77C7888A}"/>
-              </a:ext>
-            </a:extLst>
-          </p:cNvPr>
+          <p:cNvPr id="5" name="Slide Number Placeholder 4"/>
           <p:cNvSpPr>
             <a:spLocks noGrp="1"/>
           </p:cNvSpPr>
@@ -2582,7 +2340,7 @@
     </p:spTree>
     <p:extLst>
       <p:ext uri="{BB962C8B-B14F-4D97-AF65-F5344CB8AC3E}">
-        <p14:creationId xmlns:p14="http://schemas.microsoft.com/office/powerpoint/2010/main" val="4280245638"/>
+        <p14:creationId xmlns:p14="http://schemas.microsoft.com/office/powerpoint/2010/main" val="3319466484"/>
       </p:ext>
     </p:extLst>
   </p:cSld>
@@ -2611,13 +2369,7 @@
       </p:grpSpPr>
       <p:sp>
         <p:nvSpPr>
-          <p:cNvPr id="2" name="Date Placeholder 1">
-            <a:extLst>
-              <a:ext uri="{FF2B5EF4-FFF2-40B4-BE49-F238E27FC236}">
-                <a16:creationId xmlns:a16="http://schemas.microsoft.com/office/drawing/2014/main" id="{71203C13-9E0D-4248-BFB5-1AE8A25437F7}"/>
-              </a:ext>
-            </a:extLst>
-          </p:cNvPr>
+          <p:cNvPr id="2" name="Date Placeholder 1"/>
           <p:cNvSpPr>
             <a:spLocks noGrp="1"/>
           </p:cNvSpPr>
@@ -2632,7 +2384,7 @@
           <a:p>
             <a:fld id="{30AF97BF-8750-4713-9C5B-3A2A8059BBA3}" type="datetimeFigureOut">
               <a:rPr lang="en-US" smtClean="0"/>
-              <a:t>2/20/21</a:t>
+              <a:t>3/2/21</a:t>
             </a:fld>
             <a:endParaRPr lang="en-US"/>
           </a:p>
@@ -2640,13 +2392,7 @@
       </p:sp>
       <p:sp>
         <p:nvSpPr>
-          <p:cNvPr id="3" name="Footer Placeholder 2">
-            <a:extLst>
-              <a:ext uri="{FF2B5EF4-FFF2-40B4-BE49-F238E27FC236}">
-                <a16:creationId xmlns:a16="http://schemas.microsoft.com/office/drawing/2014/main" id="{6D7F378A-FD20-433F-B045-C5CD8291E46E}"/>
-              </a:ext>
-            </a:extLst>
-          </p:cNvPr>
+          <p:cNvPr id="3" name="Footer Placeholder 2"/>
           <p:cNvSpPr>
             <a:spLocks noGrp="1"/>
           </p:cNvSpPr>
@@ -2665,13 +2411,7 @@
       </p:sp>
       <p:sp>
         <p:nvSpPr>
-          <p:cNvPr id="4" name="Slide Number Placeholder 3">
-            <a:extLst>
-              <a:ext uri="{FF2B5EF4-FFF2-40B4-BE49-F238E27FC236}">
-                <a16:creationId xmlns:a16="http://schemas.microsoft.com/office/drawing/2014/main" id="{2B7E87E6-905E-4B02-90B2-E805CAA2C586}"/>
-              </a:ext>
-            </a:extLst>
-          </p:cNvPr>
+          <p:cNvPr id="4" name="Slide Number Placeholder 3"/>
           <p:cNvSpPr>
             <a:spLocks noGrp="1"/>
           </p:cNvSpPr>
@@ -2695,7 +2435,7 @@
     </p:spTree>
     <p:extLst>
       <p:ext uri="{BB962C8B-B14F-4D97-AF65-F5344CB8AC3E}">
-        <p14:creationId xmlns:p14="http://schemas.microsoft.com/office/powerpoint/2010/main" val="2591889459"/>
+        <p14:creationId xmlns:p14="http://schemas.microsoft.com/office/powerpoint/2010/main" val="2958322375"/>
       </p:ext>
     </p:extLst>
   </p:cSld>
@@ -2724,13 +2464,7 @@
       </p:grpSpPr>
       <p:sp>
         <p:nvSpPr>
-          <p:cNvPr id="2" name="Title 1">
-            <a:extLst>
-              <a:ext uri="{FF2B5EF4-FFF2-40B4-BE49-F238E27FC236}">
-                <a16:creationId xmlns:a16="http://schemas.microsoft.com/office/drawing/2014/main" id="{09FCE806-1CA2-4365-9197-D0F2A96C52B5}"/>
-              </a:ext>
-            </a:extLst>
-          </p:cNvPr>
+          <p:cNvPr id="2" name="Title 1"/>
           <p:cNvSpPr>
             <a:spLocks noGrp="1"/>
           </p:cNvSpPr>
@@ -2740,15 +2474,15 @@
         </p:nvSpPr>
         <p:spPr>
           <a:xfrm>
-            <a:off x="839788" y="457200"/>
-            <a:ext cx="3932237" cy="1600200"/>
+            <a:off x="414208" y="207222"/>
+            <a:ext cx="1939494" cy="725276"/>
           </a:xfrm>
         </p:spPr>
         <p:txBody>
           <a:bodyPr anchor="b"/>
           <a:lstStyle>
             <a:lvl1pPr>
-              <a:defRPr sz="3200"/>
+              <a:defRPr sz="1450"/>
             </a:lvl1pPr>
           </a:lstStyle>
           <a:p>
@@ -2756,18 +2490,13 @@
               <a:rPr lang="en-US"/>
               <a:t>Click to edit Master title style</a:t>
             </a:r>
-          </a:p>
-        </p:txBody>
-      </p:sp>
-      <p:sp>
-        <p:nvSpPr>
-          <p:cNvPr id="3" name="Content Placeholder 2">
-            <a:extLst>
-              <a:ext uri="{FF2B5EF4-FFF2-40B4-BE49-F238E27FC236}">
-                <a16:creationId xmlns:a16="http://schemas.microsoft.com/office/drawing/2014/main" id="{938E9AD0-5D9A-457F-9127-A03A4B5D02D1}"/>
-              </a:ext>
-            </a:extLst>
-          </p:cNvPr>
+            <a:endParaRPr lang="en-US" dirty="0"/>
+          </a:p>
+        </p:txBody>
+      </p:sp>
+      <p:sp>
+        <p:nvSpPr>
+          <p:cNvPr id="3" name="Content Placeholder 2"/>
           <p:cNvSpPr>
             <a:spLocks noGrp="1"/>
           </p:cNvSpPr>
@@ -2777,46 +2506,46 @@
         </p:nvSpPr>
         <p:spPr>
           <a:xfrm>
-            <a:off x="5183188" y="987425"/>
-            <a:ext cx="6172200" cy="4873625"/>
+            <a:off x="2556500" y="447542"/>
+            <a:ext cx="3044309" cy="2208925"/>
           </a:xfrm>
         </p:spPr>
         <p:txBody>
           <a:bodyPr/>
           <a:lstStyle>
             <a:lvl1pPr>
-              <a:defRPr sz="3200"/>
+              <a:defRPr sz="1450"/>
             </a:lvl1pPr>
             <a:lvl2pPr>
-              <a:defRPr sz="2800"/>
+              <a:defRPr sz="1269"/>
             </a:lvl2pPr>
             <a:lvl3pPr>
-              <a:defRPr sz="2400"/>
+              <a:defRPr sz="1088"/>
             </a:lvl3pPr>
             <a:lvl4pPr>
-              <a:defRPr sz="2000"/>
+              <a:defRPr sz="906"/>
             </a:lvl4pPr>
             <a:lvl5pPr>
-              <a:defRPr sz="2000"/>
+              <a:defRPr sz="906"/>
             </a:lvl5pPr>
             <a:lvl6pPr>
-              <a:defRPr sz="2000"/>
+              <a:defRPr sz="906"/>
             </a:lvl6pPr>
             <a:lvl7pPr>
-              <a:defRPr sz="2000"/>
+              <a:defRPr sz="906"/>
             </a:lvl7pPr>
             <a:lvl8pPr>
-              <a:defRPr sz="2000"/>
+              <a:defRPr sz="906"/>
             </a:lvl8pPr>
             <a:lvl9pPr>
-              <a:defRPr sz="2000"/>
+              <a:defRPr sz="906"/>
             </a:lvl9pPr>
           </a:lstStyle>
           <a:p>
             <a:pPr lvl="0"/>
             <a:r>
               <a:rPr lang="en-US"/>
-              <a:t>Edit Master text styles</a:t>
+              <a:t>Click to edit Master text styles</a:t>
             </a:r>
           </a:p>
           <a:p>
@@ -2846,18 +2575,13 @@
               <a:rPr lang="en-US"/>
               <a:t>Fifth level</a:t>
             </a:r>
-          </a:p>
-        </p:txBody>
-      </p:sp>
-      <p:sp>
-        <p:nvSpPr>
-          <p:cNvPr id="4" name="Text Placeholder 3">
-            <a:extLst>
-              <a:ext uri="{FF2B5EF4-FFF2-40B4-BE49-F238E27FC236}">
-                <a16:creationId xmlns:a16="http://schemas.microsoft.com/office/drawing/2014/main" id="{D132CD51-0E07-49B1-AFA5-30F09D111B6C}"/>
-              </a:ext>
-            </a:extLst>
-          </p:cNvPr>
+            <a:endParaRPr lang="en-US" dirty="0"/>
+          </a:p>
+        </p:txBody>
+      </p:sp>
+      <p:sp>
+        <p:nvSpPr>
+          <p:cNvPr id="4" name="Text Placeholder 3"/>
           <p:cNvSpPr>
             <a:spLocks noGrp="1"/>
           </p:cNvSpPr>
@@ -2867,8 +2591,8 @@
         </p:nvSpPr>
         <p:spPr>
           <a:xfrm>
-            <a:off x="839788" y="2057400"/>
-            <a:ext cx="3932237" cy="3811588"/>
+            <a:off x="414208" y="932497"/>
+            <a:ext cx="1939494" cy="1727567"/>
           </a:xfrm>
         </p:spPr>
         <p:txBody>
@@ -2876,59 +2600,53 @@
           <a:lstStyle>
             <a:lvl1pPr marL="0" indent="0">
               <a:buNone/>
-              <a:defRPr sz="1600"/>
+              <a:defRPr sz="725"/>
             </a:lvl1pPr>
-            <a:lvl2pPr marL="457200" indent="0">
-              <a:buNone/>
-              <a:defRPr sz="1400"/>
+            <a:lvl2pPr marL="207203" indent="0">
+              <a:buNone/>
+              <a:defRPr sz="634"/>
             </a:lvl2pPr>
-            <a:lvl3pPr marL="914400" indent="0">
-              <a:buNone/>
-              <a:defRPr sz="1200"/>
+            <a:lvl3pPr marL="414406" indent="0">
+              <a:buNone/>
+              <a:defRPr sz="544"/>
             </a:lvl3pPr>
-            <a:lvl4pPr marL="1371600" indent="0">
-              <a:buNone/>
-              <a:defRPr sz="1000"/>
+            <a:lvl4pPr marL="621609" indent="0">
+              <a:buNone/>
+              <a:defRPr sz="453"/>
             </a:lvl4pPr>
-            <a:lvl5pPr marL="1828800" indent="0">
-              <a:buNone/>
-              <a:defRPr sz="1000"/>
+            <a:lvl5pPr marL="828812" indent="0">
+              <a:buNone/>
+              <a:defRPr sz="453"/>
             </a:lvl5pPr>
-            <a:lvl6pPr marL="2286000" indent="0">
-              <a:buNone/>
-              <a:defRPr sz="1000"/>
+            <a:lvl6pPr marL="1036015" indent="0">
+              <a:buNone/>
+              <a:defRPr sz="453"/>
             </a:lvl6pPr>
-            <a:lvl7pPr marL="2743200" indent="0">
-              <a:buNone/>
-              <a:defRPr sz="1000"/>
+            <a:lvl7pPr marL="1243218" indent="0">
+              <a:buNone/>
+              <a:defRPr sz="453"/>
             </a:lvl7pPr>
-            <a:lvl8pPr marL="3200400" indent="0">
-              <a:buNone/>
-              <a:defRPr sz="1000"/>
+            <a:lvl8pPr marL="1450421" indent="0">
+              <a:buNone/>
+              <a:defRPr sz="453"/>
             </a:lvl8pPr>
-            <a:lvl9pPr marL="3657600" indent="0">
-              <a:buNone/>
-              <a:defRPr sz="1000"/>
+            <a:lvl9pPr marL="1657624" indent="0">
+              <a:buNone/>
+              <a:defRPr sz="453"/>
             </a:lvl9pPr>
           </a:lstStyle>
           <a:p>
             <a:pPr lvl="0"/>
             <a:r>
               <a:rPr lang="en-US"/>
-              <a:t>Edit Master text styles</a:t>
-            </a:r>
-          </a:p>
-        </p:txBody>
-      </p:sp>
-      <p:sp>
-        <p:nvSpPr>
-          <p:cNvPr id="5" name="Date Placeholder 4">
-            <a:extLst>
-              <a:ext uri="{FF2B5EF4-FFF2-40B4-BE49-F238E27FC236}">
-                <a16:creationId xmlns:a16="http://schemas.microsoft.com/office/drawing/2014/main" id="{4F4A9D63-7EC4-4EF9-90D1-A924AEA79259}"/>
-              </a:ext>
-            </a:extLst>
-          </p:cNvPr>
+              <a:t>Click to edit Master text styles</a:t>
+            </a:r>
+          </a:p>
+        </p:txBody>
+      </p:sp>
+      <p:sp>
+        <p:nvSpPr>
+          <p:cNvPr id="5" name="Date Placeholder 4"/>
           <p:cNvSpPr>
             <a:spLocks noGrp="1"/>
           </p:cNvSpPr>
@@ -2943,7 +2661,7 @@
           <a:p>
             <a:fld id="{30AF97BF-8750-4713-9C5B-3A2A8059BBA3}" type="datetimeFigureOut">
               <a:rPr lang="en-US" smtClean="0"/>
-              <a:t>2/20/21</a:t>
+              <a:t>3/2/21</a:t>
             </a:fld>
             <a:endParaRPr lang="en-US"/>
           </a:p>
@@ -2951,13 +2669,7 @@
       </p:sp>
       <p:sp>
         <p:nvSpPr>
-          <p:cNvPr id="6" name="Footer Placeholder 5">
-            <a:extLst>
-              <a:ext uri="{FF2B5EF4-FFF2-40B4-BE49-F238E27FC236}">
-                <a16:creationId xmlns:a16="http://schemas.microsoft.com/office/drawing/2014/main" id="{629C8B3A-992D-4CD3-9B02-1851898FA13E}"/>
-              </a:ext>
-            </a:extLst>
-          </p:cNvPr>
+          <p:cNvPr id="6" name="Footer Placeholder 5"/>
           <p:cNvSpPr>
             <a:spLocks noGrp="1"/>
           </p:cNvSpPr>
@@ -2976,13 +2688,7 @@
       </p:sp>
       <p:sp>
         <p:nvSpPr>
-          <p:cNvPr id="7" name="Slide Number Placeholder 6">
-            <a:extLst>
-              <a:ext uri="{FF2B5EF4-FFF2-40B4-BE49-F238E27FC236}">
-                <a16:creationId xmlns:a16="http://schemas.microsoft.com/office/drawing/2014/main" id="{EF795ECA-BD6C-4E9D-B7DA-232CC318E2C4}"/>
-              </a:ext>
-            </a:extLst>
-          </p:cNvPr>
+          <p:cNvPr id="7" name="Slide Number Placeholder 6"/>
           <p:cNvSpPr>
             <a:spLocks noGrp="1"/>
           </p:cNvSpPr>
@@ -3006,7 +2712,7 @@
     </p:spTree>
     <p:extLst>
       <p:ext uri="{BB962C8B-B14F-4D97-AF65-F5344CB8AC3E}">
-        <p14:creationId xmlns:p14="http://schemas.microsoft.com/office/powerpoint/2010/main" val="4190890349"/>
+        <p14:creationId xmlns:p14="http://schemas.microsoft.com/office/powerpoint/2010/main" val="3061737404"/>
       </p:ext>
     </p:extLst>
   </p:cSld>
@@ -3035,13 +2741,7 @@
       </p:grpSpPr>
       <p:sp>
         <p:nvSpPr>
-          <p:cNvPr id="2" name="Title 1">
-            <a:extLst>
-              <a:ext uri="{FF2B5EF4-FFF2-40B4-BE49-F238E27FC236}">
-                <a16:creationId xmlns:a16="http://schemas.microsoft.com/office/drawing/2014/main" id="{DA428D1D-F094-4684-A8DC-18E64F3126A6}"/>
-              </a:ext>
-            </a:extLst>
-          </p:cNvPr>
+          <p:cNvPr id="2" name="Title 1"/>
           <p:cNvSpPr>
             <a:spLocks noGrp="1"/>
           </p:cNvSpPr>
@@ -3051,15 +2751,15 @@
         </p:nvSpPr>
         <p:spPr>
           <a:xfrm>
-            <a:off x="839788" y="457200"/>
-            <a:ext cx="3932237" cy="1600200"/>
+            <a:off x="414208" y="207222"/>
+            <a:ext cx="1939494" cy="725276"/>
           </a:xfrm>
         </p:spPr>
         <p:txBody>
           <a:bodyPr anchor="b"/>
           <a:lstStyle>
             <a:lvl1pPr>
-              <a:defRPr sz="3200"/>
+              <a:defRPr sz="1450"/>
             </a:lvl1pPr>
           </a:lstStyle>
           <a:p>
@@ -3067,20 +2767,15 @@
               <a:rPr lang="en-US"/>
               <a:t>Click to edit Master title style</a:t>
             </a:r>
-          </a:p>
-        </p:txBody>
-      </p:sp>
-      <p:sp>
-        <p:nvSpPr>
-          <p:cNvPr id="3" name="Picture Placeholder 2">
-            <a:extLst>
-              <a:ext uri="{FF2B5EF4-FFF2-40B4-BE49-F238E27FC236}">
-                <a16:creationId xmlns:a16="http://schemas.microsoft.com/office/drawing/2014/main" id="{CF19182D-D228-49BB-AAC5-33E76CB0ACFB}"/>
-              </a:ext>
-            </a:extLst>
-          </p:cNvPr>
-          <p:cNvSpPr>
-            <a:spLocks noGrp="1"/>
+            <a:endParaRPr lang="en-US" dirty="0"/>
+          </a:p>
+        </p:txBody>
+      </p:sp>
+      <p:sp>
+        <p:nvSpPr>
+          <p:cNvPr id="3" name="Picture Placeholder 2"/>
+          <p:cNvSpPr>
+            <a:spLocks noGrp="1" noChangeAspect="1"/>
           </p:cNvSpPr>
           <p:nvPr>
             <p:ph type="pic" idx="1"/>
@@ -3088,8 +2783,73 @@
         </p:nvSpPr>
         <p:spPr>
           <a:xfrm>
-            <a:off x="5183188" y="987425"/>
-            <a:ext cx="6172200" cy="4873625"/>
+            <a:off x="2556500" y="447542"/>
+            <a:ext cx="3044309" cy="2208925"/>
+          </a:xfrm>
+        </p:spPr>
+        <p:txBody>
+          <a:bodyPr anchor="t"/>
+          <a:lstStyle>
+            <a:lvl1pPr marL="0" indent="0">
+              <a:buNone/>
+              <a:defRPr sz="1450"/>
+            </a:lvl1pPr>
+            <a:lvl2pPr marL="207203" indent="0">
+              <a:buNone/>
+              <a:defRPr sz="1269"/>
+            </a:lvl2pPr>
+            <a:lvl3pPr marL="414406" indent="0">
+              <a:buNone/>
+              <a:defRPr sz="1088"/>
+            </a:lvl3pPr>
+            <a:lvl4pPr marL="621609" indent="0">
+              <a:buNone/>
+              <a:defRPr sz="906"/>
+            </a:lvl4pPr>
+            <a:lvl5pPr marL="828812" indent="0">
+              <a:buNone/>
+              <a:defRPr sz="906"/>
+            </a:lvl5pPr>
+            <a:lvl6pPr marL="1036015" indent="0">
+              <a:buNone/>
+              <a:defRPr sz="906"/>
+            </a:lvl6pPr>
+            <a:lvl7pPr marL="1243218" indent="0">
+              <a:buNone/>
+              <a:defRPr sz="906"/>
+            </a:lvl7pPr>
+            <a:lvl8pPr marL="1450421" indent="0">
+              <a:buNone/>
+              <a:defRPr sz="906"/>
+            </a:lvl8pPr>
+            <a:lvl9pPr marL="1657624" indent="0">
+              <a:buNone/>
+              <a:defRPr sz="906"/>
+            </a:lvl9pPr>
+          </a:lstStyle>
+          <a:p>
+            <a:r>
+              <a:rPr lang="en-US"/>
+              <a:t>Click icon to add picture</a:t>
+            </a:r>
+            <a:endParaRPr lang="en-US" dirty="0"/>
+          </a:p>
+        </p:txBody>
+      </p:sp>
+      <p:sp>
+        <p:nvSpPr>
+          <p:cNvPr id="4" name="Text Placeholder 3"/>
+          <p:cNvSpPr>
+            <a:spLocks noGrp="1"/>
+          </p:cNvSpPr>
+          <p:nvPr>
+            <p:ph type="body" sz="half" idx="2"/>
+          </p:nvPr>
+        </p:nvSpPr>
+        <p:spPr>
+          <a:xfrm>
+            <a:off x="414208" y="932497"/>
+            <a:ext cx="1939494" cy="1727567"/>
           </a:xfrm>
         </p:spPr>
         <p:txBody>
@@ -3097,126 +2857,53 @@
           <a:lstStyle>
             <a:lvl1pPr marL="0" indent="0">
               <a:buNone/>
-              <a:defRPr sz="3200"/>
+              <a:defRPr sz="725"/>
             </a:lvl1pPr>
-            <a:lvl2pPr marL="457200" indent="0">
-              <a:buNone/>
-              <a:defRPr sz="2800"/>
+            <a:lvl2pPr marL="207203" indent="0">
+              <a:buNone/>
+              <a:defRPr sz="634"/>
             </a:lvl2pPr>
-            <a:lvl3pPr marL="914400" indent="0">
-              <a:buNone/>
-              <a:defRPr sz="2400"/>
+            <a:lvl3pPr marL="414406" indent="0">
+              <a:buNone/>
+              <a:defRPr sz="544"/>
             </a:lvl3pPr>
-            <a:lvl4pPr marL="1371600" indent="0">
-              <a:buNone/>
-              <a:defRPr sz="2000"/>
+            <a:lvl4pPr marL="621609" indent="0">
+              <a:buNone/>
+              <a:defRPr sz="453"/>
             </a:lvl4pPr>
-            <a:lvl5pPr marL="1828800" indent="0">
-              <a:buNone/>
-              <a:defRPr sz="2000"/>
+            <a:lvl5pPr marL="828812" indent="0">
+              <a:buNone/>
+              <a:defRPr sz="453"/>
             </a:lvl5pPr>
-            <a:lvl6pPr marL="2286000" indent="0">
-              <a:buNone/>
-              <a:defRPr sz="2000"/>
+            <a:lvl6pPr marL="1036015" indent="0">
+              <a:buNone/>
+              <a:defRPr sz="453"/>
             </a:lvl6pPr>
-            <a:lvl7pPr marL="2743200" indent="0">
-              <a:buNone/>
-              <a:defRPr sz="2000"/>
+            <a:lvl7pPr marL="1243218" indent="0">
+              <a:buNone/>
+              <a:defRPr sz="453"/>
             </a:lvl7pPr>
-            <a:lvl8pPr marL="3200400" indent="0">
-              <a:buNone/>
-              <a:defRPr sz="2000"/>
+            <a:lvl8pPr marL="1450421" indent="0">
+              <a:buNone/>
+              <a:defRPr sz="453"/>
             </a:lvl8pPr>
-            <a:lvl9pPr marL="3657600" indent="0">
-              <a:buNone/>
-              <a:defRPr sz="2000"/>
+            <a:lvl9pPr marL="1657624" indent="0">
+              <a:buNone/>
+              <a:defRPr sz="453"/>
             </a:lvl9pPr>
           </a:lstStyle>
           <a:p>
-            <a:endParaRPr lang="en-US"/>
-          </a:p>
-        </p:txBody>
-      </p:sp>
-      <p:sp>
-        <p:nvSpPr>
-          <p:cNvPr id="4" name="Text Placeholder 3">
-            <a:extLst>
-              <a:ext uri="{FF2B5EF4-FFF2-40B4-BE49-F238E27FC236}">
-                <a16:creationId xmlns:a16="http://schemas.microsoft.com/office/drawing/2014/main" id="{49C145A4-1A59-4339-91F7-5FBC47B0244C}"/>
-              </a:ext>
-            </a:extLst>
-          </p:cNvPr>
-          <p:cNvSpPr>
-            <a:spLocks noGrp="1"/>
-          </p:cNvSpPr>
-          <p:nvPr>
-            <p:ph type="body" sz="half" idx="2"/>
-          </p:nvPr>
-        </p:nvSpPr>
-        <p:spPr>
-          <a:xfrm>
-            <a:off x="839788" y="2057400"/>
-            <a:ext cx="3932237" cy="3811588"/>
-          </a:xfrm>
-        </p:spPr>
-        <p:txBody>
-          <a:bodyPr/>
-          <a:lstStyle>
-            <a:lvl1pPr marL="0" indent="0">
-              <a:buNone/>
-              <a:defRPr sz="1600"/>
-            </a:lvl1pPr>
-            <a:lvl2pPr marL="457200" indent="0">
-              <a:buNone/>
-              <a:defRPr sz="1400"/>
-            </a:lvl2pPr>
-            <a:lvl3pPr marL="914400" indent="0">
-              <a:buNone/>
-              <a:defRPr sz="1200"/>
-            </a:lvl3pPr>
-            <a:lvl4pPr marL="1371600" indent="0">
-              <a:buNone/>
-              <a:defRPr sz="1000"/>
-            </a:lvl4pPr>
-            <a:lvl5pPr marL="1828800" indent="0">
-              <a:buNone/>
-              <a:defRPr sz="1000"/>
-            </a:lvl5pPr>
-            <a:lvl6pPr marL="2286000" indent="0">
-              <a:buNone/>
-              <a:defRPr sz="1000"/>
-            </a:lvl6pPr>
-            <a:lvl7pPr marL="2743200" indent="0">
-              <a:buNone/>
-              <a:defRPr sz="1000"/>
-            </a:lvl7pPr>
-            <a:lvl8pPr marL="3200400" indent="0">
-              <a:buNone/>
-              <a:defRPr sz="1000"/>
-            </a:lvl8pPr>
-            <a:lvl9pPr marL="3657600" indent="0">
-              <a:buNone/>
-              <a:defRPr sz="1000"/>
-            </a:lvl9pPr>
-          </a:lstStyle>
-          <a:p>
             <a:pPr lvl="0"/>
             <a:r>
               <a:rPr lang="en-US"/>
-              <a:t>Edit Master text styles</a:t>
-            </a:r>
-          </a:p>
-        </p:txBody>
-      </p:sp>
-      <p:sp>
-        <p:nvSpPr>
-          <p:cNvPr id="5" name="Date Placeholder 4">
-            <a:extLst>
-              <a:ext uri="{FF2B5EF4-FFF2-40B4-BE49-F238E27FC236}">
-                <a16:creationId xmlns:a16="http://schemas.microsoft.com/office/drawing/2014/main" id="{4883480C-F188-4234-B1C3-A427F7C305C4}"/>
-              </a:ext>
-            </a:extLst>
-          </p:cNvPr>
+              <a:t>Click to edit Master text styles</a:t>
+            </a:r>
+          </a:p>
+        </p:txBody>
+      </p:sp>
+      <p:sp>
+        <p:nvSpPr>
+          <p:cNvPr id="5" name="Date Placeholder 4"/>
           <p:cNvSpPr>
             <a:spLocks noGrp="1"/>
           </p:cNvSpPr>
@@ -3231,7 +2918,7 @@
           <a:p>
             <a:fld id="{30AF97BF-8750-4713-9C5B-3A2A8059BBA3}" type="datetimeFigureOut">
               <a:rPr lang="en-US" smtClean="0"/>
-              <a:t>2/20/21</a:t>
+              <a:t>3/2/21</a:t>
             </a:fld>
             <a:endParaRPr lang="en-US"/>
           </a:p>
@@ -3239,13 +2926,7 @@
       </p:sp>
       <p:sp>
         <p:nvSpPr>
-          <p:cNvPr id="6" name="Footer Placeholder 5">
-            <a:extLst>
-              <a:ext uri="{FF2B5EF4-FFF2-40B4-BE49-F238E27FC236}">
-                <a16:creationId xmlns:a16="http://schemas.microsoft.com/office/drawing/2014/main" id="{75D9489C-70C8-4D6A-BB4E-8B754660F709}"/>
-              </a:ext>
-            </a:extLst>
-          </p:cNvPr>
+          <p:cNvPr id="6" name="Footer Placeholder 5"/>
           <p:cNvSpPr>
             <a:spLocks noGrp="1"/>
           </p:cNvSpPr>
@@ -3264,13 +2945,7 @@
       </p:sp>
       <p:sp>
         <p:nvSpPr>
-          <p:cNvPr id="7" name="Slide Number Placeholder 6">
-            <a:extLst>
-              <a:ext uri="{FF2B5EF4-FFF2-40B4-BE49-F238E27FC236}">
-                <a16:creationId xmlns:a16="http://schemas.microsoft.com/office/drawing/2014/main" id="{E23AA721-C559-4E03-87F4-754FF49B4C03}"/>
-              </a:ext>
-            </a:extLst>
-          </p:cNvPr>
+          <p:cNvPr id="7" name="Slide Number Placeholder 6"/>
           <p:cNvSpPr>
             <a:spLocks noGrp="1"/>
           </p:cNvSpPr>
@@ -3294,7 +2969,7 @@
     </p:spTree>
     <p:extLst>
       <p:ext uri="{BB962C8B-B14F-4D97-AF65-F5344CB8AC3E}">
-        <p14:creationId xmlns:p14="http://schemas.microsoft.com/office/powerpoint/2010/main" val="1268355817"/>
+        <p14:creationId xmlns:p14="http://schemas.microsoft.com/office/powerpoint/2010/main" val="1406773483"/>
       </p:ext>
     </p:extLst>
   </p:cSld>
@@ -3328,13 +3003,7 @@
       </p:grpSpPr>
       <p:sp>
         <p:nvSpPr>
-          <p:cNvPr id="2" name="Title Placeholder 1">
-            <a:extLst>
-              <a:ext uri="{FF2B5EF4-FFF2-40B4-BE49-F238E27FC236}">
-                <a16:creationId xmlns:a16="http://schemas.microsoft.com/office/drawing/2014/main" id="{A1C05CC6-706F-4184-B3A9-231469694680}"/>
-              </a:ext>
-            </a:extLst>
-          </p:cNvPr>
+          <p:cNvPr id="2" name="Title Placeholder 1"/>
           <p:cNvSpPr>
             <a:spLocks noGrp="1"/>
           </p:cNvSpPr>
@@ -3344,8 +3013,8 @@
         </p:nvSpPr>
         <p:spPr>
           <a:xfrm>
-            <a:off x="838200" y="365125"/>
-            <a:ext cx="10515600" cy="1325563"/>
+            <a:off x="413425" y="165490"/>
+            <a:ext cx="5186601" cy="600799"/>
           </a:xfrm>
           <a:prstGeom prst="rect">
             <a:avLst/>
@@ -3361,18 +3030,13 @@
               <a:rPr lang="en-US"/>
               <a:t>Click to edit Master title style</a:t>
             </a:r>
-          </a:p>
-        </p:txBody>
-      </p:sp>
-      <p:sp>
-        <p:nvSpPr>
-          <p:cNvPr id="3" name="Text Placeholder 2">
-            <a:extLst>
-              <a:ext uri="{FF2B5EF4-FFF2-40B4-BE49-F238E27FC236}">
-                <a16:creationId xmlns:a16="http://schemas.microsoft.com/office/drawing/2014/main" id="{82D6D36A-F01E-44AD-85D2-9519729F823C}"/>
-              </a:ext>
-            </a:extLst>
-          </p:cNvPr>
+            <a:endParaRPr lang="en-US" dirty="0"/>
+          </a:p>
+        </p:txBody>
+      </p:sp>
+      <p:sp>
+        <p:nvSpPr>
+          <p:cNvPr id="3" name="Text Placeholder 2"/>
           <p:cNvSpPr>
             <a:spLocks noGrp="1"/>
           </p:cNvSpPr>
@@ -3382,8 +3046,8 @@
         </p:nvSpPr>
         <p:spPr>
           <a:xfrm>
-            <a:off x="838200" y="1825625"/>
-            <a:ext cx="10515600" cy="4351338"/>
+            <a:off x="413425" y="827447"/>
+            <a:ext cx="5186601" cy="1972204"/>
           </a:xfrm>
           <a:prstGeom prst="rect">
             <a:avLst/>
@@ -3398,7 +3062,7 @@
             <a:pPr lvl="0"/>
             <a:r>
               <a:rPr lang="en-US"/>
-              <a:t>Edit Master text styles</a:t>
+              <a:t>Click to edit Master text styles</a:t>
             </a:r>
           </a:p>
           <a:p>
@@ -3428,18 +3092,13 @@
               <a:rPr lang="en-US"/>
               <a:t>Fifth level</a:t>
             </a:r>
-          </a:p>
-        </p:txBody>
-      </p:sp>
-      <p:sp>
-        <p:nvSpPr>
-          <p:cNvPr id="4" name="Date Placeholder 3">
-            <a:extLst>
-              <a:ext uri="{FF2B5EF4-FFF2-40B4-BE49-F238E27FC236}">
-                <a16:creationId xmlns:a16="http://schemas.microsoft.com/office/drawing/2014/main" id="{8A020090-6C1E-4A6D-A47C-3CCF9D1C7FDF}"/>
-              </a:ext>
-            </a:extLst>
-          </p:cNvPr>
+            <a:endParaRPr lang="en-US" dirty="0"/>
+          </a:p>
+        </p:txBody>
+      </p:sp>
+      <p:sp>
+        <p:nvSpPr>
+          <p:cNvPr id="4" name="Date Placeholder 3"/>
           <p:cNvSpPr>
             <a:spLocks noGrp="1"/>
           </p:cNvSpPr>
@@ -3449,8 +3108,8 @@
         </p:nvSpPr>
         <p:spPr>
           <a:xfrm>
-            <a:off x="838200" y="6356350"/>
-            <a:ext cx="2743200" cy="365125"/>
+            <a:off x="413425" y="2880957"/>
+            <a:ext cx="1353026" cy="165490"/>
           </a:xfrm>
           <a:prstGeom prst="rect">
             <a:avLst/>
@@ -3460,7 +3119,7 @@
           <a:bodyPr vert="horz" lIns="91440" tIns="45720" rIns="91440" bIns="45720" rtlCol="0" anchor="ctr"/>
           <a:lstStyle>
             <a:lvl1pPr algn="l">
-              <a:defRPr sz="1200">
+              <a:defRPr sz="544">
                 <a:solidFill>
                   <a:schemeClr val="tx1">
                     <a:tint val="75000"/>
@@ -3472,7 +3131,7 @@
           <a:p>
             <a:fld id="{30AF97BF-8750-4713-9C5B-3A2A8059BBA3}" type="datetimeFigureOut">
               <a:rPr lang="en-US" smtClean="0"/>
-              <a:t>2/20/21</a:t>
+              <a:t>3/2/21</a:t>
             </a:fld>
             <a:endParaRPr lang="en-US"/>
           </a:p>
@@ -3480,13 +3139,7 @@
       </p:sp>
       <p:sp>
         <p:nvSpPr>
-          <p:cNvPr id="5" name="Footer Placeholder 4">
-            <a:extLst>
-              <a:ext uri="{FF2B5EF4-FFF2-40B4-BE49-F238E27FC236}">
-                <a16:creationId xmlns:a16="http://schemas.microsoft.com/office/drawing/2014/main" id="{08A27F2F-3015-48EC-AC42-CDAC98C97E2B}"/>
-              </a:ext>
-            </a:extLst>
-          </p:cNvPr>
+          <p:cNvPr id="5" name="Footer Placeholder 4"/>
           <p:cNvSpPr>
             <a:spLocks noGrp="1"/>
           </p:cNvSpPr>
@@ -3496,8 +3149,8 @@
         </p:nvSpPr>
         <p:spPr>
           <a:xfrm>
-            <a:off x="4038600" y="6356350"/>
-            <a:ext cx="4114800" cy="365125"/>
+            <a:off x="1991956" y="2880957"/>
+            <a:ext cx="2029539" cy="165490"/>
           </a:xfrm>
           <a:prstGeom prst="rect">
             <a:avLst/>
@@ -3507,7 +3160,7 @@
           <a:bodyPr vert="horz" lIns="91440" tIns="45720" rIns="91440" bIns="45720" rtlCol="0" anchor="ctr"/>
           <a:lstStyle>
             <a:lvl1pPr algn="ctr">
-              <a:defRPr sz="1200">
+              <a:defRPr sz="544">
                 <a:solidFill>
                   <a:schemeClr val="tx1">
                     <a:tint val="75000"/>
@@ -3523,13 +3176,7 @@
       </p:sp>
       <p:sp>
         <p:nvSpPr>
-          <p:cNvPr id="6" name="Slide Number Placeholder 5">
-            <a:extLst>
-              <a:ext uri="{FF2B5EF4-FFF2-40B4-BE49-F238E27FC236}">
-                <a16:creationId xmlns:a16="http://schemas.microsoft.com/office/drawing/2014/main" id="{383F1DED-437C-4E7D-9AE7-5FD6D480773E}"/>
-              </a:ext>
-            </a:extLst>
-          </p:cNvPr>
+          <p:cNvPr id="6" name="Slide Number Placeholder 5"/>
           <p:cNvSpPr>
             <a:spLocks noGrp="1"/>
           </p:cNvSpPr>
@@ -3539,8 +3186,8 @@
         </p:nvSpPr>
         <p:spPr>
           <a:xfrm>
-            <a:off x="8610600" y="6356350"/>
-            <a:ext cx="2743200" cy="365125"/>
+            <a:off x="4246999" y="2880957"/>
+            <a:ext cx="1353026" cy="165490"/>
           </a:xfrm>
           <a:prstGeom prst="rect">
             <a:avLst/>
@@ -3550,7 +3197,7 @@
           <a:bodyPr vert="horz" lIns="91440" tIns="45720" rIns="91440" bIns="45720" rtlCol="0" anchor="ctr"/>
           <a:lstStyle>
             <a:lvl1pPr algn="r">
-              <a:defRPr sz="1200">
+              <a:defRPr sz="544">
                 <a:solidFill>
                   <a:schemeClr val="tx1">
                     <a:tint val="75000"/>
@@ -3571,27 +3218,27 @@
     </p:spTree>
     <p:extLst>
       <p:ext uri="{BB962C8B-B14F-4D97-AF65-F5344CB8AC3E}">
-        <p14:creationId xmlns:p14="http://schemas.microsoft.com/office/powerpoint/2010/main" val="4281655690"/>
+        <p14:creationId xmlns:p14="http://schemas.microsoft.com/office/powerpoint/2010/main" val="2819355928"/>
       </p:ext>
     </p:extLst>
   </p:cSld>
   <p:clrMap bg1="lt1" tx1="dk1" bg2="lt2" tx2="dk2" accent1="accent1" accent2="accent2" accent3="accent3" accent4="accent4" accent5="accent5" accent6="accent6" hlink="hlink" folHlink="folHlink"/>
   <p:sldLayoutIdLst>
-    <p:sldLayoutId id="2147483649" r:id="rId1"/>
-    <p:sldLayoutId id="2147483650" r:id="rId2"/>
-    <p:sldLayoutId id="2147483651" r:id="rId3"/>
-    <p:sldLayoutId id="2147483652" r:id="rId4"/>
-    <p:sldLayoutId id="2147483653" r:id="rId5"/>
-    <p:sldLayoutId id="2147483654" r:id="rId6"/>
-    <p:sldLayoutId id="2147483655" r:id="rId7"/>
-    <p:sldLayoutId id="2147483656" r:id="rId8"/>
-    <p:sldLayoutId id="2147483657" r:id="rId9"/>
-    <p:sldLayoutId id="2147483658" r:id="rId10"/>
-    <p:sldLayoutId id="2147483659" r:id="rId11"/>
+    <p:sldLayoutId id="2147483757" r:id="rId1"/>
+    <p:sldLayoutId id="2147483758" r:id="rId2"/>
+    <p:sldLayoutId id="2147483759" r:id="rId3"/>
+    <p:sldLayoutId id="2147483760" r:id="rId4"/>
+    <p:sldLayoutId id="2147483761" r:id="rId5"/>
+    <p:sldLayoutId id="2147483762" r:id="rId6"/>
+    <p:sldLayoutId id="2147483763" r:id="rId7"/>
+    <p:sldLayoutId id="2147483764" r:id="rId8"/>
+    <p:sldLayoutId id="2147483765" r:id="rId9"/>
+    <p:sldLayoutId id="2147483766" r:id="rId10"/>
+    <p:sldLayoutId id="2147483767" r:id="rId11"/>
   </p:sldLayoutIdLst>
   <p:txStyles>
     <p:titleStyle>
-      <a:lvl1pPr algn="l" defTabSz="914400" rtl="0" eaLnBrk="1" latinLnBrk="0" hangingPunct="1">
+      <a:lvl1pPr algn="l" defTabSz="414406" rtl="0" eaLnBrk="1" latinLnBrk="0" hangingPunct="1">
         <a:lnSpc>
           <a:spcPct val="90000"/>
         </a:lnSpc>
@@ -3599,7 +3246,7 @@
           <a:spcPct val="0"/>
         </a:spcBef>
         <a:buNone/>
-        <a:defRPr sz="4400" kern="1200">
+        <a:defRPr sz="1994" kern="1200">
           <a:solidFill>
             <a:schemeClr val="tx1"/>
           </a:solidFill>
@@ -3610,16 +3257,16 @@
       </a:lvl1pPr>
     </p:titleStyle>
     <p:bodyStyle>
-      <a:lvl1pPr marL="228600" indent="-228600" algn="l" defTabSz="914400" rtl="0" eaLnBrk="1" latinLnBrk="0" hangingPunct="1">
+      <a:lvl1pPr marL="103602" indent="-103602" algn="l" defTabSz="414406" rtl="0" eaLnBrk="1" latinLnBrk="0" hangingPunct="1">
         <a:lnSpc>
           <a:spcPct val="90000"/>
         </a:lnSpc>
         <a:spcBef>
-          <a:spcPts val="1000"/>
+          <a:spcPts val="453"/>
         </a:spcBef>
         <a:buFont typeface="Arial" panose="020B0604020202020204" pitchFamily="34" charset="0"/>
         <a:buChar char="•"/>
-        <a:defRPr sz="2800" kern="1200">
+        <a:defRPr sz="1269" kern="1200">
           <a:solidFill>
             <a:schemeClr val="tx1"/>
           </a:solidFill>
@@ -3628,16 +3275,16 @@
           <a:cs typeface="+mn-cs"/>
         </a:defRPr>
       </a:lvl1pPr>
-      <a:lvl2pPr marL="685800" indent="-228600" algn="l" defTabSz="914400" rtl="0" eaLnBrk="1" latinLnBrk="0" hangingPunct="1">
+      <a:lvl2pPr marL="310805" indent="-103602" algn="l" defTabSz="414406" rtl="0" eaLnBrk="1" latinLnBrk="0" hangingPunct="1">
         <a:lnSpc>
           <a:spcPct val="90000"/>
         </a:lnSpc>
         <a:spcBef>
-          <a:spcPts val="500"/>
+          <a:spcPts val="227"/>
         </a:spcBef>
         <a:buFont typeface="Arial" panose="020B0604020202020204" pitchFamily="34" charset="0"/>
         <a:buChar char="•"/>
-        <a:defRPr sz="2400" kern="1200">
+        <a:defRPr sz="1088" kern="1200">
           <a:solidFill>
             <a:schemeClr val="tx1"/>
           </a:solidFill>
@@ -3646,16 +3293,16 @@
           <a:cs typeface="+mn-cs"/>
         </a:defRPr>
       </a:lvl2pPr>
-      <a:lvl3pPr marL="1143000" indent="-228600" algn="l" defTabSz="914400" rtl="0" eaLnBrk="1" latinLnBrk="0" hangingPunct="1">
+      <a:lvl3pPr marL="518008" indent="-103602" algn="l" defTabSz="414406" rtl="0" eaLnBrk="1" latinLnBrk="0" hangingPunct="1">
         <a:lnSpc>
           <a:spcPct val="90000"/>
         </a:lnSpc>
         <a:spcBef>
-          <a:spcPts val="500"/>
+          <a:spcPts val="227"/>
         </a:spcBef>
         <a:buFont typeface="Arial" panose="020B0604020202020204" pitchFamily="34" charset="0"/>
         <a:buChar char="•"/>
-        <a:defRPr sz="2000" kern="1200">
+        <a:defRPr sz="906" kern="1200">
           <a:solidFill>
             <a:schemeClr val="tx1"/>
           </a:solidFill>
@@ -3664,16 +3311,16 @@
           <a:cs typeface="+mn-cs"/>
         </a:defRPr>
       </a:lvl3pPr>
-      <a:lvl4pPr marL="1600200" indent="-228600" algn="l" defTabSz="914400" rtl="0" eaLnBrk="1" latinLnBrk="0" hangingPunct="1">
+      <a:lvl4pPr marL="725211" indent="-103602" algn="l" defTabSz="414406" rtl="0" eaLnBrk="1" latinLnBrk="0" hangingPunct="1">
         <a:lnSpc>
           <a:spcPct val="90000"/>
         </a:lnSpc>
         <a:spcBef>
-          <a:spcPts val="500"/>
+          <a:spcPts val="227"/>
         </a:spcBef>
         <a:buFont typeface="Arial" panose="020B0604020202020204" pitchFamily="34" charset="0"/>
         <a:buChar char="•"/>
-        <a:defRPr sz="1800" kern="1200">
+        <a:defRPr sz="816" kern="1200">
           <a:solidFill>
             <a:schemeClr val="tx1"/>
           </a:solidFill>
@@ -3682,16 +3329,16 @@
           <a:cs typeface="+mn-cs"/>
         </a:defRPr>
       </a:lvl4pPr>
-      <a:lvl5pPr marL="2057400" indent="-228600" algn="l" defTabSz="914400" rtl="0" eaLnBrk="1" latinLnBrk="0" hangingPunct="1">
+      <a:lvl5pPr marL="932414" indent="-103602" algn="l" defTabSz="414406" rtl="0" eaLnBrk="1" latinLnBrk="0" hangingPunct="1">
         <a:lnSpc>
           <a:spcPct val="90000"/>
         </a:lnSpc>
         <a:spcBef>
-          <a:spcPts val="500"/>
+          <a:spcPts val="227"/>
         </a:spcBef>
         <a:buFont typeface="Arial" panose="020B0604020202020204" pitchFamily="34" charset="0"/>
         <a:buChar char="•"/>
-        <a:defRPr sz="1800" kern="1200">
+        <a:defRPr sz="816" kern="1200">
           <a:solidFill>
             <a:schemeClr val="tx1"/>
           </a:solidFill>
@@ -3700,16 +3347,16 @@
           <a:cs typeface="+mn-cs"/>
         </a:defRPr>
       </a:lvl5pPr>
-      <a:lvl6pPr marL="2514600" indent="-228600" algn="l" defTabSz="914400" rtl="0" eaLnBrk="1" latinLnBrk="0" hangingPunct="1">
+      <a:lvl6pPr marL="1139617" indent="-103602" algn="l" defTabSz="414406" rtl="0" eaLnBrk="1" latinLnBrk="0" hangingPunct="1">
         <a:lnSpc>
           <a:spcPct val="90000"/>
         </a:lnSpc>
         <a:spcBef>
-          <a:spcPts val="500"/>
+          <a:spcPts val="227"/>
         </a:spcBef>
         <a:buFont typeface="Arial" panose="020B0604020202020204" pitchFamily="34" charset="0"/>
         <a:buChar char="•"/>
-        <a:defRPr sz="1800" kern="1200">
+        <a:defRPr sz="816" kern="1200">
           <a:solidFill>
             <a:schemeClr val="tx1"/>
           </a:solidFill>
@@ -3718,16 +3365,16 @@
           <a:cs typeface="+mn-cs"/>
         </a:defRPr>
       </a:lvl6pPr>
-      <a:lvl7pPr marL="2971800" indent="-228600" algn="l" defTabSz="914400" rtl="0" eaLnBrk="1" latinLnBrk="0" hangingPunct="1">
+      <a:lvl7pPr marL="1346820" indent="-103602" algn="l" defTabSz="414406" rtl="0" eaLnBrk="1" latinLnBrk="0" hangingPunct="1">
         <a:lnSpc>
           <a:spcPct val="90000"/>
         </a:lnSpc>
         <a:spcBef>
-          <a:spcPts val="500"/>
+          <a:spcPts val="227"/>
         </a:spcBef>
         <a:buFont typeface="Arial" panose="020B0604020202020204" pitchFamily="34" charset="0"/>
         <a:buChar char="•"/>
-        <a:defRPr sz="1800" kern="1200">
+        <a:defRPr sz="816" kern="1200">
           <a:solidFill>
             <a:schemeClr val="tx1"/>
           </a:solidFill>
@@ -3736,16 +3383,16 @@
           <a:cs typeface="+mn-cs"/>
         </a:defRPr>
       </a:lvl7pPr>
-      <a:lvl8pPr marL="3429000" indent="-228600" algn="l" defTabSz="914400" rtl="0" eaLnBrk="1" latinLnBrk="0" hangingPunct="1">
+      <a:lvl8pPr marL="1554023" indent="-103602" algn="l" defTabSz="414406" rtl="0" eaLnBrk="1" latinLnBrk="0" hangingPunct="1">
         <a:lnSpc>
           <a:spcPct val="90000"/>
         </a:lnSpc>
         <a:spcBef>
-          <a:spcPts val="500"/>
+          <a:spcPts val="227"/>
         </a:spcBef>
         <a:buFont typeface="Arial" panose="020B0604020202020204" pitchFamily="34" charset="0"/>
         <a:buChar char="•"/>
-        <a:defRPr sz="1800" kern="1200">
+        <a:defRPr sz="816" kern="1200">
           <a:solidFill>
             <a:schemeClr val="tx1"/>
           </a:solidFill>
@@ -3754,16 +3401,16 @@
           <a:cs typeface="+mn-cs"/>
         </a:defRPr>
       </a:lvl8pPr>
-      <a:lvl9pPr marL="3886200" indent="-228600" algn="l" defTabSz="914400" rtl="0" eaLnBrk="1" latinLnBrk="0" hangingPunct="1">
+      <a:lvl9pPr marL="1761226" indent="-103602" algn="l" defTabSz="414406" rtl="0" eaLnBrk="1" latinLnBrk="0" hangingPunct="1">
         <a:lnSpc>
           <a:spcPct val="90000"/>
         </a:lnSpc>
         <a:spcBef>
-          <a:spcPts val="500"/>
+          <a:spcPts val="227"/>
         </a:spcBef>
         <a:buFont typeface="Arial" panose="020B0604020202020204" pitchFamily="34" charset="0"/>
         <a:buChar char="•"/>
-        <a:defRPr sz="1800" kern="1200">
+        <a:defRPr sz="816" kern="1200">
           <a:solidFill>
             <a:schemeClr val="tx1"/>
           </a:solidFill>
@@ -3777,8 +3424,8 @@
       <a:defPPr>
         <a:defRPr lang="en-US"/>
       </a:defPPr>
-      <a:lvl1pPr marL="0" algn="l" defTabSz="914400" rtl="0" eaLnBrk="1" latinLnBrk="0" hangingPunct="1">
-        <a:defRPr sz="1800" kern="1200">
+      <a:lvl1pPr marL="0" algn="l" defTabSz="414406" rtl="0" eaLnBrk="1" latinLnBrk="0" hangingPunct="1">
+        <a:defRPr sz="816" kern="1200">
           <a:solidFill>
             <a:schemeClr val="tx1"/>
           </a:solidFill>
@@ -3787,8 +3434,8 @@
           <a:cs typeface="+mn-cs"/>
         </a:defRPr>
       </a:lvl1pPr>
-      <a:lvl2pPr marL="457200" algn="l" defTabSz="914400" rtl="0" eaLnBrk="1" latinLnBrk="0" hangingPunct="1">
-        <a:defRPr sz="1800" kern="1200">
+      <a:lvl2pPr marL="207203" algn="l" defTabSz="414406" rtl="0" eaLnBrk="1" latinLnBrk="0" hangingPunct="1">
+        <a:defRPr sz="816" kern="1200">
           <a:solidFill>
             <a:schemeClr val="tx1"/>
           </a:solidFill>
@@ -3797,8 +3444,8 @@
           <a:cs typeface="+mn-cs"/>
         </a:defRPr>
       </a:lvl2pPr>
-      <a:lvl3pPr marL="914400" algn="l" defTabSz="914400" rtl="0" eaLnBrk="1" latinLnBrk="0" hangingPunct="1">
-        <a:defRPr sz="1800" kern="1200">
+      <a:lvl3pPr marL="414406" algn="l" defTabSz="414406" rtl="0" eaLnBrk="1" latinLnBrk="0" hangingPunct="1">
+        <a:defRPr sz="816" kern="1200">
           <a:solidFill>
             <a:schemeClr val="tx1"/>
           </a:solidFill>
@@ -3807,8 +3454,8 @@
           <a:cs typeface="+mn-cs"/>
         </a:defRPr>
       </a:lvl3pPr>
-      <a:lvl4pPr marL="1371600" algn="l" defTabSz="914400" rtl="0" eaLnBrk="1" latinLnBrk="0" hangingPunct="1">
-        <a:defRPr sz="1800" kern="1200">
+      <a:lvl4pPr marL="621609" algn="l" defTabSz="414406" rtl="0" eaLnBrk="1" latinLnBrk="0" hangingPunct="1">
+        <a:defRPr sz="816" kern="1200">
           <a:solidFill>
             <a:schemeClr val="tx1"/>
           </a:solidFill>
@@ -3817,8 +3464,8 @@
           <a:cs typeface="+mn-cs"/>
         </a:defRPr>
       </a:lvl4pPr>
-      <a:lvl5pPr marL="1828800" algn="l" defTabSz="914400" rtl="0" eaLnBrk="1" latinLnBrk="0" hangingPunct="1">
-        <a:defRPr sz="1800" kern="1200">
+      <a:lvl5pPr marL="828812" algn="l" defTabSz="414406" rtl="0" eaLnBrk="1" latinLnBrk="0" hangingPunct="1">
+        <a:defRPr sz="816" kern="1200">
           <a:solidFill>
             <a:schemeClr val="tx1"/>
           </a:solidFill>
@@ -3827,8 +3474,8 @@
           <a:cs typeface="+mn-cs"/>
         </a:defRPr>
       </a:lvl5pPr>
-      <a:lvl6pPr marL="2286000" algn="l" defTabSz="914400" rtl="0" eaLnBrk="1" latinLnBrk="0" hangingPunct="1">
-        <a:defRPr sz="1800" kern="1200">
+      <a:lvl6pPr marL="1036015" algn="l" defTabSz="414406" rtl="0" eaLnBrk="1" latinLnBrk="0" hangingPunct="1">
+        <a:defRPr sz="816" kern="1200">
           <a:solidFill>
             <a:schemeClr val="tx1"/>
           </a:solidFill>
@@ -3837,8 +3484,8 @@
           <a:cs typeface="+mn-cs"/>
         </a:defRPr>
       </a:lvl6pPr>
-      <a:lvl7pPr marL="2743200" algn="l" defTabSz="914400" rtl="0" eaLnBrk="1" latinLnBrk="0" hangingPunct="1">
-        <a:defRPr sz="1800" kern="1200">
+      <a:lvl7pPr marL="1243218" algn="l" defTabSz="414406" rtl="0" eaLnBrk="1" latinLnBrk="0" hangingPunct="1">
+        <a:defRPr sz="816" kern="1200">
           <a:solidFill>
             <a:schemeClr val="tx1"/>
           </a:solidFill>
@@ -3847,8 +3494,8 @@
           <a:cs typeface="+mn-cs"/>
         </a:defRPr>
       </a:lvl7pPr>
-      <a:lvl8pPr marL="3200400" algn="l" defTabSz="914400" rtl="0" eaLnBrk="1" latinLnBrk="0" hangingPunct="1">
-        <a:defRPr sz="1800" kern="1200">
+      <a:lvl8pPr marL="1450421" algn="l" defTabSz="414406" rtl="0" eaLnBrk="1" latinLnBrk="0" hangingPunct="1">
+        <a:defRPr sz="816" kern="1200">
           <a:solidFill>
             <a:schemeClr val="tx1"/>
           </a:solidFill>
@@ -3857,8 +3504,8 @@
           <a:cs typeface="+mn-cs"/>
         </a:defRPr>
       </a:lvl8pPr>
-      <a:lvl9pPr marL="3657600" algn="l" defTabSz="914400" rtl="0" eaLnBrk="1" latinLnBrk="0" hangingPunct="1">
-        <a:defRPr sz="1800" kern="1200">
+      <a:lvl9pPr marL="1657624" algn="l" defTabSz="414406" rtl="0" eaLnBrk="1" latinLnBrk="0" hangingPunct="1">
+        <a:defRPr sz="816" kern="1200">
           <a:solidFill>
             <a:schemeClr val="tx1"/>
           </a:solidFill>
@@ -3904,8 +3551,8 @@
         </p:blipFill>
         <p:spPr>
           <a:xfrm>
-            <a:off x="2300220" y="2242440"/>
-            <a:ext cx="990600" cy="872159"/>
+            <a:off x="159424" y="635341"/>
+            <a:ext cx="794494" cy="699502"/>
           </a:xfrm>
           <a:prstGeom prst="rect">
             <a:avLst/>
@@ -3924,8 +3571,8 @@
         </p:nvSpPr>
         <p:spPr>
           <a:xfrm>
-            <a:off x="2760909" y="3048102"/>
-            <a:ext cx="1066800" cy="461600"/>
+            <a:off x="528905" y="1281511"/>
+            <a:ext cx="855608" cy="370219"/>
           </a:xfrm>
           <a:prstGeom prst="rect">
             <a:avLst/>
@@ -3936,13 +3583,13 @@
           </a:ln>
         </p:spPr>
         <p:txBody>
-          <a:bodyPr spcFirstLastPara="1" wrap="square" lIns="91433" tIns="45700" rIns="91433" bIns="45700" anchor="t" anchorCtr="0">
+          <a:bodyPr spcFirstLastPara="1" wrap="square" lIns="73332" tIns="36652" rIns="73332" bIns="36652" anchor="t" anchorCtr="0">
             <a:noAutofit/>
           </a:bodyPr>
           <a:lstStyle/>
           <a:p>
             <a:r>
-              <a:rPr lang="en" sz="2400" dirty="0">
+              <a:rPr lang="en" sz="1926" dirty="0">
                 <a:solidFill>
                   <a:schemeClr val="dk1"/>
                 </a:solidFill>
@@ -3953,7 +3600,7 @@
               </a:rPr>
               <a:t>Day:</a:t>
             </a:r>
-            <a:endParaRPr sz="1467" dirty="0"/>
+            <a:endParaRPr sz="1177" dirty="0"/>
           </a:p>
         </p:txBody>
       </p:sp>
@@ -3965,8 +3612,8 @@
         </p:nvSpPr>
         <p:spPr>
           <a:xfrm>
-            <a:off x="7694604" y="1774159"/>
-            <a:ext cx="2637200" cy="338800"/>
+            <a:off x="4243354" y="307526"/>
+            <a:ext cx="2115120" cy="271728"/>
           </a:xfrm>
           <a:prstGeom prst="rect">
             <a:avLst/>
@@ -3977,14 +3624,14 @@
           </a:ln>
         </p:spPr>
         <p:txBody>
-          <a:bodyPr spcFirstLastPara="1" wrap="square" lIns="91433" tIns="45700" rIns="91433" bIns="45700" anchor="t" anchorCtr="0">
+          <a:bodyPr spcFirstLastPara="1" wrap="square" lIns="73332" tIns="36652" rIns="73332" bIns="36652" anchor="t" anchorCtr="0">
             <a:noAutofit/>
           </a:bodyPr>
           <a:lstStyle/>
           <a:p>
             <a:pPr algn="ctr"/>
             <a:r>
-              <a:rPr lang="en" sz="1600" dirty="0">
+              <a:rPr lang="en" sz="1282" dirty="0">
                 <a:solidFill>
                   <a:schemeClr val="dk1"/>
                 </a:solidFill>
@@ -3995,52 +3642,7 @@
               </a:rPr>
               <a:t>Euthanize</a:t>
             </a:r>
-            <a:endParaRPr sz="1467" dirty="0"/>
-          </a:p>
-        </p:txBody>
-      </p:sp>
-      <p:sp>
-        <p:nvSpPr>
-          <p:cNvPr id="3" name="Right Brace 2">
-            <a:extLst>
-              <a:ext uri="{FF2B5EF4-FFF2-40B4-BE49-F238E27FC236}">
-                <a16:creationId xmlns:a16="http://schemas.microsoft.com/office/drawing/2014/main" id="{BAD1F18A-B6AD-7D40-975A-F7A43DCEC06A}"/>
-              </a:ext>
-            </a:extLst>
-          </p:cNvPr>
-          <p:cNvSpPr/>
-          <p:nvPr/>
-        </p:nvSpPr>
-        <p:spPr>
-          <a:xfrm>
-            <a:off x="7221087" y="1014323"/>
-            <a:ext cx="604800" cy="925488"/>
-          </a:xfrm>
-          <a:prstGeom prst="rightBrace">
-            <a:avLst/>
-          </a:prstGeom>
-          <a:ln w="28575"/>
-        </p:spPr>
-        <p:style>
-          <a:lnRef idx="1">
-            <a:schemeClr val="dk1"/>
-          </a:lnRef>
-          <a:fillRef idx="0">
-            <a:schemeClr val="dk1"/>
-          </a:fillRef>
-          <a:effectRef idx="0">
-            <a:schemeClr val="dk1"/>
-          </a:effectRef>
-          <a:fontRef idx="minor">
-            <a:schemeClr val="tx1"/>
-          </a:fontRef>
-        </p:style>
-        <p:txBody>
-          <a:bodyPr rtlCol="0" anchor="ctr"/>
-          <a:lstStyle/>
-          <a:p>
-            <a:pPr algn="ctr"/>
-            <a:endParaRPr lang="en-US"/>
+            <a:endParaRPr sz="1177" dirty="0"/>
           </a:p>
         </p:txBody>
       </p:sp>
@@ -4058,9 +3660,9 @@
         </p:nvGrpSpPr>
         <p:grpSpPr>
           <a:xfrm>
-            <a:off x="3963945" y="2220864"/>
-            <a:ext cx="613590" cy="490016"/>
-            <a:chOff x="1249464" y="2409098"/>
+            <a:off x="1706921" y="617891"/>
+            <a:ext cx="643773" cy="393010"/>
+            <a:chOff x="1314346" y="2409098"/>
             <a:chExt cx="741504" cy="490016"/>
           </a:xfrm>
         </p:grpSpPr>
@@ -4101,13 +3703,13 @@
             </a:ln>
           </p:spPr>
           <p:txBody>
-            <a:bodyPr spcFirstLastPara="1" wrap="square" lIns="91433" tIns="45700" rIns="91433" bIns="45700" anchor="ctr" anchorCtr="0">
+            <a:bodyPr spcFirstLastPara="1" wrap="square" lIns="73332" tIns="36652" rIns="73332" bIns="36652" anchor="ctr" anchorCtr="0">
               <a:noAutofit/>
             </a:bodyPr>
             <a:lstStyle/>
             <a:p>
               <a:pPr algn="ctr"/>
-              <a:endParaRPr sz="1867" dirty="0">
+              <a:endParaRPr sz="1496" dirty="0">
                 <a:solidFill>
                   <a:schemeClr val="lt1"/>
                 </a:solidFill>
@@ -4133,7 +3735,7 @@
           </p:nvSpPr>
           <p:spPr>
             <a:xfrm>
-              <a:off x="1249464" y="2471828"/>
+              <a:off x="1314346" y="2472137"/>
               <a:ext cx="741504" cy="337083"/>
             </a:xfrm>
             <a:prstGeom prst="rect">
@@ -4145,13 +3747,13 @@
             </a:ln>
           </p:spPr>
           <p:txBody>
-            <a:bodyPr spcFirstLastPara="1" wrap="square" lIns="91433" tIns="45700" rIns="91433" bIns="45700" anchor="t" anchorCtr="0">
+            <a:bodyPr spcFirstLastPara="1" wrap="square" lIns="73332" tIns="36652" rIns="73332" bIns="36652" anchor="t" anchorCtr="0">
               <a:noAutofit/>
             </a:bodyPr>
             <a:lstStyle/>
             <a:p>
               <a:r>
-                <a:rPr lang="en-US" dirty="0">
+                <a:rPr lang="en-US" sz="1171" dirty="0">
                   <a:solidFill>
                     <a:schemeClr val="bg1"/>
                   </a:solidFill>
@@ -4179,8 +3781,8 @@
         </p:nvSpPr>
         <p:spPr>
           <a:xfrm>
-            <a:off x="4217263" y="3097110"/>
-            <a:ext cx="434800" cy="400400"/>
+            <a:off x="1945637" y="1340067"/>
+            <a:ext cx="348724" cy="321135"/>
           </a:xfrm>
           <a:prstGeom prst="rect">
             <a:avLst/>
@@ -4191,14 +3793,14 @@
           </a:ln>
         </p:spPr>
         <p:txBody>
-          <a:bodyPr spcFirstLastPara="1" wrap="square" lIns="91433" tIns="45700" rIns="91433" bIns="45700" anchor="t" anchorCtr="0">
+          <a:bodyPr spcFirstLastPara="1" wrap="square" lIns="73332" tIns="36652" rIns="73332" bIns="36652" anchor="t" anchorCtr="0">
             <a:noAutofit/>
           </a:bodyPr>
           <a:lstStyle/>
           <a:p>
             <a:pPr algn="ctr"/>
             <a:r>
-              <a:rPr lang="en" sz="2000" dirty="0">
+              <a:rPr lang="en" sz="1604" dirty="0">
                 <a:solidFill>
                   <a:schemeClr val="dk1"/>
                 </a:solidFill>
@@ -4209,7 +3811,7 @@
               </a:rPr>
               <a:t>-1</a:t>
             </a:r>
-            <a:endParaRPr sz="1467" dirty="0"/>
+            <a:endParaRPr sz="1177" dirty="0"/>
           </a:p>
         </p:txBody>
       </p:sp>
@@ -4227,8 +3829,8 @@
         </p:nvSpPr>
         <p:spPr>
           <a:xfrm>
-            <a:off x="4685203" y="3097110"/>
-            <a:ext cx="434800" cy="400400"/>
+            <a:off x="2483073" y="1328520"/>
+            <a:ext cx="348724" cy="321135"/>
           </a:xfrm>
           <a:prstGeom prst="rect">
             <a:avLst/>
@@ -4239,14 +3841,14 @@
           </a:ln>
         </p:spPr>
         <p:txBody>
-          <a:bodyPr spcFirstLastPara="1" wrap="square" lIns="91433" tIns="45700" rIns="91433" bIns="45700" anchor="t" anchorCtr="0">
+          <a:bodyPr spcFirstLastPara="1" wrap="square" lIns="73332" tIns="36652" rIns="73332" bIns="36652" anchor="t" anchorCtr="0">
             <a:noAutofit/>
           </a:bodyPr>
           <a:lstStyle/>
           <a:p>
             <a:pPr algn="ctr"/>
             <a:r>
-              <a:rPr lang="en" sz="2000" dirty="0">
+              <a:rPr lang="en" sz="1604" dirty="0">
                 <a:solidFill>
                   <a:schemeClr val="dk1"/>
                 </a:solidFill>
@@ -4257,151 +3859,7 @@
               </a:rPr>
               <a:t>0</a:t>
             </a:r>
-            <a:endParaRPr sz="1467" dirty="0"/>
-          </a:p>
-        </p:txBody>
-      </p:sp>
-      <p:sp>
-        <p:nvSpPr>
-          <p:cNvPr id="67" name="Google Shape;669;p64">
-            <a:extLst>
-              <a:ext uri="{FF2B5EF4-FFF2-40B4-BE49-F238E27FC236}">
-                <a16:creationId xmlns:a16="http://schemas.microsoft.com/office/drawing/2014/main" id="{AA9BC886-F703-CF41-929B-78F856136282}"/>
-              </a:ext>
-            </a:extLst>
-          </p:cNvPr>
-          <p:cNvSpPr txBox="1"/>
-          <p:nvPr/>
-        </p:nvSpPr>
-        <p:spPr>
-          <a:xfrm>
-            <a:off x="5171844" y="3097110"/>
-            <a:ext cx="282800" cy="400400"/>
-          </a:xfrm>
-          <a:prstGeom prst="rect">
-            <a:avLst/>
-          </a:prstGeom>
-          <a:noFill/>
-          <a:ln>
-            <a:noFill/>
-          </a:ln>
-        </p:spPr>
-        <p:txBody>
-          <a:bodyPr spcFirstLastPara="1" wrap="square" lIns="91433" tIns="45700" rIns="91433" bIns="45700" anchor="t" anchorCtr="0">
-            <a:noAutofit/>
-          </a:bodyPr>
-          <a:lstStyle/>
-          <a:p>
-            <a:pPr algn="ctr"/>
-            <a:r>
-              <a:rPr lang="en" sz="2000" dirty="0">
-                <a:solidFill>
-                  <a:schemeClr val="dk1"/>
-                </a:solidFill>
-                <a:latin typeface="Calibri"/>
-                <a:ea typeface="Calibri"/>
-                <a:cs typeface="Calibri"/>
-                <a:sym typeface="Calibri"/>
-              </a:rPr>
-              <a:t>1</a:t>
-            </a:r>
-            <a:endParaRPr sz="1467" dirty="0"/>
-          </a:p>
-        </p:txBody>
-      </p:sp>
-      <p:sp>
-        <p:nvSpPr>
-          <p:cNvPr id="77" name="Google Shape;670;p64">
-            <a:extLst>
-              <a:ext uri="{FF2B5EF4-FFF2-40B4-BE49-F238E27FC236}">
-                <a16:creationId xmlns:a16="http://schemas.microsoft.com/office/drawing/2014/main" id="{201AED4C-53B6-3645-9E0B-BFEB075C8FB0}"/>
-              </a:ext>
-            </a:extLst>
-          </p:cNvPr>
-          <p:cNvSpPr txBox="1"/>
-          <p:nvPr/>
-        </p:nvSpPr>
-        <p:spPr>
-          <a:xfrm>
-            <a:off x="5498216" y="3097110"/>
-            <a:ext cx="434800" cy="400400"/>
-          </a:xfrm>
-          <a:prstGeom prst="rect">
-            <a:avLst/>
-          </a:prstGeom>
-          <a:noFill/>
-          <a:ln>
-            <a:noFill/>
-          </a:ln>
-        </p:spPr>
-        <p:txBody>
-          <a:bodyPr spcFirstLastPara="1" wrap="square" lIns="91433" tIns="45700" rIns="91433" bIns="45700" anchor="t" anchorCtr="0">
-            <a:noAutofit/>
-          </a:bodyPr>
-          <a:lstStyle/>
-          <a:p>
-            <a:pPr algn="ctr"/>
-            <a:r>
-              <a:rPr lang="en" sz="2000" dirty="0">
-                <a:solidFill>
-                  <a:schemeClr val="dk1"/>
-                </a:solidFill>
-                <a:latin typeface="Calibri"/>
-                <a:ea typeface="Calibri"/>
-                <a:cs typeface="Calibri"/>
-                <a:sym typeface="Calibri"/>
-              </a:rPr>
-              <a:t>2</a:t>
-            </a:r>
-            <a:endParaRPr sz="1467" dirty="0"/>
-          </a:p>
-        </p:txBody>
-      </p:sp>
-      <p:sp>
-        <p:nvSpPr>
-          <p:cNvPr id="78" name="Google Shape;671;p64">
-            <a:extLst>
-              <a:ext uri="{FF2B5EF4-FFF2-40B4-BE49-F238E27FC236}">
-                <a16:creationId xmlns:a16="http://schemas.microsoft.com/office/drawing/2014/main" id="{0719FBB8-2B9F-B448-B21C-87FF1AA3CFA7}"/>
-              </a:ext>
-            </a:extLst>
-          </p:cNvPr>
-          <p:cNvSpPr txBox="1"/>
-          <p:nvPr/>
-        </p:nvSpPr>
-        <p:spPr>
-          <a:xfrm>
-            <a:off x="6249398" y="3097110"/>
-            <a:ext cx="604801" cy="400400"/>
-          </a:xfrm>
-          <a:prstGeom prst="rect">
-            <a:avLst/>
-          </a:prstGeom>
-          <a:noFill/>
-          <a:ln>
-            <a:noFill/>
-          </a:ln>
-        </p:spPr>
-        <p:txBody>
-          <a:bodyPr spcFirstLastPara="1" wrap="square" lIns="91433" tIns="45700" rIns="91433" bIns="45700" anchor="t" anchorCtr="0">
-            <a:noAutofit/>
-          </a:bodyPr>
-          <a:lstStyle/>
-          <a:p>
-            <a:pPr algn="ctr"/>
-            <a:r>
-              <a:rPr lang="en" sz="2000" dirty="0">
-                <a:solidFill>
-                  <a:schemeClr val="dk1"/>
-                </a:solidFill>
-                <a:latin typeface="Calibri"/>
-                <a:ea typeface="Calibri"/>
-                <a:cs typeface="Calibri"/>
-                <a:sym typeface="Calibri"/>
-              </a:rPr>
-              <a:t>4</a:t>
-            </a:r>
-            <a:endParaRPr sz="1467" dirty="0"/>
+            <a:endParaRPr sz="1177" dirty="0"/>
           </a:p>
         </p:txBody>
       </p:sp>
@@ -4421,8 +3879,8 @@
         </p:nvCxnSpPr>
         <p:spPr>
           <a:xfrm>
-            <a:off x="3640247" y="2885482"/>
-            <a:ext cx="5379297" cy="0"/>
+            <a:off x="1234165" y="1151082"/>
+            <a:ext cx="4066750" cy="0"/>
           </a:xfrm>
           <a:prstGeom prst="straightConnector1">
             <a:avLst/>
@@ -4466,8 +3924,8 @@
         </p:nvCxnSpPr>
         <p:spPr>
           <a:xfrm>
-            <a:off x="3640247" y="2621622"/>
-            <a:ext cx="0" cy="528002"/>
+            <a:off x="1234162" y="939464"/>
+            <a:ext cx="0" cy="423476"/>
           </a:xfrm>
           <a:prstGeom prst="straightConnector1">
             <a:avLst/>
@@ -4498,8 +3956,8 @@
         </p:nvCxnSpPr>
         <p:spPr>
           <a:xfrm>
-            <a:off x="4058819" y="2621622"/>
-            <a:ext cx="0" cy="528002"/>
+            <a:off x="1706917" y="939237"/>
+            <a:ext cx="0" cy="423476"/>
           </a:xfrm>
           <a:prstGeom prst="straightConnector1">
             <a:avLst/>
@@ -4530,8 +3988,8 @@
         </p:nvCxnSpPr>
         <p:spPr>
           <a:xfrm>
-            <a:off x="4477391" y="2621622"/>
-            <a:ext cx="0" cy="528002"/>
+            <a:off x="2160838" y="946401"/>
+            <a:ext cx="0" cy="423476"/>
           </a:xfrm>
           <a:prstGeom prst="straightConnector1">
             <a:avLst/>
@@ -4562,280 +4020,8 @@
         </p:nvCxnSpPr>
         <p:spPr>
           <a:xfrm>
-            <a:off x="4895963" y="2621622"/>
-            <a:ext cx="0" cy="528002"/>
-          </a:xfrm>
-          <a:prstGeom prst="straightConnector1">
-            <a:avLst/>
-          </a:prstGeom>
-          <a:noFill/>
-          <a:ln w="28575" cap="flat" cmpd="sng">
-            <a:solidFill>
-              <a:schemeClr val="dk1"/>
-            </a:solidFill>
-            <a:prstDash val="solid"/>
-            <a:miter lim="800000"/>
-            <a:headEnd type="none" w="sm" len="sm"/>
-            <a:tailEnd type="none" w="sm" len="sm"/>
-          </a:ln>
-        </p:spPr>
-      </p:cxnSp>
-      <p:cxnSp>
-        <p:nvCxnSpPr>
-          <p:cNvPr id="88" name="Google Shape;688;p64">
-            <a:extLst>
-              <a:ext uri="{FF2B5EF4-FFF2-40B4-BE49-F238E27FC236}">
-                <a16:creationId xmlns:a16="http://schemas.microsoft.com/office/drawing/2014/main" id="{1E1AEB22-2414-9A48-91E4-C35E5E7ED219}"/>
-              </a:ext>
-            </a:extLst>
-          </p:cNvPr>
-          <p:cNvCxnSpPr/>
-          <p:nvPr/>
-        </p:nvCxnSpPr>
-        <p:spPr>
-          <a:xfrm>
-            <a:off x="5314535" y="2621622"/>
-            <a:ext cx="0" cy="528002"/>
-          </a:xfrm>
-          <a:prstGeom prst="straightConnector1">
-            <a:avLst/>
-          </a:prstGeom>
-          <a:noFill/>
-          <a:ln w="28575" cap="flat" cmpd="sng">
-            <a:solidFill>
-              <a:schemeClr val="dk1"/>
-            </a:solidFill>
-            <a:prstDash val="solid"/>
-            <a:miter lim="800000"/>
-            <a:headEnd type="none" w="sm" len="sm"/>
-            <a:tailEnd type="none" w="sm" len="sm"/>
-          </a:ln>
-        </p:spPr>
-      </p:cxnSp>
-      <p:sp>
-        <p:nvSpPr>
-          <p:cNvPr id="89" name="Google Shape;694;p64">
-            <a:extLst>
-              <a:ext uri="{FF2B5EF4-FFF2-40B4-BE49-F238E27FC236}">
-                <a16:creationId xmlns:a16="http://schemas.microsoft.com/office/drawing/2014/main" id="{F8D66629-A51B-6E45-A182-D0AA59EE5B6C}"/>
-              </a:ext>
-            </a:extLst>
-          </p:cNvPr>
-          <p:cNvSpPr txBox="1"/>
-          <p:nvPr/>
-        </p:nvSpPr>
-        <p:spPr>
-          <a:xfrm>
-            <a:off x="7078910" y="3097110"/>
-            <a:ext cx="604801" cy="400400"/>
-          </a:xfrm>
-          <a:prstGeom prst="rect">
-            <a:avLst/>
-          </a:prstGeom>
-          <a:noFill/>
-          <a:ln>
-            <a:noFill/>
-          </a:ln>
-        </p:spPr>
-        <p:txBody>
-          <a:bodyPr spcFirstLastPara="1" wrap="square" lIns="91433" tIns="45700" rIns="91433" bIns="45700" anchor="t" anchorCtr="0">
-            <a:noAutofit/>
-          </a:bodyPr>
-          <a:lstStyle/>
-          <a:p>
-            <a:pPr algn="ctr"/>
-            <a:r>
-              <a:rPr lang="en" sz="2000" dirty="0">
-                <a:solidFill>
-                  <a:schemeClr val="dk1"/>
-                </a:solidFill>
-                <a:latin typeface="Calibri"/>
-                <a:ea typeface="Calibri"/>
-                <a:cs typeface="Calibri"/>
-                <a:sym typeface="Calibri"/>
-              </a:rPr>
-              <a:t>6</a:t>
-            </a:r>
-            <a:endParaRPr sz="1467" dirty="0"/>
-          </a:p>
-        </p:txBody>
-      </p:sp>
-      <p:cxnSp>
-        <p:nvCxnSpPr>
-          <p:cNvPr id="90" name="Google Shape;680;p64">
-            <a:extLst>
-              <a:ext uri="{FF2B5EF4-FFF2-40B4-BE49-F238E27FC236}">
-                <a16:creationId xmlns:a16="http://schemas.microsoft.com/office/drawing/2014/main" id="{01A1FD0D-B0C3-9947-A296-CF9A1004A30F}"/>
-              </a:ext>
-            </a:extLst>
-          </p:cNvPr>
-          <p:cNvCxnSpPr/>
-          <p:nvPr/>
-        </p:nvCxnSpPr>
-        <p:spPr>
-          <a:xfrm>
-            <a:off x="6133134" y="2621622"/>
-            <a:ext cx="0" cy="528002"/>
-          </a:xfrm>
-          <a:prstGeom prst="straightConnector1">
-            <a:avLst/>
-          </a:prstGeom>
-          <a:noFill/>
-          <a:ln w="28575" cap="flat" cmpd="sng">
-            <a:solidFill>
-              <a:schemeClr val="dk1"/>
-            </a:solidFill>
-            <a:prstDash val="solid"/>
-            <a:miter lim="800000"/>
-            <a:headEnd type="none" w="sm" len="sm"/>
-            <a:tailEnd type="none" w="sm" len="sm"/>
-          </a:ln>
-        </p:spPr>
-      </p:cxnSp>
-      <p:cxnSp>
-        <p:nvCxnSpPr>
-          <p:cNvPr id="91" name="Google Shape;681;p64">
-            <a:extLst>
-              <a:ext uri="{FF2B5EF4-FFF2-40B4-BE49-F238E27FC236}">
-                <a16:creationId xmlns:a16="http://schemas.microsoft.com/office/drawing/2014/main" id="{98C7B616-A064-014C-9C20-B4D7F12721B9}"/>
-              </a:ext>
-            </a:extLst>
-          </p:cNvPr>
-          <p:cNvCxnSpPr/>
-          <p:nvPr/>
-        </p:nvCxnSpPr>
-        <p:spPr>
-          <a:xfrm>
-            <a:off x="7388850" y="2621622"/>
-            <a:ext cx="0" cy="528002"/>
-          </a:xfrm>
-          <a:prstGeom prst="straightConnector1">
-            <a:avLst/>
-          </a:prstGeom>
-          <a:noFill/>
-          <a:ln w="28575" cap="flat" cmpd="sng">
-            <a:solidFill>
-              <a:schemeClr val="dk1"/>
-            </a:solidFill>
-            <a:prstDash val="solid"/>
-            <a:miter lim="800000"/>
-            <a:headEnd type="none" w="sm" len="sm"/>
-            <a:tailEnd type="none" w="sm" len="sm"/>
-          </a:ln>
-        </p:spPr>
-      </p:cxnSp>
-      <p:cxnSp>
-        <p:nvCxnSpPr>
-          <p:cNvPr id="96" name="Google Shape;689;p64">
-            <a:extLst>
-              <a:ext uri="{FF2B5EF4-FFF2-40B4-BE49-F238E27FC236}">
-                <a16:creationId xmlns:a16="http://schemas.microsoft.com/office/drawing/2014/main" id="{AC768992-10CB-4440-A429-37763064731E}"/>
-              </a:ext>
-            </a:extLst>
-          </p:cNvPr>
-          <p:cNvCxnSpPr/>
-          <p:nvPr/>
-        </p:nvCxnSpPr>
-        <p:spPr>
-          <a:xfrm>
-            <a:off x="5714562" y="2621622"/>
-            <a:ext cx="0" cy="528002"/>
-          </a:xfrm>
-          <a:prstGeom prst="straightConnector1">
-            <a:avLst/>
-          </a:prstGeom>
-          <a:noFill/>
-          <a:ln w="28575" cap="flat" cmpd="sng">
-            <a:solidFill>
-              <a:schemeClr val="dk1"/>
-            </a:solidFill>
-            <a:prstDash val="solid"/>
-            <a:miter lim="800000"/>
-            <a:headEnd type="none" w="sm" len="sm"/>
-            <a:tailEnd type="none" w="sm" len="sm"/>
-          </a:ln>
-        </p:spPr>
-      </p:cxnSp>
-      <p:cxnSp>
-        <p:nvCxnSpPr>
-          <p:cNvPr id="99" name="Google Shape;690;p64">
-            <a:extLst>
-              <a:ext uri="{FF2B5EF4-FFF2-40B4-BE49-F238E27FC236}">
-                <a16:creationId xmlns:a16="http://schemas.microsoft.com/office/drawing/2014/main" id="{30EA6F60-895A-9A41-A40D-19D7C9109ED5}"/>
-              </a:ext>
-            </a:extLst>
-          </p:cNvPr>
-          <p:cNvCxnSpPr/>
-          <p:nvPr/>
-        </p:nvCxnSpPr>
-        <p:spPr>
-          <a:xfrm>
-            <a:off x="6551706" y="2621622"/>
-            <a:ext cx="0" cy="528002"/>
-          </a:xfrm>
-          <a:prstGeom prst="straightConnector1">
-            <a:avLst/>
-          </a:prstGeom>
-          <a:noFill/>
-          <a:ln w="28575" cap="flat" cmpd="sng">
-            <a:solidFill>
-              <a:schemeClr val="dk1"/>
-            </a:solidFill>
-            <a:prstDash val="solid"/>
-            <a:miter lim="800000"/>
-            <a:headEnd type="none" w="sm" len="sm"/>
-            <a:tailEnd type="none" w="sm" len="sm"/>
-          </a:ln>
-        </p:spPr>
-      </p:cxnSp>
-      <p:cxnSp>
-        <p:nvCxnSpPr>
-          <p:cNvPr id="100" name="Google Shape;691;p64">
-            <a:extLst>
-              <a:ext uri="{FF2B5EF4-FFF2-40B4-BE49-F238E27FC236}">
-                <a16:creationId xmlns:a16="http://schemas.microsoft.com/office/drawing/2014/main" id="{A1F34FEB-63CB-1444-84A0-D6361C4F5EA4}"/>
-              </a:ext>
-            </a:extLst>
-          </p:cNvPr>
-          <p:cNvCxnSpPr/>
-          <p:nvPr/>
-        </p:nvCxnSpPr>
-        <p:spPr>
-          <a:xfrm>
-            <a:off x="6970278" y="2621622"/>
-            <a:ext cx="0" cy="528002"/>
-          </a:xfrm>
-          <a:prstGeom prst="straightConnector1">
-            <a:avLst/>
-          </a:prstGeom>
-          <a:noFill/>
-          <a:ln w="28575" cap="flat" cmpd="sng">
-            <a:solidFill>
-              <a:schemeClr val="dk1"/>
-            </a:solidFill>
-            <a:prstDash val="solid"/>
-            <a:miter lim="800000"/>
-            <a:headEnd type="none" w="sm" len="sm"/>
-            <a:tailEnd type="none" w="sm" len="sm"/>
-          </a:ln>
-        </p:spPr>
-      </p:cxnSp>
-      <p:cxnSp>
-        <p:nvCxnSpPr>
-          <p:cNvPr id="101" name="Google Shape;680;p64">
-            <a:extLst>
-              <a:ext uri="{FF2B5EF4-FFF2-40B4-BE49-F238E27FC236}">
-                <a16:creationId xmlns:a16="http://schemas.microsoft.com/office/drawing/2014/main" id="{9D8A51DF-06E6-4243-9F9C-AC59C0EADFA1}"/>
-              </a:ext>
-            </a:extLst>
-          </p:cNvPr>
-          <p:cNvCxnSpPr/>
-          <p:nvPr/>
-        </p:nvCxnSpPr>
-        <p:spPr>
-          <a:xfrm>
-            <a:off x="7763828" y="2621622"/>
-            <a:ext cx="0" cy="528002"/>
+            <a:off x="2654771" y="946401"/>
+            <a:ext cx="0" cy="423476"/>
           </a:xfrm>
           <a:prstGeom prst="straightConnector1">
             <a:avLst/>
@@ -4866,8 +4052,8 @@
         </p:nvCxnSpPr>
         <p:spPr>
           <a:xfrm>
-            <a:off x="9019544" y="2621622"/>
-            <a:ext cx="0" cy="528002"/>
+            <a:off x="5300914" y="982131"/>
+            <a:ext cx="0" cy="423476"/>
           </a:xfrm>
           <a:prstGeom prst="straightConnector1">
             <a:avLst/>
@@ -4884,76 +4070,12 @@
           </a:ln>
         </p:spPr>
       </p:cxnSp>
-      <p:cxnSp>
-        <p:nvCxnSpPr>
-          <p:cNvPr id="103" name="Google Shape;690;p64">
+      <p:sp>
+        <p:nvSpPr>
+          <p:cNvPr id="106" name="Google Shape;694;p64">
             <a:extLst>
               <a:ext uri="{FF2B5EF4-FFF2-40B4-BE49-F238E27FC236}">
-                <a16:creationId xmlns:a16="http://schemas.microsoft.com/office/drawing/2014/main" id="{940976A7-F068-9843-B536-DD359F616FCB}"/>
-              </a:ext>
-            </a:extLst>
-          </p:cNvPr>
-          <p:cNvCxnSpPr/>
-          <p:nvPr/>
-        </p:nvCxnSpPr>
-        <p:spPr>
-          <a:xfrm>
-            <a:off x="8182400" y="2621622"/>
-            <a:ext cx="0" cy="528002"/>
-          </a:xfrm>
-          <a:prstGeom prst="straightConnector1">
-            <a:avLst/>
-          </a:prstGeom>
-          <a:noFill/>
-          <a:ln w="28575" cap="flat" cmpd="sng">
-            <a:solidFill>
-              <a:schemeClr val="dk1"/>
-            </a:solidFill>
-            <a:prstDash val="solid"/>
-            <a:miter lim="800000"/>
-            <a:headEnd type="none" w="sm" len="sm"/>
-            <a:tailEnd type="none" w="sm" len="sm"/>
-          </a:ln>
-        </p:spPr>
-      </p:cxnSp>
-      <p:cxnSp>
-        <p:nvCxnSpPr>
-          <p:cNvPr id="104" name="Google Shape;691;p64">
-            <a:extLst>
-              <a:ext uri="{FF2B5EF4-FFF2-40B4-BE49-F238E27FC236}">
-                <a16:creationId xmlns:a16="http://schemas.microsoft.com/office/drawing/2014/main" id="{692329A3-79D0-DD47-95D7-3C232667D819}"/>
-              </a:ext>
-            </a:extLst>
-          </p:cNvPr>
-          <p:cNvCxnSpPr/>
-          <p:nvPr/>
-        </p:nvCxnSpPr>
-        <p:spPr>
-          <a:xfrm>
-            <a:off x="8600972" y="2621622"/>
-            <a:ext cx="0" cy="528002"/>
-          </a:xfrm>
-          <a:prstGeom prst="straightConnector1">
-            <a:avLst/>
-          </a:prstGeom>
-          <a:noFill/>
-          <a:ln w="28575" cap="flat" cmpd="sng">
-            <a:solidFill>
-              <a:schemeClr val="dk1"/>
-            </a:solidFill>
-            <a:prstDash val="solid"/>
-            <a:miter lim="800000"/>
-            <a:headEnd type="none" w="sm" len="sm"/>
-            <a:tailEnd type="none" w="sm" len="sm"/>
-          </a:ln>
-        </p:spPr>
-      </p:cxnSp>
-      <p:sp>
-        <p:nvSpPr>
-          <p:cNvPr id="105" name="Google Shape;694;p64">
-            <a:extLst>
-              <a:ext uri="{FF2B5EF4-FFF2-40B4-BE49-F238E27FC236}">
-                <a16:creationId xmlns:a16="http://schemas.microsoft.com/office/drawing/2014/main" id="{2F6BD188-7BBD-584F-8DC8-7F3AB3DE8CE0}"/>
+                <a16:creationId xmlns:a16="http://schemas.microsoft.com/office/drawing/2014/main" id="{6E3C588D-2F32-4344-9E55-9938FE26A530}"/>
               </a:ext>
             </a:extLst>
           </p:cNvPr>
@@ -4962,8 +4084,8 @@
         </p:nvSpPr>
         <p:spPr>
           <a:xfrm>
-            <a:off x="7878886" y="3097110"/>
-            <a:ext cx="604801" cy="400400"/>
+            <a:off x="5058700" y="1320823"/>
+            <a:ext cx="485069" cy="321135"/>
           </a:xfrm>
           <a:prstGeom prst="rect">
             <a:avLst/>
@@ -4974,14 +4096,14 @@
           </a:ln>
         </p:spPr>
         <p:txBody>
-          <a:bodyPr spcFirstLastPara="1" wrap="square" lIns="91433" tIns="45700" rIns="91433" bIns="45700" anchor="t" anchorCtr="0">
+          <a:bodyPr spcFirstLastPara="1" wrap="square" lIns="73332" tIns="36652" rIns="73332" bIns="36652" anchor="t" anchorCtr="0">
             <a:noAutofit/>
           </a:bodyPr>
           <a:lstStyle/>
           <a:p>
             <a:pPr algn="ctr"/>
             <a:r>
-              <a:rPr lang="en" sz="2000" dirty="0">
+              <a:rPr lang="en" sz="1604" dirty="0">
                 <a:solidFill>
                   <a:schemeClr val="dk1"/>
                 </a:solidFill>
@@ -4989,28 +4111,31 @@
                 <a:cs typeface="Calibri"/>
                 <a:sym typeface="Calibri"/>
               </a:rPr>
-              <a:t>8</a:t>
-            </a:r>
-            <a:endParaRPr sz="1467" dirty="0"/>
-          </a:p>
-        </p:txBody>
-      </p:sp>
-      <p:sp>
-        <p:nvSpPr>
-          <p:cNvPr id="106" name="Google Shape;694;p64">
+              <a:t>10</a:t>
+            </a:r>
+          </a:p>
+          <a:p>
+            <a:pPr algn="ctr"/>
+            <a:endParaRPr sz="1177" dirty="0"/>
+          </a:p>
+        </p:txBody>
+      </p:sp>
+      <p:sp>
+        <p:nvSpPr>
+          <p:cNvPr id="107" name="Google Shape;658;p64">
             <a:extLst>
               <a:ext uri="{FF2B5EF4-FFF2-40B4-BE49-F238E27FC236}">
-                <a16:creationId xmlns:a16="http://schemas.microsoft.com/office/drawing/2014/main" id="{6E3C588D-2F32-4344-9E55-9938FE26A530}"/>
+                <a16:creationId xmlns:a16="http://schemas.microsoft.com/office/drawing/2014/main" id="{ECEF656C-0434-B74F-9129-A24EE5ADACBF}"/>
               </a:ext>
             </a:extLst>
           </p:cNvPr>
-          <p:cNvSpPr txBox="1"/>
+          <p:cNvSpPr/>
           <p:nvPr/>
         </p:nvSpPr>
         <p:spPr>
           <a:xfrm>
-            <a:off x="8710804" y="3097110"/>
-            <a:ext cx="604801" cy="400400"/>
+            <a:off x="1326726" y="1594328"/>
+            <a:ext cx="1171289" cy="419624"/>
           </a:xfrm>
           <a:prstGeom prst="rect">
             <a:avLst/>
@@ -5021,64 +4146,14 @@
           </a:ln>
         </p:spPr>
         <p:txBody>
-          <a:bodyPr spcFirstLastPara="1" wrap="square" lIns="91433" tIns="45700" rIns="91433" bIns="45700" anchor="t" anchorCtr="0">
+          <a:bodyPr spcFirstLastPara="1" wrap="square" lIns="73332" tIns="36652" rIns="73332" bIns="36652" anchor="t" anchorCtr="0">
             <a:noAutofit/>
           </a:bodyPr>
           <a:lstStyle/>
           <a:p>
             <a:pPr algn="ctr"/>
             <a:r>
-              <a:rPr lang="en" sz="2000" dirty="0">
-                <a:solidFill>
-                  <a:schemeClr val="dk1"/>
-                </a:solidFill>
-                <a:latin typeface="Calibri"/>
-                <a:cs typeface="Calibri"/>
-                <a:sym typeface="Calibri"/>
-              </a:rPr>
-              <a:t>10</a:t>
-            </a:r>
-          </a:p>
-          <a:p>
-            <a:pPr algn="ctr"/>
-            <a:endParaRPr sz="1467" dirty="0"/>
-          </a:p>
-        </p:txBody>
-      </p:sp>
-      <p:sp>
-        <p:nvSpPr>
-          <p:cNvPr id="107" name="Google Shape;658;p64">
-            <a:extLst>
-              <a:ext uri="{FF2B5EF4-FFF2-40B4-BE49-F238E27FC236}">
-                <a16:creationId xmlns:a16="http://schemas.microsoft.com/office/drawing/2014/main" id="{ECEF656C-0434-B74F-9129-A24EE5ADACBF}"/>
-              </a:ext>
-            </a:extLst>
-          </p:cNvPr>
-          <p:cNvSpPr/>
-          <p:nvPr/>
-        </p:nvSpPr>
-        <p:spPr>
-          <a:xfrm>
-            <a:off x="3756695" y="4451972"/>
-            <a:ext cx="1460400" cy="523200"/>
-          </a:xfrm>
-          <a:prstGeom prst="rect">
-            <a:avLst/>
-          </a:prstGeom>
-          <a:noFill/>
-          <a:ln>
-            <a:noFill/>
-          </a:ln>
-        </p:spPr>
-        <p:txBody>
-          <a:bodyPr spcFirstLastPara="1" wrap="square" lIns="91433" tIns="45700" rIns="91433" bIns="45700" anchor="t" anchorCtr="0">
-            <a:noAutofit/>
-          </a:bodyPr>
-          <a:lstStyle/>
-          <a:p>
-            <a:pPr algn="ctr"/>
-            <a:r>
-              <a:rPr lang="en" sz="1467" dirty="0" err="1">
+              <a:rPr lang="en" sz="1177" dirty="0" err="1">
                 <a:latin typeface="Calibri"/>
                 <a:ea typeface="Calibri"/>
                 <a:cs typeface="Calibri"/>
@@ -5087,7 +4162,7 @@
               <a:t>Clind</a:t>
             </a:r>
             <a:r>
-              <a:rPr lang="en" sz="1467" dirty="0">
+              <a:rPr lang="en" sz="1177" dirty="0">
                 <a:latin typeface="Calibri"/>
                 <a:ea typeface="Calibri"/>
                 <a:cs typeface="Calibri"/>
@@ -5095,12 +4170,12 @@
               </a:rPr>
               <a:t>.</a:t>
             </a:r>
-            <a:endParaRPr sz="1467" dirty="0"/>
+            <a:endParaRPr sz="1177" dirty="0"/>
           </a:p>
           <a:p>
             <a:pPr algn="ctr"/>
             <a:r>
-              <a:rPr lang="en" sz="1467" dirty="0">
+              <a:rPr lang="en" sz="1177" dirty="0">
                 <a:latin typeface="Calibri"/>
                 <a:ea typeface="Calibri"/>
                 <a:cs typeface="Calibri"/>
@@ -5108,7 +4183,7 @@
               </a:rPr>
               <a:t>IP</a:t>
             </a:r>
-            <a:endParaRPr sz="1467" dirty="0"/>
+            <a:endParaRPr sz="1177" dirty="0"/>
           </a:p>
         </p:txBody>
       </p:sp>
@@ -5126,8 +4201,8 @@
         </p:nvSpPr>
         <p:spPr>
           <a:xfrm rot="10800000">
-            <a:off x="4368821" y="3444965"/>
-            <a:ext cx="208000" cy="1038001"/>
+            <a:off x="2068736" y="1599813"/>
+            <a:ext cx="161209" cy="264482"/>
           </a:xfrm>
           <a:prstGeom prst="downArrow">
             <a:avLst>
@@ -5149,13 +4224,13 @@
           </a:ln>
         </p:spPr>
         <p:txBody>
-          <a:bodyPr spcFirstLastPara="1" wrap="square" lIns="91433" tIns="45700" rIns="91433" bIns="45700" anchor="ctr" anchorCtr="0">
+          <a:bodyPr spcFirstLastPara="1" wrap="square" lIns="73332" tIns="36652" rIns="73332" bIns="36652" anchor="ctr" anchorCtr="0">
             <a:noAutofit/>
           </a:bodyPr>
           <a:lstStyle/>
           <a:p>
             <a:pPr algn="ctr"/>
-            <a:endParaRPr sz="1867">
+            <a:endParaRPr sz="1496">
               <a:solidFill>
                 <a:schemeClr val="lt1"/>
               </a:solidFill>
@@ -5181,8 +4256,8 @@
         </p:nvSpPr>
         <p:spPr>
           <a:xfrm>
-            <a:off x="3384860" y="3097110"/>
-            <a:ext cx="434800" cy="400400"/>
+            <a:off x="1029335" y="1320823"/>
+            <a:ext cx="348724" cy="321135"/>
           </a:xfrm>
           <a:prstGeom prst="rect">
             <a:avLst/>
@@ -5193,14 +4268,14 @@
           </a:ln>
         </p:spPr>
         <p:txBody>
-          <a:bodyPr spcFirstLastPara="1" wrap="square" lIns="91433" tIns="45700" rIns="91433" bIns="45700" anchor="t" anchorCtr="0">
+          <a:bodyPr spcFirstLastPara="1" wrap="square" lIns="73332" tIns="36652" rIns="73332" bIns="36652" anchor="t" anchorCtr="0">
             <a:noAutofit/>
           </a:bodyPr>
           <a:lstStyle/>
           <a:p>
             <a:pPr algn="ctr"/>
             <a:r>
-              <a:rPr lang="en" sz="2000" dirty="0">
+              <a:rPr lang="en" sz="1604" dirty="0">
                 <a:solidFill>
                   <a:schemeClr val="dk1"/>
                 </a:solidFill>
@@ -5211,7 +4286,7 @@
               </a:rPr>
               <a:t>-3</a:t>
             </a:r>
-            <a:endParaRPr sz="1467" dirty="0"/>
+            <a:endParaRPr sz="1177" dirty="0"/>
           </a:p>
         </p:txBody>
       </p:sp>
@@ -5229,8 +4304,8 @@
         </p:nvSpPr>
         <p:spPr>
           <a:xfrm>
-            <a:off x="2294869" y="577824"/>
-            <a:ext cx="5158560" cy="1361987"/>
+            <a:off x="141350" y="1690756"/>
+            <a:ext cx="4137333" cy="1092359"/>
           </a:xfrm>
           <a:prstGeom prst="rect">
             <a:avLst/>
@@ -5241,13 +4316,13 @@
           </a:ln>
         </p:spPr>
         <p:txBody>
-          <a:bodyPr spcFirstLastPara="1" wrap="square" lIns="91433" tIns="45700" rIns="91433" bIns="45700" anchor="t" anchorCtr="0">
+          <a:bodyPr spcFirstLastPara="1" wrap="square" lIns="73332" tIns="36652" rIns="73332" bIns="36652" anchor="t" anchorCtr="0">
             <a:noAutofit/>
           </a:bodyPr>
           <a:lstStyle/>
           <a:p>
             <a:r>
-              <a:rPr lang="en" sz="2000" b="1" u="sng" dirty="0">
+              <a:rPr lang="en" sz="1604" b="1" u="sng" dirty="0">
                 <a:solidFill>
                   <a:schemeClr val="dk1"/>
                 </a:solidFill>
@@ -5258,7 +4333,7 @@
               </a:rPr>
               <a:t>Groups</a:t>
             </a:r>
-            <a:endParaRPr lang="en-US" sz="2000" dirty="0">
+            <a:endParaRPr lang="en-US" sz="1604" dirty="0">
               <a:solidFill>
                 <a:schemeClr val="dk1"/>
               </a:solidFill>
@@ -5269,7 +4344,7 @@
           </a:p>
           <a:p>
             <a:r>
-              <a:rPr lang="en-US" sz="2000" dirty="0">
+              <a:rPr lang="en-US" sz="1604" dirty="0">
                 <a:solidFill>
                   <a:srgbClr val="238B45"/>
                 </a:solidFill>
@@ -5282,7 +4357,7 @@
           </a:p>
           <a:p>
             <a:r>
-              <a:rPr lang="en-US" sz="2000" dirty="0">
+              <a:rPr lang="en-US" sz="1604" dirty="0">
                 <a:solidFill>
                   <a:srgbClr val="88419D"/>
                 </a:solidFill>
@@ -5293,7 +4368,7 @@
               <a:t>1-day of 15% PEG 3350 in drinking water (N = 6) </a:t>
             </a:r>
             <a:r>
-              <a:rPr lang="en-US" sz="2000" dirty="0">
+              <a:rPr lang="en-US" sz="1604" dirty="0">
                 <a:solidFill>
                   <a:schemeClr val="dk1"/>
                 </a:solidFill>
@@ -5306,7 +4381,7 @@
           </a:p>
           <a:p>
             <a:r>
-              <a:rPr lang="en-US" sz="2000" dirty="0">
+              <a:rPr lang="en-US" sz="1604" dirty="0">
                 <a:solidFill>
                   <a:srgbClr val="225EA8"/>
                 </a:solidFill>
@@ -5317,7 +4392,7 @@
               <a:t>1-day PEG 3350 + 1-day recovery (N = 6)</a:t>
             </a:r>
             <a:br>
-              <a:rPr lang="en-US" sz="2000" dirty="0">
+              <a:rPr lang="en-US" sz="1604" dirty="0">
                 <a:solidFill>
                   <a:srgbClr val="225EA8"/>
                 </a:solidFill>
@@ -5326,7 +4401,7 @@
                 <a:sym typeface="Calibri"/>
               </a:rPr>
             </a:br>
-            <a:endParaRPr lang="en-US" sz="2000" dirty="0">
+            <a:endParaRPr lang="en-US" sz="1604" dirty="0">
               <a:solidFill>
                 <a:schemeClr val="dk1"/>
               </a:solidFill>
@@ -5351,8 +4426,8 @@
         </p:nvSpPr>
         <p:spPr>
           <a:xfrm>
-            <a:off x="3793918" y="3091358"/>
-            <a:ext cx="434800" cy="400400"/>
+            <a:off x="1494459" y="1315986"/>
+            <a:ext cx="348724" cy="321135"/>
           </a:xfrm>
           <a:prstGeom prst="rect">
             <a:avLst/>
@@ -5363,14 +4438,14 @@
           </a:ln>
         </p:spPr>
         <p:txBody>
-          <a:bodyPr spcFirstLastPara="1" wrap="square" lIns="91433" tIns="45700" rIns="91433" bIns="45700" anchor="t" anchorCtr="0">
+          <a:bodyPr spcFirstLastPara="1" wrap="square" lIns="73332" tIns="36652" rIns="73332" bIns="36652" anchor="t" anchorCtr="0">
             <a:noAutofit/>
           </a:bodyPr>
           <a:lstStyle/>
           <a:p>
             <a:pPr algn="ctr"/>
             <a:r>
-              <a:rPr lang="en" sz="2000" dirty="0">
+              <a:rPr lang="en" sz="1604" dirty="0">
                 <a:solidFill>
                   <a:schemeClr val="dk1"/>
                 </a:solidFill>
@@ -5381,7 +4456,7 @@
               </a:rPr>
               <a:t>-2</a:t>
             </a:r>
-            <a:endParaRPr sz="1467" dirty="0"/>
+            <a:endParaRPr sz="1177" dirty="0"/>
           </a:p>
         </p:txBody>
       </p:sp>
@@ -5399,9 +4474,9 @@
         </p:nvGrpSpPr>
         <p:grpSpPr>
           <a:xfrm>
-            <a:off x="4399835" y="2035307"/>
-            <a:ext cx="613590" cy="490016"/>
-            <a:chOff x="1250078" y="2409098"/>
+            <a:off x="2185953" y="469537"/>
+            <a:ext cx="660320" cy="393010"/>
+            <a:chOff x="1324142" y="2409098"/>
             <a:chExt cx="741504" cy="490016"/>
           </a:xfrm>
         </p:grpSpPr>
@@ -5442,13 +4517,13 @@
             </a:ln>
           </p:spPr>
           <p:txBody>
-            <a:bodyPr spcFirstLastPara="1" wrap="square" lIns="91433" tIns="45700" rIns="91433" bIns="45700" anchor="ctr" anchorCtr="0">
+            <a:bodyPr spcFirstLastPara="1" wrap="square" lIns="73332" tIns="36652" rIns="73332" bIns="36652" anchor="ctr" anchorCtr="0">
               <a:noAutofit/>
             </a:bodyPr>
             <a:lstStyle/>
             <a:p>
               <a:pPr algn="ctr"/>
-              <a:endParaRPr sz="1867" dirty="0">
+              <a:endParaRPr sz="1496" dirty="0">
                 <a:solidFill>
                   <a:schemeClr val="lt1"/>
                 </a:solidFill>
@@ -5474,7 +4549,7 @@
           </p:nvSpPr>
           <p:spPr>
             <a:xfrm>
-              <a:off x="1250078" y="2471828"/>
+              <a:off x="1324142" y="2478517"/>
               <a:ext cx="741504" cy="337083"/>
             </a:xfrm>
             <a:prstGeom prst="rect">
@@ -5486,13 +4561,13 @@
             </a:ln>
           </p:spPr>
           <p:txBody>
-            <a:bodyPr spcFirstLastPara="1" wrap="square" lIns="91433" tIns="45700" rIns="91433" bIns="45700" anchor="t" anchorCtr="0">
+            <a:bodyPr spcFirstLastPara="1" wrap="square" lIns="73332" tIns="36652" rIns="73332" bIns="36652" anchor="t" anchorCtr="0">
               <a:noAutofit/>
             </a:bodyPr>
             <a:lstStyle/>
             <a:p>
               <a:r>
-                <a:rPr lang="en-US" dirty="0">
+                <a:rPr lang="en-US" sz="1171" dirty="0">
                   <a:solidFill>
                     <a:schemeClr val="bg1"/>
                   </a:solidFill>
@@ -5508,20 +4583,20 @@
       </p:grpSp>
       <p:sp>
         <p:nvSpPr>
-          <p:cNvPr id="116" name="Google Shape;699;p64">
+          <p:cNvPr id="118" name="Google Shape;656;p64">
             <a:extLst>
               <a:ext uri="{FF2B5EF4-FFF2-40B4-BE49-F238E27FC236}">
-                <a16:creationId xmlns:a16="http://schemas.microsoft.com/office/drawing/2014/main" id="{51F1323C-3AD3-1241-9820-5DD6E193DD1C}"/>
+                <a16:creationId xmlns:a16="http://schemas.microsoft.com/office/drawing/2014/main" id="{65941FD9-28C1-8D4C-9E1D-A34C1F0B2926}"/>
               </a:ext>
             </a:extLst>
           </p:cNvPr>
-          <p:cNvSpPr/>
+          <p:cNvSpPr txBox="1"/>
           <p:nvPr/>
         </p:nvSpPr>
         <p:spPr>
           <a:xfrm>
-            <a:off x="7825887" y="1292467"/>
-            <a:ext cx="1315600" cy="369200"/>
+            <a:off x="2663561" y="1560866"/>
+            <a:ext cx="1344528" cy="419624"/>
           </a:xfrm>
           <a:prstGeom prst="rect">
             <a:avLst/>
@@ -5532,22 +4607,41 @@
           </a:ln>
         </p:spPr>
         <p:txBody>
-          <a:bodyPr spcFirstLastPara="1" wrap="square" lIns="91433" tIns="45700" rIns="91433" bIns="45700" anchor="t" anchorCtr="0">
+          <a:bodyPr spcFirstLastPara="1" wrap="square" lIns="73332" tIns="36652" rIns="73332" bIns="36652" anchor="t" anchorCtr="0">
             <a:noAutofit/>
           </a:bodyPr>
           <a:lstStyle/>
           <a:p>
-            <a:r>
-              <a:rPr lang="en" sz="1867" dirty="0">
+            <a:pPr algn="ctr"/>
+            <a:r>
+              <a:rPr lang="en" sz="1177" dirty="0">
                 <a:latin typeface="Calibri"/>
                 <a:ea typeface="Calibri"/>
                 <a:cs typeface="Calibri"/>
                 <a:sym typeface="Calibri"/>
               </a:rPr>
-              <a:t>+ </a:t>
-            </a:r>
-            <a:r>
-              <a:rPr lang="en" sz="1867" i="1" dirty="0">
+              <a:t>Gavage 10</a:t>
+            </a:r>
+            <a:r>
+              <a:rPr lang="en" sz="1177" baseline="30000" dirty="0">
+                <a:latin typeface="Calibri"/>
+                <a:ea typeface="Calibri"/>
+                <a:cs typeface="Calibri"/>
+                <a:sym typeface="Calibri"/>
+              </a:rPr>
+              <a:t>5</a:t>
+            </a:r>
+            <a:r>
+              <a:rPr lang="en" sz="1177" dirty="0">
+                <a:latin typeface="Calibri"/>
+                <a:ea typeface="Calibri"/>
+                <a:cs typeface="Calibri"/>
+                <a:sym typeface="Calibri"/>
+              </a:rPr>
+              <a:t> spores </a:t>
+            </a:r>
+            <a:r>
+              <a:rPr lang="en" sz="1177" i="1" dirty="0">
                 <a:latin typeface="Calibri"/>
                 <a:ea typeface="Calibri"/>
                 <a:cs typeface="Calibri"/>
@@ -5555,148 +4649,8 @@
               </a:rPr>
               <a:t>C. difficile </a:t>
             </a:r>
-            <a:endParaRPr sz="1867" dirty="0">
-              <a:latin typeface="Calibri"/>
-              <a:ea typeface="Calibri"/>
-              <a:cs typeface="Calibri"/>
-              <a:sym typeface="Calibri"/>
-            </a:endParaRPr>
-          </a:p>
-        </p:txBody>
-      </p:sp>
-      <p:sp>
-        <p:nvSpPr>
-          <p:cNvPr id="117" name="Google Shape;654;p64">
-            <a:extLst>
-              <a:ext uri="{FF2B5EF4-FFF2-40B4-BE49-F238E27FC236}">
-                <a16:creationId xmlns:a16="http://schemas.microsoft.com/office/drawing/2014/main" id="{5604854B-3DB2-CF4B-8DFE-AA71B444B92D}"/>
-              </a:ext>
-            </a:extLst>
-          </p:cNvPr>
-          <p:cNvSpPr txBox="1"/>
-          <p:nvPr/>
-        </p:nvSpPr>
-        <p:spPr>
-          <a:xfrm>
-            <a:off x="4865607" y="4259699"/>
-            <a:ext cx="3933200" cy="338800"/>
-          </a:xfrm>
-          <a:prstGeom prst="rect">
-            <a:avLst/>
-          </a:prstGeom>
-          <a:noFill/>
-          <a:ln>
-            <a:noFill/>
-          </a:ln>
-        </p:spPr>
-        <p:txBody>
-          <a:bodyPr spcFirstLastPara="1" wrap="square" lIns="91433" tIns="45700" rIns="91433" bIns="45700" anchor="t" anchorCtr="0">
-            <a:noAutofit/>
-          </a:bodyPr>
-          <a:lstStyle/>
-          <a:p>
-            <a:pPr algn="ctr"/>
-            <a:r>
-              <a:rPr lang="en" sz="1600">
-                <a:latin typeface="Calibri"/>
-                <a:ea typeface="Calibri"/>
-                <a:cs typeface="Calibri"/>
-                <a:sym typeface="Calibri"/>
-              </a:rPr>
-              <a:t>Collect stool daily to monitor </a:t>
-            </a:r>
-            <a:r>
-              <a:rPr lang="en" sz="1600" i="1">
-                <a:latin typeface="Calibri"/>
-                <a:ea typeface="Calibri"/>
-                <a:cs typeface="Calibri"/>
-                <a:sym typeface="Calibri"/>
-              </a:rPr>
-              <a:t>C. difficile </a:t>
-            </a:r>
-            <a:r>
-              <a:rPr lang="en" sz="1600">
-                <a:latin typeface="Calibri"/>
-                <a:ea typeface="Calibri"/>
-                <a:cs typeface="Calibri"/>
-                <a:sym typeface="Calibri"/>
-              </a:rPr>
-              <a:t>CFU</a:t>
-            </a:r>
-            <a:endParaRPr sz="1467"/>
-          </a:p>
-        </p:txBody>
-      </p:sp>
-      <p:sp>
-        <p:nvSpPr>
-          <p:cNvPr id="118" name="Google Shape;656;p64">
-            <a:extLst>
-              <a:ext uri="{FF2B5EF4-FFF2-40B4-BE49-F238E27FC236}">
-                <a16:creationId xmlns:a16="http://schemas.microsoft.com/office/drawing/2014/main" id="{65941FD9-28C1-8D4C-9E1D-A34C1F0B2926}"/>
-              </a:ext>
-            </a:extLst>
-          </p:cNvPr>
-          <p:cNvSpPr txBox="1"/>
-          <p:nvPr/>
-        </p:nvSpPr>
-        <p:spPr>
-          <a:xfrm>
-            <a:off x="4159458" y="4921753"/>
-            <a:ext cx="1676400" cy="523200"/>
-          </a:xfrm>
-          <a:prstGeom prst="rect">
-            <a:avLst/>
-          </a:prstGeom>
-          <a:noFill/>
-          <a:ln>
-            <a:noFill/>
-          </a:ln>
-        </p:spPr>
-        <p:txBody>
-          <a:bodyPr spcFirstLastPara="1" wrap="square" lIns="91433" tIns="45700" rIns="91433" bIns="45700" anchor="t" anchorCtr="0">
-            <a:noAutofit/>
-          </a:bodyPr>
-          <a:lstStyle/>
-          <a:p>
-            <a:pPr algn="ctr"/>
-            <a:r>
-              <a:rPr lang="en" sz="1467" dirty="0">
-                <a:latin typeface="Calibri"/>
-                <a:ea typeface="Calibri"/>
-                <a:cs typeface="Calibri"/>
-                <a:sym typeface="Calibri"/>
-              </a:rPr>
-              <a:t>Gavage 10</a:t>
-            </a:r>
-            <a:r>
-              <a:rPr lang="en" sz="1467" baseline="30000" dirty="0">
-                <a:latin typeface="Calibri"/>
-                <a:ea typeface="Calibri"/>
-                <a:cs typeface="Calibri"/>
-                <a:sym typeface="Calibri"/>
-              </a:rPr>
-              <a:t>5</a:t>
-            </a:r>
-            <a:r>
-              <a:rPr lang="en" sz="1467" dirty="0">
-                <a:latin typeface="Calibri"/>
-                <a:ea typeface="Calibri"/>
-                <a:cs typeface="Calibri"/>
-                <a:sym typeface="Calibri"/>
-              </a:rPr>
-              <a:t> spores </a:t>
-            </a:r>
-            <a:r>
-              <a:rPr lang="en" sz="1467" i="1" dirty="0">
-                <a:latin typeface="Calibri"/>
-                <a:ea typeface="Calibri"/>
-                <a:cs typeface="Calibri"/>
-                <a:sym typeface="Calibri"/>
-              </a:rPr>
-              <a:t>C. difficile </a:t>
-            </a:r>
-            <a:r>
-              <a:rPr lang="en" sz="1467" dirty="0">
+            <a:r>
+              <a:rPr lang="en" sz="1177" dirty="0">
                 <a:latin typeface="Calibri"/>
                 <a:ea typeface="Calibri"/>
                 <a:cs typeface="Calibri"/>
@@ -5704,16 +4658,16 @@
               </a:rPr>
               <a:t>630</a:t>
             </a:r>
-            <a:endParaRPr sz="1467" dirty="0"/>
-          </a:p>
-        </p:txBody>
-      </p:sp>
-      <p:sp>
-        <p:nvSpPr>
-          <p:cNvPr id="119" name="Google Shape;668;p64">
+            <a:endParaRPr sz="1177" dirty="0"/>
+          </a:p>
+        </p:txBody>
+      </p:sp>
+      <p:sp>
+        <p:nvSpPr>
+          <p:cNvPr id="120" name="Google Shape;675;p64">
             <a:extLst>
               <a:ext uri="{FF2B5EF4-FFF2-40B4-BE49-F238E27FC236}">
-                <a16:creationId xmlns:a16="http://schemas.microsoft.com/office/drawing/2014/main" id="{F11A5BA8-1282-1D4E-8D45-17D28004E0B9}"/>
+                <a16:creationId xmlns:a16="http://schemas.microsoft.com/office/drawing/2014/main" id="{64610CCC-3534-BD4B-80EC-80129F609487}"/>
               </a:ext>
             </a:extLst>
           </p:cNvPr>
@@ -5721,9 +4675,9 @@
           <p:nvPr/>
         </p:nvSpPr>
         <p:spPr>
-          <a:xfrm rot="-5400000" flipH="1">
-            <a:off x="6803614" y="2132155"/>
-            <a:ext cx="311600" cy="4120257"/>
+          <a:xfrm rot="10800000">
+            <a:off x="2573373" y="1580158"/>
+            <a:ext cx="161208" cy="284128"/>
           </a:xfrm>
           <a:prstGeom prst="downArrow">
             <a:avLst>
@@ -5745,13 +4699,13 @@
           </a:ln>
         </p:spPr>
         <p:txBody>
-          <a:bodyPr spcFirstLastPara="1" wrap="square" lIns="91433" tIns="45700" rIns="91433" bIns="45700" anchor="ctr" anchorCtr="0">
+          <a:bodyPr spcFirstLastPara="1" wrap="square" lIns="73332" tIns="36652" rIns="73332" bIns="36652" anchor="ctr" anchorCtr="0">
             <a:noAutofit/>
           </a:bodyPr>
           <a:lstStyle/>
           <a:p>
             <a:pPr algn="ctr"/>
-            <a:endParaRPr sz="1867">
+            <a:endParaRPr sz="1496">
               <a:latin typeface="Calibri"/>
               <a:ea typeface="Calibri"/>
               <a:cs typeface="Calibri"/>
@@ -5762,10 +4716,10 @@
       </p:sp>
       <p:sp>
         <p:nvSpPr>
-          <p:cNvPr id="120" name="Google Shape;675;p64">
+          <p:cNvPr id="122" name="Google Shape;655;p64">
             <a:extLst>
               <a:ext uri="{FF2B5EF4-FFF2-40B4-BE49-F238E27FC236}">
-                <a16:creationId xmlns:a16="http://schemas.microsoft.com/office/drawing/2014/main" id="{64610CCC-3534-BD4B-80EC-80129F609487}"/>
+                <a16:creationId xmlns:a16="http://schemas.microsoft.com/office/drawing/2014/main" id="{ECEE8685-CB38-4A40-8315-AA60888B590D}"/>
               </a:ext>
             </a:extLst>
           </p:cNvPr>
@@ -5773,9 +4727,9 @@
           <p:nvPr/>
         </p:nvSpPr>
         <p:spPr>
-          <a:xfrm rot="10800000">
-            <a:off x="4795658" y="3453125"/>
-            <a:ext cx="202000" cy="1480400"/>
+          <a:xfrm flipH="1">
+            <a:off x="5200516" y="586438"/>
+            <a:ext cx="208097" cy="329838"/>
           </a:xfrm>
           <a:prstGeom prst="downArrow">
             <a:avLst>
@@ -5797,113 +4751,13 @@
           </a:ln>
         </p:spPr>
         <p:txBody>
-          <a:bodyPr spcFirstLastPara="1" wrap="square" lIns="91433" tIns="45700" rIns="91433" bIns="45700" anchor="ctr" anchorCtr="0">
+          <a:bodyPr spcFirstLastPara="1" wrap="square" lIns="73332" tIns="36652" rIns="73332" bIns="36652" anchor="ctr" anchorCtr="0">
             <a:noAutofit/>
           </a:bodyPr>
           <a:lstStyle/>
           <a:p>
             <a:pPr algn="ctr"/>
-            <a:endParaRPr sz="1867">
-              <a:latin typeface="Calibri"/>
-              <a:ea typeface="Calibri"/>
-              <a:cs typeface="Calibri"/>
-              <a:sym typeface="Calibri"/>
-            </a:endParaRPr>
-          </a:p>
-        </p:txBody>
-      </p:sp>
-      <p:sp>
-        <p:nvSpPr>
-          <p:cNvPr id="121" name="Google Shape;676;p64">
-            <a:extLst>
-              <a:ext uri="{FF2B5EF4-FFF2-40B4-BE49-F238E27FC236}">
-                <a16:creationId xmlns:a16="http://schemas.microsoft.com/office/drawing/2014/main" id="{8CF9DC75-919F-CC4A-B600-1F7CBF5FC620}"/>
-              </a:ext>
-            </a:extLst>
-          </p:cNvPr>
-          <p:cNvSpPr/>
-          <p:nvPr/>
-        </p:nvSpPr>
-        <p:spPr>
-          <a:xfrm>
-            <a:off x="5958740" y="3419644"/>
-            <a:ext cx="1655200" cy="338800"/>
-          </a:xfrm>
-          <a:prstGeom prst="rect">
-            <a:avLst/>
-          </a:prstGeom>
-          <a:noFill/>
-          <a:ln>
-            <a:noFill/>
-          </a:ln>
-        </p:spPr>
-        <p:txBody>
-          <a:bodyPr spcFirstLastPara="1" wrap="square" lIns="91433" tIns="45700" rIns="91433" bIns="45700" anchor="t" anchorCtr="0">
-            <a:noAutofit/>
-          </a:bodyPr>
-          <a:lstStyle/>
-          <a:p>
-            <a:pPr algn="ctr"/>
-            <a:r>
-              <a:rPr lang="en" sz="1600" dirty="0">
-                <a:solidFill>
-                  <a:schemeClr val="dk1"/>
-                </a:solidFill>
-                <a:latin typeface="Calibri"/>
-                <a:ea typeface="Calibri"/>
-                <a:cs typeface="Calibri"/>
-                <a:sym typeface="Calibri"/>
-              </a:rPr>
-              <a:t>Snap freeze stool </a:t>
-            </a:r>
-            <a:endParaRPr sz="1467" dirty="0"/>
-          </a:p>
-        </p:txBody>
-      </p:sp>
-      <p:sp>
-        <p:nvSpPr>
-          <p:cNvPr id="122" name="Google Shape;655;p64">
-            <a:extLst>
-              <a:ext uri="{FF2B5EF4-FFF2-40B4-BE49-F238E27FC236}">
-                <a16:creationId xmlns:a16="http://schemas.microsoft.com/office/drawing/2014/main" id="{ECEE8685-CB38-4A40-8315-AA60888B590D}"/>
-              </a:ext>
-            </a:extLst>
-          </p:cNvPr>
-          <p:cNvSpPr/>
-          <p:nvPr/>
-        </p:nvSpPr>
-        <p:spPr>
-          <a:xfrm flipH="1">
-            <a:off x="8896403" y="2069797"/>
-            <a:ext cx="259463" cy="446583"/>
-          </a:xfrm>
-          <a:prstGeom prst="downArrow">
-            <a:avLst>
-              <a:gd name="adj1" fmla="val 50000"/>
-              <a:gd name="adj2" fmla="val 50000"/>
-            </a:avLst>
-          </a:prstGeom>
-          <a:solidFill>
-            <a:schemeClr val="tx1"/>
-          </a:solidFill>
-          <a:ln w="12700" cap="flat" cmpd="sng">
-            <a:solidFill>
-              <a:schemeClr val="tx1"/>
-            </a:solidFill>
-            <a:prstDash val="solid"/>
-            <a:miter lim="800000"/>
-            <a:headEnd type="none" w="sm" len="sm"/>
-            <a:tailEnd type="none" w="sm" len="sm"/>
-          </a:ln>
-        </p:spPr>
-        <p:txBody>
-          <a:bodyPr spcFirstLastPara="1" wrap="square" lIns="91433" tIns="45700" rIns="91433" bIns="45700" anchor="ctr" anchorCtr="0">
-            <a:noAutofit/>
-          </a:bodyPr>
-          <a:lstStyle/>
-          <a:p>
-            <a:pPr algn="ctr"/>
-            <a:endParaRPr sz="1867">
+            <a:endParaRPr sz="1496">
               <a:latin typeface="Calibri"/>
               <a:ea typeface="Calibri"/>
               <a:cs typeface="Calibri"/>
@@ -6242,7 +5096,7 @@
 <file path=ppt/theme/theme1.xml><?xml version="1.0" encoding="utf-8"?>
 <a:theme xmlns:a="http://schemas.openxmlformats.org/drawingml/2006/main" name="Office Theme">
   <a:themeElements>
-    <a:clrScheme name="Office">
+    <a:clrScheme name="Office Theme">
       <a:dk1>
         <a:sysClr val="windowText" lastClr="000000"/>
       </a:dk1>
@@ -6280,7 +5134,7 @@
         <a:srgbClr val="954F72"/>
       </a:folHlink>
     </a:clrScheme>
-    <a:fontScheme name="Office">
+    <a:fontScheme name="Office Theme">
       <a:majorFont>
         <a:latin typeface="Calibri Light" panose="020F0302020204030204"/>
         <a:ea typeface=""/>
@@ -6315,23 +5169,6 @@
         <a:font script="Viet" typeface="Times New Roman"/>
         <a:font script="Uigh" typeface="Microsoft Uighur"/>
         <a:font script="Geor" typeface="Sylfaen"/>
-        <a:font script="Armn" typeface="Arial"/>
-        <a:font script="Bugi" typeface="Leelawadee UI"/>
-        <a:font script="Bopo" typeface="Microsoft JhengHei"/>
-        <a:font script="Java" typeface="Javanese Text"/>
-        <a:font script="Lisu" typeface="Segoe UI"/>
-        <a:font script="Mymr" typeface="Myanmar Text"/>
-        <a:font script="Nkoo" typeface="Ebrima"/>
-        <a:font script="Olck" typeface="Nirmala UI"/>
-        <a:font script="Osma" typeface="Ebrima"/>
-        <a:font script="Phag" typeface="Phagspa"/>
-        <a:font script="Syrn" typeface="Estrangelo Edessa"/>
-        <a:font script="Syrj" typeface="Estrangelo Edessa"/>
-        <a:font script="Syre" typeface="Estrangelo Edessa"/>
-        <a:font script="Sora" typeface="Nirmala UI"/>
-        <a:font script="Tale" typeface="Microsoft Tai Le"/>
-        <a:font script="Talu" typeface="Microsoft New Tai Lue"/>
-        <a:font script="Tfng" typeface="Ebrima"/>
       </a:majorFont>
       <a:minorFont>
         <a:latin typeface="Calibri" panose="020F0502020204030204"/>
@@ -6367,26 +5204,9 @@
         <a:font script="Viet" typeface="Arial"/>
         <a:font script="Uigh" typeface="Microsoft Uighur"/>
         <a:font script="Geor" typeface="Sylfaen"/>
-        <a:font script="Armn" typeface="Arial"/>
-        <a:font script="Bugi" typeface="Leelawadee UI"/>
-        <a:font script="Bopo" typeface="Microsoft JhengHei"/>
-        <a:font script="Java" typeface="Javanese Text"/>
-        <a:font script="Lisu" typeface="Segoe UI"/>
-        <a:font script="Mymr" typeface="Myanmar Text"/>
-        <a:font script="Nkoo" typeface="Ebrima"/>
-        <a:font script="Olck" typeface="Nirmala UI"/>
-        <a:font script="Osma" typeface="Ebrima"/>
-        <a:font script="Phag" typeface="Phagspa"/>
-        <a:font script="Syrn" typeface="Estrangelo Edessa"/>
-        <a:font script="Syrj" typeface="Estrangelo Edessa"/>
-        <a:font script="Syre" typeface="Estrangelo Edessa"/>
-        <a:font script="Sora" typeface="Nirmala UI"/>
-        <a:font script="Tale" typeface="Microsoft Tai Le"/>
-        <a:font script="Talu" typeface="Microsoft New Tai Lue"/>
-        <a:font script="Tfng" typeface="Ebrima"/>
       </a:minorFont>
     </a:fontScheme>
-    <a:fmtScheme name="Office">
+    <a:fmtScheme name="Office Theme">
       <a:fillStyleLst>
         <a:solidFill>
           <a:schemeClr val="phClr"/>

</xml_diff>

<commit_message>
Update Figure 3 with more condensed schematic
</commit_message>
<xml_diff>
--- a/results/figures/1_Day_PEG_Schematic.pptx
+++ b/results/figures/1_Day_PEG_Schematic.pptx
@@ -197,7 +197,7 @@
           <a:p>
             <a:fld id="{77734EDB-3B6B-CA48-BB41-C96E8374FD30}" type="datetimeFigureOut">
               <a:rPr lang="en-US" smtClean="0"/>
-              <a:t>3/2/21</a:t>
+              <a:t>3/4/21</a:t>
             </a:fld>
             <a:endParaRPr lang="en-US"/>
           </a:p>
@@ -806,7 +806,7 @@
           <a:p>
             <a:fld id="{30AF97BF-8750-4713-9C5B-3A2A8059BBA3}" type="datetimeFigureOut">
               <a:rPr lang="en-US" smtClean="0"/>
-              <a:t>3/2/21</a:t>
+              <a:t>3/4/21</a:t>
             </a:fld>
             <a:endParaRPr lang="en-US"/>
           </a:p>
@@ -976,7 +976,7 @@
           <a:p>
             <a:fld id="{30AF97BF-8750-4713-9C5B-3A2A8059BBA3}" type="datetimeFigureOut">
               <a:rPr lang="en-US" smtClean="0"/>
-              <a:t>3/2/21</a:t>
+              <a:t>3/4/21</a:t>
             </a:fld>
             <a:endParaRPr lang="en-US"/>
           </a:p>
@@ -1156,7 +1156,7 @@
           <a:p>
             <a:fld id="{30AF97BF-8750-4713-9C5B-3A2A8059BBA3}" type="datetimeFigureOut">
               <a:rPr lang="en-US" smtClean="0"/>
-              <a:t>3/2/21</a:t>
+              <a:t>3/4/21</a:t>
             </a:fld>
             <a:endParaRPr lang="en-US"/>
           </a:p>
@@ -1326,7 +1326,7 @@
           <a:p>
             <a:fld id="{30AF97BF-8750-4713-9C5B-3A2A8059BBA3}" type="datetimeFigureOut">
               <a:rPr lang="en-US" smtClean="0"/>
-              <a:t>3/2/21</a:t>
+              <a:t>3/4/21</a:t>
             </a:fld>
             <a:endParaRPr lang="en-US"/>
           </a:p>
@@ -1572,7 +1572,7 @@
           <a:p>
             <a:fld id="{30AF97BF-8750-4713-9C5B-3A2A8059BBA3}" type="datetimeFigureOut">
               <a:rPr lang="en-US" smtClean="0"/>
-              <a:t>3/2/21</a:t>
+              <a:t>3/4/21</a:t>
             </a:fld>
             <a:endParaRPr lang="en-US"/>
           </a:p>
@@ -1804,7 +1804,7 @@
           <a:p>
             <a:fld id="{30AF97BF-8750-4713-9C5B-3A2A8059BBA3}" type="datetimeFigureOut">
               <a:rPr lang="en-US" smtClean="0"/>
-              <a:t>3/2/21</a:t>
+              <a:t>3/4/21</a:t>
             </a:fld>
             <a:endParaRPr lang="en-US"/>
           </a:p>
@@ -2171,7 +2171,7 @@
           <a:p>
             <a:fld id="{30AF97BF-8750-4713-9C5B-3A2A8059BBA3}" type="datetimeFigureOut">
               <a:rPr lang="en-US" smtClean="0"/>
-              <a:t>3/2/21</a:t>
+              <a:t>3/4/21</a:t>
             </a:fld>
             <a:endParaRPr lang="en-US"/>
           </a:p>
@@ -2289,7 +2289,7 @@
           <a:p>
             <a:fld id="{30AF97BF-8750-4713-9C5B-3A2A8059BBA3}" type="datetimeFigureOut">
               <a:rPr lang="en-US" smtClean="0"/>
-              <a:t>3/2/21</a:t>
+              <a:t>3/4/21</a:t>
             </a:fld>
             <a:endParaRPr lang="en-US"/>
           </a:p>
@@ -2384,7 +2384,7 @@
           <a:p>
             <a:fld id="{30AF97BF-8750-4713-9C5B-3A2A8059BBA3}" type="datetimeFigureOut">
               <a:rPr lang="en-US" smtClean="0"/>
-              <a:t>3/2/21</a:t>
+              <a:t>3/4/21</a:t>
             </a:fld>
             <a:endParaRPr lang="en-US"/>
           </a:p>
@@ -2661,7 +2661,7 @@
           <a:p>
             <a:fld id="{30AF97BF-8750-4713-9C5B-3A2A8059BBA3}" type="datetimeFigureOut">
               <a:rPr lang="en-US" smtClean="0"/>
-              <a:t>3/2/21</a:t>
+              <a:t>3/4/21</a:t>
             </a:fld>
             <a:endParaRPr lang="en-US"/>
           </a:p>
@@ -2918,7 +2918,7 @@
           <a:p>
             <a:fld id="{30AF97BF-8750-4713-9C5B-3A2A8059BBA3}" type="datetimeFigureOut">
               <a:rPr lang="en-US" smtClean="0"/>
-              <a:t>3/2/21</a:t>
+              <a:t>3/4/21</a:t>
             </a:fld>
             <a:endParaRPr lang="en-US"/>
           </a:p>
@@ -3131,7 +3131,7 @@
           <a:p>
             <a:fld id="{30AF97BF-8750-4713-9C5B-3A2A8059BBA3}" type="datetimeFigureOut">
               <a:rPr lang="en-US" smtClean="0"/>
-              <a:t>3/2/21</a:t>
+              <a:t>3/4/21</a:t>
             </a:fld>
             <a:endParaRPr lang="en-US"/>
           </a:p>
@@ -3536,122 +3536,12 @@
           <a:chExt cx="0" cy="0"/>
         </a:xfrm>
       </p:grpSpPr>
-      <p:pic>
-        <p:nvPicPr>
-          <p:cNvPr id="652" name="Google Shape;652;p64" descr="http://www.criver.com/SiteCollectionImages/Images_255x164/rm_mice_light_bellied_agouti_129.jpg"/>
-          <p:cNvPicPr preferRelativeResize="0"/>
-          <p:nvPr/>
-        </p:nvPicPr>
-        <p:blipFill rotWithShape="1">
-          <a:blip r:embed="rId3">
-            <a:alphaModFix/>
-          </a:blip>
-          <a:srcRect/>
-          <a:stretch/>
-        </p:blipFill>
-        <p:spPr>
-          <a:xfrm>
-            <a:off x="159424" y="635341"/>
-            <a:ext cx="794494" cy="699502"/>
-          </a:xfrm>
-          <a:prstGeom prst="rect">
-            <a:avLst/>
-          </a:prstGeom>
-          <a:noFill/>
-          <a:ln>
-            <a:noFill/>
-          </a:ln>
-        </p:spPr>
-      </p:pic>
-      <p:sp>
-        <p:nvSpPr>
-          <p:cNvPr id="653" name="Google Shape;653;p64"/>
-          <p:cNvSpPr txBox="1"/>
-          <p:nvPr/>
-        </p:nvSpPr>
-        <p:spPr>
-          <a:xfrm>
-            <a:off x="528905" y="1281511"/>
-            <a:ext cx="855608" cy="370219"/>
-          </a:xfrm>
-          <a:prstGeom prst="rect">
-            <a:avLst/>
-          </a:prstGeom>
-          <a:noFill/>
-          <a:ln>
-            <a:noFill/>
-          </a:ln>
-        </p:spPr>
-        <p:txBody>
-          <a:bodyPr spcFirstLastPara="1" wrap="square" lIns="73332" tIns="36652" rIns="73332" bIns="36652" anchor="t" anchorCtr="0">
-            <a:noAutofit/>
-          </a:bodyPr>
-          <a:lstStyle/>
-          <a:p>
-            <a:r>
-              <a:rPr lang="en" sz="1926" dirty="0">
-                <a:solidFill>
-                  <a:schemeClr val="dk1"/>
-                </a:solidFill>
-                <a:latin typeface="Calibri"/>
-                <a:ea typeface="Calibri"/>
-                <a:cs typeface="Calibri"/>
-                <a:sym typeface="Calibri"/>
-              </a:rPr>
-              <a:t>Day:</a:t>
-            </a:r>
-            <a:endParaRPr sz="1177" dirty="0"/>
-          </a:p>
-        </p:txBody>
-      </p:sp>
-      <p:sp>
-        <p:nvSpPr>
-          <p:cNvPr id="659" name="Google Shape;659;p64"/>
-          <p:cNvSpPr txBox="1"/>
-          <p:nvPr/>
-        </p:nvSpPr>
-        <p:spPr>
-          <a:xfrm>
-            <a:off x="4243354" y="307526"/>
-            <a:ext cx="2115120" cy="271728"/>
-          </a:xfrm>
-          <a:prstGeom prst="rect">
-            <a:avLst/>
-          </a:prstGeom>
-          <a:noFill/>
-          <a:ln>
-            <a:noFill/>
-          </a:ln>
-        </p:spPr>
-        <p:txBody>
-          <a:bodyPr spcFirstLastPara="1" wrap="square" lIns="73332" tIns="36652" rIns="73332" bIns="36652" anchor="t" anchorCtr="0">
-            <a:noAutofit/>
-          </a:bodyPr>
-          <a:lstStyle/>
-          <a:p>
-            <a:pPr algn="ctr"/>
-            <a:r>
-              <a:rPr lang="en" sz="1282" dirty="0">
-                <a:solidFill>
-                  <a:schemeClr val="dk1"/>
-                </a:solidFill>
-                <a:latin typeface="Calibri"/>
-                <a:ea typeface="Calibri"/>
-                <a:cs typeface="Calibri"/>
-                <a:sym typeface="Calibri"/>
-              </a:rPr>
-              <a:t>Euthanize</a:t>
-            </a:r>
-            <a:endParaRPr sz="1177" dirty="0"/>
-          </a:p>
-        </p:txBody>
-      </p:sp>
       <p:grpSp>
         <p:nvGrpSpPr>
-          <p:cNvPr id="55" name="Group 54">
+          <p:cNvPr id="5" name="Group 4">
             <a:extLst>
               <a:ext uri="{FF2B5EF4-FFF2-40B4-BE49-F238E27FC236}">
-                <a16:creationId xmlns:a16="http://schemas.microsoft.com/office/drawing/2014/main" id="{D5A0F4F0-B576-F042-9624-FE8D13359FEB}"/>
+                <a16:creationId xmlns:a16="http://schemas.microsoft.com/office/drawing/2014/main" id="{C6C98861-9CAA-0145-B4A8-B7AD4ECADC57}"/>
               </a:ext>
             </a:extLst>
           </p:cNvPr>
@@ -3660,83 +3550,49 @@
         </p:nvGrpSpPr>
         <p:grpSpPr>
           <a:xfrm>
-            <a:off x="1706921" y="617891"/>
-            <a:ext cx="643773" cy="393010"/>
-            <a:chOff x="1314346" y="2409098"/>
-            <a:chExt cx="741504" cy="490016"/>
+            <a:off x="938058" y="380124"/>
+            <a:ext cx="4137333" cy="2348075"/>
+            <a:chOff x="226694" y="544768"/>
+            <a:chExt cx="4137333" cy="2348075"/>
           </a:xfrm>
         </p:grpSpPr>
+        <p:pic>
+          <p:nvPicPr>
+            <p:cNvPr id="652" name="Google Shape;652;p64" descr="http://www.criver.com/SiteCollectionImages/Images_255x164/rm_mice_light_bellied_agouti_129.jpg"/>
+            <p:cNvPicPr preferRelativeResize="0"/>
+            <p:nvPr/>
+          </p:nvPicPr>
+          <p:blipFill rotWithShape="1">
+            <a:blip r:embed="rId3">
+              <a:alphaModFix/>
+            </a:blip>
+            <a:srcRect/>
+            <a:stretch/>
+          </p:blipFill>
+          <p:spPr>
+            <a:xfrm>
+              <a:off x="244768" y="745069"/>
+              <a:ext cx="794494" cy="699502"/>
+            </a:xfrm>
+            <a:prstGeom prst="rect">
+              <a:avLst/>
+            </a:prstGeom>
+            <a:noFill/>
+            <a:ln>
+              <a:noFill/>
+            </a:ln>
+          </p:spPr>
+        </p:pic>
         <p:sp>
           <p:nvSpPr>
-            <p:cNvPr id="61" name="Google Shape;703;p64">
-              <a:extLst>
-                <a:ext uri="{FF2B5EF4-FFF2-40B4-BE49-F238E27FC236}">
-                  <a16:creationId xmlns:a16="http://schemas.microsoft.com/office/drawing/2014/main" id="{3C87A7BF-5D13-4041-8E10-50E25C1AEEC1}"/>
-                </a:ext>
-              </a:extLst>
-            </p:cNvPr>
-            <p:cNvSpPr/>
-            <p:nvPr/>
-          </p:nvSpPr>
-          <p:spPr>
-            <a:xfrm rot="16200000">
-              <a:off x="1367936" y="2392324"/>
-              <a:ext cx="490016" cy="523564"/>
-            </a:xfrm>
-            <a:prstGeom prst="downArrow">
-              <a:avLst>
-                <a:gd name="adj1" fmla="val 50000"/>
-                <a:gd name="adj2" fmla="val 50000"/>
-              </a:avLst>
-            </a:prstGeom>
-            <a:solidFill>
-              <a:srgbClr val="0070C0"/>
-            </a:solidFill>
-            <a:ln w="12700" cap="flat" cmpd="sng">
-              <a:solidFill>
-                <a:srgbClr val="225EA8"/>
-              </a:solidFill>
-              <a:prstDash val="solid"/>
-              <a:miter lim="800000"/>
-              <a:headEnd type="none" w="sm" len="sm"/>
-              <a:tailEnd type="none" w="sm" len="sm"/>
-            </a:ln>
-          </p:spPr>
-          <p:txBody>
-            <a:bodyPr spcFirstLastPara="1" wrap="square" lIns="73332" tIns="36652" rIns="73332" bIns="36652" anchor="ctr" anchorCtr="0">
-              <a:noAutofit/>
-            </a:bodyPr>
-            <a:lstStyle/>
-            <a:p>
-              <a:pPr algn="ctr"/>
-              <a:endParaRPr sz="1496" dirty="0">
-                <a:solidFill>
-                  <a:schemeClr val="lt1"/>
-                </a:solidFill>
-                <a:latin typeface="Calibri"/>
-                <a:ea typeface="Calibri"/>
-                <a:cs typeface="Calibri"/>
-                <a:sym typeface="Calibri"/>
-              </a:endParaRPr>
-            </a:p>
-          </p:txBody>
-        </p:sp>
-        <p:sp>
-          <p:nvSpPr>
-            <p:cNvPr id="62" name="Google Shape;677;p64">
-              <a:extLst>
-                <a:ext uri="{FF2B5EF4-FFF2-40B4-BE49-F238E27FC236}">
-                  <a16:creationId xmlns:a16="http://schemas.microsoft.com/office/drawing/2014/main" id="{FB76320D-3E6C-B742-9744-C3D72D1A2BDE}"/>
-                </a:ext>
-              </a:extLst>
-            </p:cNvPr>
-            <p:cNvSpPr/>
+            <p:cNvPr id="653" name="Google Shape;653;p64"/>
+            <p:cNvSpPr txBox="1"/>
             <p:nvPr/>
           </p:nvSpPr>
           <p:spPr>
             <a:xfrm>
-              <a:off x="1314346" y="2472137"/>
-              <a:ext cx="741504" cy="337083"/>
+              <a:off x="614249" y="1391239"/>
+              <a:ext cx="855608" cy="370219"/>
             </a:xfrm>
             <a:prstGeom prst="rect">
               <a:avLst/>
@@ -3753,739 +3609,543 @@
             <a:lstStyle/>
             <a:p>
               <a:r>
-                <a:rPr lang="en-US" sz="1171" dirty="0">
+                <a:rPr lang="en" sz="1926" dirty="0">
                   <a:solidFill>
-                    <a:schemeClr val="bg1"/>
+                    <a:schemeClr val="dk1"/>
                   </a:solidFill>
+                  <a:latin typeface="Calibri"/>
                   <a:ea typeface="Calibri"/>
                   <a:cs typeface="Calibri"/>
                   <a:sym typeface="Calibri"/>
                 </a:rPr>
-                <a:t>PEG</a:t>
+                <a:t>Day:</a:t>
               </a:r>
+              <a:endParaRPr sz="1177" dirty="0"/>
             </a:p>
           </p:txBody>
         </p:sp>
-      </p:grpSp>
-      <p:sp>
-        <p:nvSpPr>
-          <p:cNvPr id="65" name="Google Shape;666;p64">
-            <a:extLst>
-              <a:ext uri="{FF2B5EF4-FFF2-40B4-BE49-F238E27FC236}">
-                <a16:creationId xmlns:a16="http://schemas.microsoft.com/office/drawing/2014/main" id="{58AB3711-9BBE-A149-AD0D-E8A5F48FED08}"/>
-              </a:ext>
-            </a:extLst>
-          </p:cNvPr>
-          <p:cNvSpPr txBox="1"/>
-          <p:nvPr/>
-        </p:nvSpPr>
-        <p:spPr>
-          <a:xfrm>
-            <a:off x="1945637" y="1340067"/>
-            <a:ext cx="348724" cy="321135"/>
-          </a:xfrm>
-          <a:prstGeom prst="rect">
-            <a:avLst/>
-          </a:prstGeom>
-          <a:noFill/>
-          <a:ln>
+        <p:sp>
+          <p:nvSpPr>
+            <p:cNvPr id="659" name="Google Shape;659;p64"/>
+            <p:cNvSpPr txBox="1"/>
+            <p:nvPr/>
+          </p:nvSpPr>
+          <p:spPr>
+            <a:xfrm>
+              <a:off x="2219596" y="544768"/>
+              <a:ext cx="2115120" cy="271728"/>
+            </a:xfrm>
+            <a:prstGeom prst="rect">
+              <a:avLst/>
+            </a:prstGeom>
             <a:noFill/>
-          </a:ln>
-        </p:spPr>
-        <p:txBody>
-          <a:bodyPr spcFirstLastPara="1" wrap="square" lIns="73332" tIns="36652" rIns="73332" bIns="36652" anchor="t" anchorCtr="0">
-            <a:noAutofit/>
-          </a:bodyPr>
-          <a:lstStyle/>
-          <a:p>
-            <a:pPr algn="ctr"/>
-            <a:r>
-              <a:rPr lang="en" sz="1604" dirty="0">
+            <a:ln>
+              <a:noFill/>
+            </a:ln>
+          </p:spPr>
+          <p:txBody>
+            <a:bodyPr spcFirstLastPara="1" wrap="square" lIns="73332" tIns="36652" rIns="73332" bIns="36652" anchor="t" anchorCtr="0">
+              <a:noAutofit/>
+            </a:bodyPr>
+            <a:lstStyle/>
+            <a:p>
+              <a:pPr algn="ctr"/>
+              <a:r>
+                <a:rPr lang="en" sz="1282" dirty="0">
+                  <a:solidFill>
+                    <a:schemeClr val="dk1"/>
+                  </a:solidFill>
+                  <a:latin typeface="Calibri"/>
+                  <a:ea typeface="Calibri"/>
+                  <a:cs typeface="Calibri"/>
+                  <a:sym typeface="Calibri"/>
+                </a:rPr>
+                <a:t>Euthanize</a:t>
+              </a:r>
+              <a:endParaRPr sz="1177" dirty="0"/>
+            </a:p>
+          </p:txBody>
+        </p:sp>
+        <p:grpSp>
+          <p:nvGrpSpPr>
+            <p:cNvPr id="55" name="Group 54">
+              <a:extLst>
+                <a:ext uri="{FF2B5EF4-FFF2-40B4-BE49-F238E27FC236}">
+                  <a16:creationId xmlns:a16="http://schemas.microsoft.com/office/drawing/2014/main" id="{D5A0F4F0-B576-F042-9624-FE8D13359FEB}"/>
+                </a:ext>
+              </a:extLst>
+            </p:cNvPr>
+            <p:cNvGrpSpPr/>
+            <p:nvPr/>
+          </p:nvGrpSpPr>
+          <p:grpSpPr>
+            <a:xfrm>
+              <a:off x="1792265" y="727619"/>
+              <a:ext cx="643773" cy="393010"/>
+              <a:chOff x="1314346" y="2409098"/>
+              <a:chExt cx="741504" cy="490016"/>
+            </a:xfrm>
+          </p:grpSpPr>
+          <p:sp>
+            <p:nvSpPr>
+              <p:cNvPr id="61" name="Google Shape;703;p64">
+                <a:extLst>
+                  <a:ext uri="{FF2B5EF4-FFF2-40B4-BE49-F238E27FC236}">
+                    <a16:creationId xmlns:a16="http://schemas.microsoft.com/office/drawing/2014/main" id="{3C87A7BF-5D13-4041-8E10-50E25C1AEEC1}"/>
+                  </a:ext>
+                </a:extLst>
+              </p:cNvPr>
+              <p:cNvSpPr/>
+              <p:nvPr/>
+            </p:nvSpPr>
+            <p:spPr>
+              <a:xfrm rot="16200000">
+                <a:off x="1367936" y="2392324"/>
+                <a:ext cx="490016" cy="523564"/>
+              </a:xfrm>
+              <a:prstGeom prst="downArrow">
+                <a:avLst>
+                  <a:gd name="adj1" fmla="val 50000"/>
+                  <a:gd name="adj2" fmla="val 50000"/>
+                </a:avLst>
+              </a:prstGeom>
+              <a:solidFill>
+                <a:srgbClr val="0070C0"/>
+              </a:solidFill>
+              <a:ln w="12700" cap="flat" cmpd="sng">
                 <a:solidFill>
-                  <a:schemeClr val="dk1"/>
+                  <a:srgbClr val="225EA8"/>
                 </a:solidFill>
-                <a:latin typeface="Calibri"/>
-                <a:ea typeface="Calibri"/>
-                <a:cs typeface="Calibri"/>
-                <a:sym typeface="Calibri"/>
-              </a:rPr>
-              <a:t>-1</a:t>
-            </a:r>
-            <a:endParaRPr sz="1177" dirty="0"/>
-          </a:p>
-        </p:txBody>
-      </p:sp>
-      <p:sp>
-        <p:nvSpPr>
-          <p:cNvPr id="66" name="Google Shape;667;p64">
-            <a:extLst>
-              <a:ext uri="{FF2B5EF4-FFF2-40B4-BE49-F238E27FC236}">
-                <a16:creationId xmlns:a16="http://schemas.microsoft.com/office/drawing/2014/main" id="{D74DAD91-AD00-8948-88EB-115FAB5DFC15}"/>
-              </a:ext>
-            </a:extLst>
-          </p:cNvPr>
-          <p:cNvSpPr txBox="1"/>
-          <p:nvPr/>
-        </p:nvSpPr>
-        <p:spPr>
-          <a:xfrm>
-            <a:off x="2483073" y="1328520"/>
-            <a:ext cx="348724" cy="321135"/>
-          </a:xfrm>
-          <a:prstGeom prst="rect">
-            <a:avLst/>
-          </a:prstGeom>
-          <a:noFill/>
-          <a:ln>
+                <a:prstDash val="solid"/>
+                <a:miter lim="800000"/>
+                <a:headEnd type="none" w="sm" len="sm"/>
+                <a:tailEnd type="none" w="sm" len="sm"/>
+              </a:ln>
+            </p:spPr>
+            <p:txBody>
+              <a:bodyPr spcFirstLastPara="1" wrap="square" lIns="73332" tIns="36652" rIns="73332" bIns="36652" anchor="ctr" anchorCtr="0">
+                <a:noAutofit/>
+              </a:bodyPr>
+              <a:lstStyle/>
+              <a:p>
+                <a:pPr algn="ctr"/>
+                <a:endParaRPr sz="1496" dirty="0">
+                  <a:solidFill>
+                    <a:schemeClr val="lt1"/>
+                  </a:solidFill>
+                  <a:latin typeface="Calibri"/>
+                  <a:ea typeface="Calibri"/>
+                  <a:cs typeface="Calibri"/>
+                  <a:sym typeface="Calibri"/>
+                </a:endParaRPr>
+              </a:p>
+            </p:txBody>
+          </p:sp>
+          <p:sp>
+            <p:nvSpPr>
+              <p:cNvPr id="62" name="Google Shape;677;p64">
+                <a:extLst>
+                  <a:ext uri="{FF2B5EF4-FFF2-40B4-BE49-F238E27FC236}">
+                    <a16:creationId xmlns:a16="http://schemas.microsoft.com/office/drawing/2014/main" id="{FB76320D-3E6C-B742-9744-C3D72D1A2BDE}"/>
+                  </a:ext>
+                </a:extLst>
+              </p:cNvPr>
+              <p:cNvSpPr/>
+              <p:nvPr/>
+            </p:nvSpPr>
+            <p:spPr>
+              <a:xfrm>
+                <a:off x="1314346" y="2472137"/>
+                <a:ext cx="741504" cy="337083"/>
+              </a:xfrm>
+              <a:prstGeom prst="rect">
+                <a:avLst/>
+              </a:prstGeom>
+              <a:noFill/>
+              <a:ln>
+                <a:noFill/>
+              </a:ln>
+            </p:spPr>
+            <p:txBody>
+              <a:bodyPr spcFirstLastPara="1" wrap="square" lIns="73332" tIns="36652" rIns="73332" bIns="36652" anchor="t" anchorCtr="0">
+                <a:noAutofit/>
+              </a:bodyPr>
+              <a:lstStyle/>
+              <a:p>
+                <a:r>
+                  <a:rPr lang="en-US" sz="1171" dirty="0">
+                    <a:solidFill>
+                      <a:schemeClr val="bg1"/>
+                    </a:solidFill>
+                    <a:ea typeface="Calibri"/>
+                    <a:cs typeface="Calibri"/>
+                    <a:sym typeface="Calibri"/>
+                  </a:rPr>
+                  <a:t>PEG</a:t>
+                </a:r>
+              </a:p>
+            </p:txBody>
+          </p:sp>
+        </p:grpSp>
+        <p:sp>
+          <p:nvSpPr>
+            <p:cNvPr id="65" name="Google Shape;666;p64">
+              <a:extLst>
+                <a:ext uri="{FF2B5EF4-FFF2-40B4-BE49-F238E27FC236}">
+                  <a16:creationId xmlns:a16="http://schemas.microsoft.com/office/drawing/2014/main" id="{58AB3711-9BBE-A149-AD0D-E8A5F48FED08}"/>
+                </a:ext>
+              </a:extLst>
+            </p:cNvPr>
+            <p:cNvSpPr txBox="1"/>
+            <p:nvPr/>
+          </p:nvSpPr>
+          <p:spPr>
+            <a:xfrm>
+              <a:off x="2030981" y="1449795"/>
+              <a:ext cx="348724" cy="321135"/>
+            </a:xfrm>
+            <a:prstGeom prst="rect">
+              <a:avLst/>
+            </a:prstGeom>
             <a:noFill/>
-          </a:ln>
-        </p:spPr>
-        <p:txBody>
-          <a:bodyPr spcFirstLastPara="1" wrap="square" lIns="73332" tIns="36652" rIns="73332" bIns="36652" anchor="t" anchorCtr="0">
-            <a:noAutofit/>
-          </a:bodyPr>
-          <a:lstStyle/>
-          <a:p>
-            <a:pPr algn="ctr"/>
-            <a:r>
-              <a:rPr lang="en" sz="1604" dirty="0">
-                <a:solidFill>
-                  <a:schemeClr val="dk1"/>
-                </a:solidFill>
-                <a:latin typeface="Calibri"/>
-                <a:ea typeface="Calibri"/>
-                <a:cs typeface="Calibri"/>
-                <a:sym typeface="Calibri"/>
-              </a:rPr>
-              <a:t>0</a:t>
-            </a:r>
-            <a:endParaRPr sz="1177" dirty="0"/>
-          </a:p>
-        </p:txBody>
-      </p:sp>
-      <p:cxnSp>
-        <p:nvCxnSpPr>
-          <p:cNvPr id="80" name="Google Shape;679;p64">
-            <a:extLst>
-              <a:ext uri="{FF2B5EF4-FFF2-40B4-BE49-F238E27FC236}">
-                <a16:creationId xmlns:a16="http://schemas.microsoft.com/office/drawing/2014/main" id="{FC45F3DB-BE5C-4145-B24C-5673B1B2716E}"/>
-              </a:ext>
-            </a:extLst>
-          </p:cNvPr>
-          <p:cNvCxnSpPr>
-            <a:cxnSpLocks/>
-          </p:cNvCxnSpPr>
-          <p:nvPr/>
-        </p:nvCxnSpPr>
-        <p:spPr>
-          <a:xfrm>
-            <a:off x="1234165" y="1151082"/>
-            <a:ext cx="4066750" cy="0"/>
-          </a:xfrm>
-          <a:prstGeom prst="straightConnector1">
-            <a:avLst/>
-          </a:prstGeom>
-          <a:ln w="28575" cap="flat" cmpd="sng" algn="ctr">
-            <a:solidFill>
-              <a:schemeClr val="dk1"/>
-            </a:solidFill>
-            <a:prstDash val="solid"/>
-            <a:round/>
-            <a:headEnd type="none" w="med" len="med"/>
-            <a:tailEnd type="none" w="med" len="med"/>
-          </a:ln>
-        </p:spPr>
-        <p:style>
-          <a:lnRef idx="0">
-            <a:scrgbClr r="0" g="0" b="0"/>
-          </a:lnRef>
-          <a:fillRef idx="0">
-            <a:scrgbClr r="0" g="0" b="0"/>
-          </a:fillRef>
-          <a:effectRef idx="0">
-            <a:scrgbClr r="0" g="0" b="0"/>
-          </a:effectRef>
-          <a:fontRef idx="minor">
-            <a:schemeClr val="tx1"/>
-          </a:fontRef>
-        </p:style>
-      </p:cxnSp>
-      <p:cxnSp>
-        <p:nvCxnSpPr>
-          <p:cNvPr id="81" name="Google Shape;684;p64">
-            <a:extLst>
-              <a:ext uri="{FF2B5EF4-FFF2-40B4-BE49-F238E27FC236}">
-                <a16:creationId xmlns:a16="http://schemas.microsoft.com/office/drawing/2014/main" id="{91BA9CBA-7934-B34A-90AF-486E290C7CCB}"/>
-              </a:ext>
-            </a:extLst>
-          </p:cNvPr>
-          <p:cNvCxnSpPr/>
-          <p:nvPr/>
-        </p:nvCxnSpPr>
-        <p:spPr>
-          <a:xfrm>
-            <a:off x="1234162" y="939464"/>
-            <a:ext cx="0" cy="423476"/>
-          </a:xfrm>
-          <a:prstGeom prst="straightConnector1">
-            <a:avLst/>
-          </a:prstGeom>
-          <a:noFill/>
-          <a:ln w="28575" cap="flat" cmpd="sng">
-            <a:solidFill>
-              <a:schemeClr val="dk1"/>
-            </a:solidFill>
-            <a:prstDash val="solid"/>
-            <a:miter lim="800000"/>
-            <a:headEnd type="none" w="sm" len="sm"/>
-            <a:tailEnd type="none" w="sm" len="sm"/>
-          </a:ln>
-        </p:spPr>
-      </p:cxnSp>
-      <p:cxnSp>
-        <p:nvCxnSpPr>
-          <p:cNvPr id="82" name="Google Shape;685;p64">
-            <a:extLst>
-              <a:ext uri="{FF2B5EF4-FFF2-40B4-BE49-F238E27FC236}">
-                <a16:creationId xmlns:a16="http://schemas.microsoft.com/office/drawing/2014/main" id="{B007A5F0-B136-4340-9241-1221F16A7D88}"/>
-              </a:ext>
-            </a:extLst>
-          </p:cNvPr>
-          <p:cNvCxnSpPr/>
-          <p:nvPr/>
-        </p:nvCxnSpPr>
-        <p:spPr>
-          <a:xfrm>
-            <a:off x="1706917" y="939237"/>
-            <a:ext cx="0" cy="423476"/>
-          </a:xfrm>
-          <a:prstGeom prst="straightConnector1">
-            <a:avLst/>
-          </a:prstGeom>
-          <a:noFill/>
-          <a:ln w="28575" cap="flat" cmpd="sng">
-            <a:solidFill>
-              <a:schemeClr val="dk1"/>
-            </a:solidFill>
-            <a:prstDash val="solid"/>
-            <a:miter lim="800000"/>
-            <a:headEnd type="none" w="sm" len="sm"/>
-            <a:tailEnd type="none" w="sm" len="sm"/>
-          </a:ln>
-        </p:spPr>
-      </p:cxnSp>
-      <p:cxnSp>
-        <p:nvCxnSpPr>
-          <p:cNvPr id="85" name="Google Shape;686;p64">
-            <a:extLst>
-              <a:ext uri="{FF2B5EF4-FFF2-40B4-BE49-F238E27FC236}">
-                <a16:creationId xmlns:a16="http://schemas.microsoft.com/office/drawing/2014/main" id="{A9D04165-1161-484E-8238-2F421DBDB347}"/>
-              </a:ext>
-            </a:extLst>
-          </p:cNvPr>
-          <p:cNvCxnSpPr/>
-          <p:nvPr/>
-        </p:nvCxnSpPr>
-        <p:spPr>
-          <a:xfrm>
-            <a:off x="2160838" y="946401"/>
-            <a:ext cx="0" cy="423476"/>
-          </a:xfrm>
-          <a:prstGeom prst="straightConnector1">
-            <a:avLst/>
-          </a:prstGeom>
-          <a:noFill/>
-          <a:ln w="28575" cap="flat" cmpd="sng">
-            <a:solidFill>
-              <a:schemeClr val="dk1"/>
-            </a:solidFill>
-            <a:prstDash val="solid"/>
-            <a:miter lim="800000"/>
-            <a:headEnd type="none" w="sm" len="sm"/>
-            <a:tailEnd type="none" w="sm" len="sm"/>
-          </a:ln>
-        </p:spPr>
-      </p:cxnSp>
-      <p:cxnSp>
-        <p:nvCxnSpPr>
-          <p:cNvPr id="87" name="Google Shape;687;p64">
-            <a:extLst>
-              <a:ext uri="{FF2B5EF4-FFF2-40B4-BE49-F238E27FC236}">
-                <a16:creationId xmlns:a16="http://schemas.microsoft.com/office/drawing/2014/main" id="{C3322923-51D2-034E-8930-3E0D543E19C7}"/>
-              </a:ext>
-            </a:extLst>
-          </p:cNvPr>
-          <p:cNvCxnSpPr/>
-          <p:nvPr/>
-        </p:nvCxnSpPr>
-        <p:spPr>
-          <a:xfrm>
-            <a:off x="2654771" y="946401"/>
-            <a:ext cx="0" cy="423476"/>
-          </a:xfrm>
-          <a:prstGeom prst="straightConnector1">
-            <a:avLst/>
-          </a:prstGeom>
-          <a:noFill/>
-          <a:ln w="28575" cap="flat" cmpd="sng">
-            <a:solidFill>
-              <a:schemeClr val="dk1"/>
-            </a:solidFill>
-            <a:prstDash val="solid"/>
-            <a:miter lim="800000"/>
-            <a:headEnd type="none" w="sm" len="sm"/>
-            <a:tailEnd type="none" w="sm" len="sm"/>
-          </a:ln>
-        </p:spPr>
-      </p:cxnSp>
-      <p:cxnSp>
-        <p:nvCxnSpPr>
-          <p:cNvPr id="102" name="Google Shape;681;p64">
-            <a:extLst>
-              <a:ext uri="{FF2B5EF4-FFF2-40B4-BE49-F238E27FC236}">
-                <a16:creationId xmlns:a16="http://schemas.microsoft.com/office/drawing/2014/main" id="{58961B80-DDDB-C943-9BA6-5035DFA1010F}"/>
-              </a:ext>
-            </a:extLst>
-          </p:cNvPr>
-          <p:cNvCxnSpPr/>
-          <p:nvPr/>
-        </p:nvCxnSpPr>
-        <p:spPr>
-          <a:xfrm>
-            <a:off x="5300914" y="982131"/>
-            <a:ext cx="0" cy="423476"/>
-          </a:xfrm>
-          <a:prstGeom prst="straightConnector1">
-            <a:avLst/>
-          </a:prstGeom>
-          <a:noFill/>
-          <a:ln w="28575" cap="flat" cmpd="sng">
-            <a:solidFill>
-              <a:schemeClr val="dk1"/>
-            </a:solidFill>
-            <a:prstDash val="solid"/>
-            <a:miter lim="800000"/>
-            <a:headEnd type="none" w="sm" len="sm"/>
-            <a:tailEnd type="none" w="sm" len="sm"/>
-          </a:ln>
-        </p:spPr>
-      </p:cxnSp>
-      <p:sp>
-        <p:nvSpPr>
-          <p:cNvPr id="106" name="Google Shape;694;p64">
-            <a:extLst>
-              <a:ext uri="{FF2B5EF4-FFF2-40B4-BE49-F238E27FC236}">
-                <a16:creationId xmlns:a16="http://schemas.microsoft.com/office/drawing/2014/main" id="{6E3C588D-2F32-4344-9E55-9938FE26A530}"/>
-              </a:ext>
-            </a:extLst>
-          </p:cNvPr>
-          <p:cNvSpPr txBox="1"/>
-          <p:nvPr/>
-        </p:nvSpPr>
-        <p:spPr>
-          <a:xfrm>
-            <a:off x="5058700" y="1320823"/>
-            <a:ext cx="485069" cy="321135"/>
-          </a:xfrm>
-          <a:prstGeom prst="rect">
-            <a:avLst/>
-          </a:prstGeom>
-          <a:noFill/>
-          <a:ln>
+            <a:ln>
+              <a:noFill/>
+            </a:ln>
+          </p:spPr>
+          <p:txBody>
+            <a:bodyPr spcFirstLastPara="1" wrap="square" lIns="73332" tIns="36652" rIns="73332" bIns="36652" anchor="t" anchorCtr="0">
+              <a:noAutofit/>
+            </a:bodyPr>
+            <a:lstStyle/>
+            <a:p>
+              <a:pPr algn="ctr"/>
+              <a:r>
+                <a:rPr lang="en" sz="1604" dirty="0">
+                  <a:solidFill>
+                    <a:schemeClr val="dk1"/>
+                  </a:solidFill>
+                  <a:latin typeface="Calibri"/>
+                  <a:ea typeface="Calibri"/>
+                  <a:cs typeface="Calibri"/>
+                  <a:sym typeface="Calibri"/>
+                </a:rPr>
+                <a:t>-1</a:t>
+              </a:r>
+              <a:endParaRPr sz="1177" dirty="0"/>
+            </a:p>
+          </p:txBody>
+        </p:sp>
+        <p:sp>
+          <p:nvSpPr>
+            <p:cNvPr id="66" name="Google Shape;667;p64">
+              <a:extLst>
+                <a:ext uri="{FF2B5EF4-FFF2-40B4-BE49-F238E27FC236}">
+                  <a16:creationId xmlns:a16="http://schemas.microsoft.com/office/drawing/2014/main" id="{D74DAD91-AD00-8948-88EB-115FAB5DFC15}"/>
+                </a:ext>
+              </a:extLst>
+            </p:cNvPr>
+            <p:cNvSpPr txBox="1"/>
+            <p:nvPr/>
+          </p:nvSpPr>
+          <p:spPr>
+            <a:xfrm>
+              <a:off x="2568417" y="1438248"/>
+              <a:ext cx="348724" cy="321135"/>
+            </a:xfrm>
+            <a:prstGeom prst="rect">
+              <a:avLst/>
+            </a:prstGeom>
             <a:noFill/>
-          </a:ln>
-        </p:spPr>
-        <p:txBody>
-          <a:bodyPr spcFirstLastPara="1" wrap="square" lIns="73332" tIns="36652" rIns="73332" bIns="36652" anchor="t" anchorCtr="0">
-            <a:noAutofit/>
-          </a:bodyPr>
-          <a:lstStyle/>
-          <a:p>
-            <a:pPr algn="ctr"/>
-            <a:r>
-              <a:rPr lang="en" sz="1604" dirty="0">
-                <a:solidFill>
-                  <a:schemeClr val="dk1"/>
-                </a:solidFill>
-                <a:latin typeface="Calibri"/>
-                <a:cs typeface="Calibri"/>
-                <a:sym typeface="Calibri"/>
-              </a:rPr>
-              <a:t>10</a:t>
-            </a:r>
-          </a:p>
-          <a:p>
-            <a:pPr algn="ctr"/>
-            <a:endParaRPr sz="1177" dirty="0"/>
-          </a:p>
-        </p:txBody>
-      </p:sp>
-      <p:sp>
-        <p:nvSpPr>
-          <p:cNvPr id="107" name="Google Shape;658;p64">
-            <a:extLst>
-              <a:ext uri="{FF2B5EF4-FFF2-40B4-BE49-F238E27FC236}">
-                <a16:creationId xmlns:a16="http://schemas.microsoft.com/office/drawing/2014/main" id="{ECEF656C-0434-B74F-9129-A24EE5ADACBF}"/>
-              </a:ext>
-            </a:extLst>
-          </p:cNvPr>
-          <p:cNvSpPr/>
-          <p:nvPr/>
-        </p:nvSpPr>
-        <p:spPr>
-          <a:xfrm>
-            <a:off x="1326726" y="1594328"/>
-            <a:ext cx="1171289" cy="419624"/>
-          </a:xfrm>
-          <a:prstGeom prst="rect">
-            <a:avLst/>
-          </a:prstGeom>
-          <a:noFill/>
-          <a:ln>
-            <a:noFill/>
-          </a:ln>
-        </p:spPr>
-        <p:txBody>
-          <a:bodyPr spcFirstLastPara="1" wrap="square" lIns="73332" tIns="36652" rIns="73332" bIns="36652" anchor="t" anchorCtr="0">
-            <a:noAutofit/>
-          </a:bodyPr>
-          <a:lstStyle/>
-          <a:p>
-            <a:pPr algn="ctr"/>
-            <a:r>
-              <a:rPr lang="en" sz="1177" dirty="0" err="1">
-                <a:latin typeface="Calibri"/>
-                <a:ea typeface="Calibri"/>
-                <a:cs typeface="Calibri"/>
-                <a:sym typeface="Calibri"/>
-              </a:rPr>
-              <a:t>Clind</a:t>
-            </a:r>
-            <a:r>
-              <a:rPr lang="en" sz="1177" dirty="0">
-                <a:latin typeface="Calibri"/>
-                <a:ea typeface="Calibri"/>
-                <a:cs typeface="Calibri"/>
-                <a:sym typeface="Calibri"/>
-              </a:rPr>
-              <a:t>.</a:t>
-            </a:r>
-            <a:endParaRPr sz="1177" dirty="0"/>
-          </a:p>
-          <a:p>
-            <a:pPr algn="ctr"/>
-            <a:r>
-              <a:rPr lang="en" sz="1177" dirty="0">
-                <a:latin typeface="Calibri"/>
-                <a:ea typeface="Calibri"/>
-                <a:cs typeface="Calibri"/>
-                <a:sym typeface="Calibri"/>
-              </a:rPr>
-              <a:t>IP</a:t>
-            </a:r>
-            <a:endParaRPr sz="1177" dirty="0"/>
-          </a:p>
-        </p:txBody>
-      </p:sp>
-      <p:sp>
-        <p:nvSpPr>
-          <p:cNvPr id="108" name="Google Shape;674;p64">
-            <a:extLst>
-              <a:ext uri="{FF2B5EF4-FFF2-40B4-BE49-F238E27FC236}">
-                <a16:creationId xmlns:a16="http://schemas.microsoft.com/office/drawing/2014/main" id="{B78D0F1C-FC88-AD4A-8CB0-F0C9B4D7A746}"/>
-              </a:ext>
-            </a:extLst>
-          </p:cNvPr>
-          <p:cNvSpPr/>
-          <p:nvPr/>
-        </p:nvSpPr>
-        <p:spPr>
-          <a:xfrm rot="10800000">
-            <a:off x="2068736" y="1599813"/>
-            <a:ext cx="161209" cy="264482"/>
-          </a:xfrm>
-          <a:prstGeom prst="downArrow">
-            <a:avLst>
-              <a:gd name="adj1" fmla="val 50000"/>
-              <a:gd name="adj2" fmla="val 50000"/>
-            </a:avLst>
-          </a:prstGeom>
-          <a:solidFill>
-            <a:srgbClr val="238B45"/>
-          </a:solidFill>
-          <a:ln w="12700" cap="flat" cmpd="sng">
-            <a:solidFill>
-              <a:srgbClr val="238B45"/>
-            </a:solidFill>
-            <a:prstDash val="solid"/>
-            <a:miter lim="800000"/>
-            <a:headEnd type="none" w="sm" len="sm"/>
-            <a:tailEnd type="none" w="sm" len="sm"/>
-          </a:ln>
-        </p:spPr>
-        <p:txBody>
-          <a:bodyPr spcFirstLastPara="1" wrap="square" lIns="73332" tIns="36652" rIns="73332" bIns="36652" anchor="ctr" anchorCtr="0">
-            <a:noAutofit/>
-          </a:bodyPr>
-          <a:lstStyle/>
-          <a:p>
-            <a:pPr algn="ctr"/>
-            <a:endParaRPr sz="1496">
-              <a:solidFill>
-                <a:schemeClr val="lt1"/>
-              </a:solidFill>
-              <a:latin typeface="Calibri"/>
-              <a:ea typeface="Calibri"/>
-              <a:cs typeface="Calibri"/>
-              <a:sym typeface="Calibri"/>
-            </a:endParaRPr>
-          </a:p>
-        </p:txBody>
-      </p:sp>
-      <p:sp>
-        <p:nvSpPr>
-          <p:cNvPr id="109" name="Google Shape;692;p64">
-            <a:extLst>
-              <a:ext uri="{FF2B5EF4-FFF2-40B4-BE49-F238E27FC236}">
-                <a16:creationId xmlns:a16="http://schemas.microsoft.com/office/drawing/2014/main" id="{0A1BC7CF-6C32-794C-BCB1-97EE9FB322FD}"/>
-              </a:ext>
-            </a:extLst>
-          </p:cNvPr>
-          <p:cNvSpPr txBox="1"/>
-          <p:nvPr/>
-        </p:nvSpPr>
-        <p:spPr>
-          <a:xfrm>
-            <a:off x="1029335" y="1320823"/>
-            <a:ext cx="348724" cy="321135"/>
-          </a:xfrm>
-          <a:prstGeom prst="rect">
-            <a:avLst/>
-          </a:prstGeom>
-          <a:noFill/>
-          <a:ln>
-            <a:noFill/>
-          </a:ln>
-        </p:spPr>
-        <p:txBody>
-          <a:bodyPr spcFirstLastPara="1" wrap="square" lIns="73332" tIns="36652" rIns="73332" bIns="36652" anchor="t" anchorCtr="0">
-            <a:noAutofit/>
-          </a:bodyPr>
-          <a:lstStyle/>
-          <a:p>
-            <a:pPr algn="ctr"/>
-            <a:r>
-              <a:rPr lang="en" sz="1604" dirty="0">
-                <a:solidFill>
-                  <a:schemeClr val="dk1"/>
-                </a:solidFill>
-                <a:latin typeface="Calibri"/>
-                <a:ea typeface="Calibri"/>
-                <a:cs typeface="Calibri"/>
-                <a:sym typeface="Calibri"/>
-              </a:rPr>
-              <a:t>-3</a:t>
-            </a:r>
-            <a:endParaRPr sz="1177" dirty="0"/>
-          </a:p>
-        </p:txBody>
-      </p:sp>
-      <p:sp>
-        <p:nvSpPr>
-          <p:cNvPr id="110" name="Google Shape;698;p64">
-            <a:extLst>
-              <a:ext uri="{FF2B5EF4-FFF2-40B4-BE49-F238E27FC236}">
-                <a16:creationId xmlns:a16="http://schemas.microsoft.com/office/drawing/2014/main" id="{5548D782-8ABD-F647-8FFC-3457B161CA0E}"/>
-              </a:ext>
-            </a:extLst>
-          </p:cNvPr>
-          <p:cNvSpPr txBox="1"/>
-          <p:nvPr/>
-        </p:nvSpPr>
-        <p:spPr>
-          <a:xfrm>
-            <a:off x="141350" y="1690756"/>
-            <a:ext cx="4137333" cy="1092359"/>
-          </a:xfrm>
-          <a:prstGeom prst="rect">
-            <a:avLst/>
-          </a:prstGeom>
-          <a:noFill/>
-          <a:ln>
-            <a:noFill/>
-          </a:ln>
-        </p:spPr>
-        <p:txBody>
-          <a:bodyPr spcFirstLastPara="1" wrap="square" lIns="73332" tIns="36652" rIns="73332" bIns="36652" anchor="t" anchorCtr="0">
-            <a:noAutofit/>
-          </a:bodyPr>
-          <a:lstStyle/>
-          <a:p>
-            <a:r>
-              <a:rPr lang="en" sz="1604" b="1" u="sng" dirty="0">
-                <a:solidFill>
-                  <a:schemeClr val="dk1"/>
-                </a:solidFill>
-                <a:latin typeface="Calibri"/>
-                <a:ea typeface="Calibri"/>
-                <a:cs typeface="Calibri"/>
-                <a:sym typeface="Calibri"/>
-              </a:rPr>
-              <a:t>Groups</a:t>
-            </a:r>
-            <a:endParaRPr lang="en-US" sz="1604" dirty="0">
+            <a:ln>
+              <a:noFill/>
+            </a:ln>
+          </p:spPr>
+          <p:txBody>
+            <a:bodyPr spcFirstLastPara="1" wrap="square" lIns="73332" tIns="36652" rIns="73332" bIns="36652" anchor="t" anchorCtr="0">
+              <a:noAutofit/>
+            </a:bodyPr>
+            <a:lstStyle/>
+            <a:p>
+              <a:pPr algn="ctr"/>
+              <a:r>
+                <a:rPr lang="en" sz="1604" dirty="0">
+                  <a:solidFill>
+                    <a:schemeClr val="dk1"/>
+                  </a:solidFill>
+                  <a:latin typeface="Calibri"/>
+                  <a:ea typeface="Calibri"/>
+                  <a:cs typeface="Calibri"/>
+                  <a:sym typeface="Calibri"/>
+                </a:rPr>
+                <a:t>0</a:t>
+              </a:r>
+              <a:endParaRPr sz="1177" dirty="0"/>
+            </a:p>
+          </p:txBody>
+        </p:sp>
+        <p:cxnSp>
+          <p:nvCxnSpPr>
+            <p:cNvPr id="80" name="Google Shape;679;p64">
+              <a:extLst>
+                <a:ext uri="{FF2B5EF4-FFF2-40B4-BE49-F238E27FC236}">
+                  <a16:creationId xmlns:a16="http://schemas.microsoft.com/office/drawing/2014/main" id="{FC45F3DB-BE5C-4145-B24C-5673B1B2716E}"/>
+                </a:ext>
+              </a:extLst>
+            </p:cNvPr>
+            <p:cNvCxnSpPr>
+              <a:cxnSpLocks/>
+            </p:cNvCxnSpPr>
+            <p:nvPr/>
+          </p:nvCxnSpPr>
+          <p:spPr>
+            <a:xfrm>
+              <a:off x="1319509" y="1260810"/>
+              <a:ext cx="1947489" cy="0"/>
+            </a:xfrm>
+            <a:prstGeom prst="straightConnector1">
+              <a:avLst/>
+            </a:prstGeom>
+            <a:ln w="28575" cap="flat" cmpd="sng" algn="ctr">
               <a:solidFill>
                 <a:schemeClr val="dk1"/>
               </a:solidFill>
-              <a:ea typeface="Calibri"/>
-              <a:cs typeface="Calibri"/>
-              <a:sym typeface="Calibri"/>
-            </a:endParaRPr>
-          </a:p>
-          <a:p>
-            <a:r>
-              <a:rPr lang="en-US" sz="1604" dirty="0">
-                <a:solidFill>
-                  <a:srgbClr val="238B45"/>
-                </a:solidFill>
-                <a:ea typeface="Calibri"/>
-                <a:cs typeface="Calibri"/>
-                <a:sym typeface="Calibri"/>
-              </a:rPr>
-              <a:t>Clindamycin: 10mg/kg (N = 6)</a:t>
-            </a:r>
-          </a:p>
-          <a:p>
-            <a:r>
-              <a:rPr lang="en-US" sz="1604" dirty="0">
-                <a:solidFill>
-                  <a:srgbClr val="88419D"/>
-                </a:solidFill>
-                <a:ea typeface="Calibri"/>
-                <a:cs typeface="Calibri"/>
-                <a:sym typeface="Calibri"/>
-              </a:rPr>
-              <a:t>1-day of 15% PEG 3350 in drinking water (N = 6) </a:t>
-            </a:r>
-            <a:r>
-              <a:rPr lang="en-US" sz="1604" dirty="0">
-                <a:solidFill>
-                  <a:schemeClr val="dk1"/>
-                </a:solidFill>
-                <a:ea typeface="Calibri"/>
-                <a:cs typeface="Calibri"/>
-                <a:sym typeface="Calibri"/>
-              </a:rPr>
-              <a:t> </a:t>
-            </a:r>
-          </a:p>
-          <a:p>
-            <a:r>
-              <a:rPr lang="en-US" sz="1604" dirty="0">
-                <a:solidFill>
-                  <a:srgbClr val="225EA8"/>
-                </a:solidFill>
-                <a:ea typeface="Calibri"/>
-                <a:cs typeface="Calibri"/>
-                <a:sym typeface="Calibri"/>
-              </a:rPr>
-              <a:t>1-day PEG 3350 + 1-day recovery (N = 6)</a:t>
-            </a:r>
-            <a:br>
-              <a:rPr lang="en-US" sz="1604" dirty="0">
-                <a:solidFill>
-                  <a:srgbClr val="225EA8"/>
-                </a:solidFill>
-                <a:ea typeface="Calibri"/>
-                <a:cs typeface="Calibri"/>
-                <a:sym typeface="Calibri"/>
-              </a:rPr>
-            </a:br>
-            <a:endParaRPr lang="en-US" sz="1604" dirty="0">
+              <a:prstDash val="solid"/>
+              <a:round/>
+              <a:headEnd type="none" w="med" len="med"/>
+              <a:tailEnd type="none" w="med" len="med"/>
+            </a:ln>
+          </p:spPr>
+          <p:style>
+            <a:lnRef idx="0">
+              <a:scrgbClr r="0" g="0" b="0"/>
+            </a:lnRef>
+            <a:fillRef idx="0">
+              <a:scrgbClr r="0" g="0" b="0"/>
+            </a:fillRef>
+            <a:effectRef idx="0">
+              <a:scrgbClr r="0" g="0" b="0"/>
+            </a:effectRef>
+            <a:fontRef idx="minor">
+              <a:schemeClr val="tx1"/>
+            </a:fontRef>
+          </p:style>
+        </p:cxnSp>
+        <p:cxnSp>
+          <p:nvCxnSpPr>
+            <p:cNvPr id="81" name="Google Shape;684;p64">
+              <a:extLst>
+                <a:ext uri="{FF2B5EF4-FFF2-40B4-BE49-F238E27FC236}">
+                  <a16:creationId xmlns:a16="http://schemas.microsoft.com/office/drawing/2014/main" id="{91BA9CBA-7934-B34A-90AF-486E290C7CCB}"/>
+                </a:ext>
+              </a:extLst>
+            </p:cNvPr>
+            <p:cNvCxnSpPr/>
+            <p:nvPr/>
+          </p:nvCxnSpPr>
+          <p:spPr>
+            <a:xfrm>
+              <a:off x="1319506" y="1049192"/>
+              <a:ext cx="0" cy="423476"/>
+            </a:xfrm>
+            <a:prstGeom prst="straightConnector1">
+              <a:avLst/>
+            </a:prstGeom>
+            <a:noFill/>
+            <a:ln w="28575" cap="flat" cmpd="sng">
               <a:solidFill>
                 <a:schemeClr val="dk1"/>
               </a:solidFill>
-              <a:ea typeface="Calibri"/>
-              <a:cs typeface="Calibri"/>
-              <a:sym typeface="Calibri"/>
-            </a:endParaRPr>
-          </a:p>
-        </p:txBody>
-      </p:sp>
-      <p:sp>
-        <p:nvSpPr>
-          <p:cNvPr id="112" name="Google Shape;692;p64">
-            <a:extLst>
-              <a:ext uri="{FF2B5EF4-FFF2-40B4-BE49-F238E27FC236}">
-                <a16:creationId xmlns:a16="http://schemas.microsoft.com/office/drawing/2014/main" id="{A7308918-56D7-5348-89C1-4CDF83B3130F}"/>
-              </a:ext>
-            </a:extLst>
-          </p:cNvPr>
-          <p:cNvSpPr txBox="1"/>
-          <p:nvPr/>
-        </p:nvSpPr>
-        <p:spPr>
-          <a:xfrm>
-            <a:off x="1494459" y="1315986"/>
-            <a:ext cx="348724" cy="321135"/>
-          </a:xfrm>
-          <a:prstGeom prst="rect">
-            <a:avLst/>
-          </a:prstGeom>
-          <a:noFill/>
-          <a:ln>
+              <a:prstDash val="solid"/>
+              <a:miter lim="800000"/>
+              <a:headEnd type="none" w="sm" len="sm"/>
+              <a:tailEnd type="none" w="sm" len="sm"/>
+            </a:ln>
+          </p:spPr>
+        </p:cxnSp>
+        <p:cxnSp>
+          <p:nvCxnSpPr>
+            <p:cNvPr id="82" name="Google Shape;685;p64">
+              <a:extLst>
+                <a:ext uri="{FF2B5EF4-FFF2-40B4-BE49-F238E27FC236}">
+                  <a16:creationId xmlns:a16="http://schemas.microsoft.com/office/drawing/2014/main" id="{B007A5F0-B136-4340-9241-1221F16A7D88}"/>
+                </a:ext>
+              </a:extLst>
+            </p:cNvPr>
+            <p:cNvCxnSpPr/>
+            <p:nvPr/>
+          </p:nvCxnSpPr>
+          <p:spPr>
+            <a:xfrm>
+              <a:off x="1792261" y="1048965"/>
+              <a:ext cx="0" cy="423476"/>
+            </a:xfrm>
+            <a:prstGeom prst="straightConnector1">
+              <a:avLst/>
+            </a:prstGeom>
             <a:noFill/>
-          </a:ln>
-        </p:spPr>
-        <p:txBody>
-          <a:bodyPr spcFirstLastPara="1" wrap="square" lIns="73332" tIns="36652" rIns="73332" bIns="36652" anchor="t" anchorCtr="0">
-            <a:noAutofit/>
-          </a:bodyPr>
-          <a:lstStyle/>
-          <a:p>
-            <a:pPr algn="ctr"/>
-            <a:r>
-              <a:rPr lang="en" sz="1604" dirty="0">
-                <a:solidFill>
-                  <a:schemeClr val="dk1"/>
-                </a:solidFill>
-                <a:latin typeface="Calibri"/>
-                <a:ea typeface="Calibri"/>
-                <a:cs typeface="Calibri"/>
-                <a:sym typeface="Calibri"/>
-              </a:rPr>
-              <a:t>-2</a:t>
-            </a:r>
-            <a:endParaRPr sz="1177" dirty="0"/>
-          </a:p>
-        </p:txBody>
-      </p:sp>
-      <p:grpSp>
-        <p:nvGrpSpPr>
-          <p:cNvPr id="113" name="Group 112">
-            <a:extLst>
-              <a:ext uri="{FF2B5EF4-FFF2-40B4-BE49-F238E27FC236}">
-                <a16:creationId xmlns:a16="http://schemas.microsoft.com/office/drawing/2014/main" id="{DDF1859F-D54A-1741-8050-23B6A32399D8}"/>
-              </a:ext>
-            </a:extLst>
-          </p:cNvPr>
-          <p:cNvGrpSpPr/>
-          <p:nvPr/>
-        </p:nvGrpSpPr>
-        <p:grpSpPr>
-          <a:xfrm>
-            <a:off x="2185953" y="469537"/>
-            <a:ext cx="660320" cy="393010"/>
-            <a:chOff x="1324142" y="2409098"/>
-            <a:chExt cx="741504" cy="490016"/>
-          </a:xfrm>
-        </p:grpSpPr>
+            <a:ln w="28575" cap="flat" cmpd="sng">
+              <a:solidFill>
+                <a:schemeClr val="dk1"/>
+              </a:solidFill>
+              <a:prstDash val="solid"/>
+              <a:miter lim="800000"/>
+              <a:headEnd type="none" w="sm" len="sm"/>
+              <a:tailEnd type="none" w="sm" len="sm"/>
+            </a:ln>
+          </p:spPr>
+        </p:cxnSp>
+        <p:cxnSp>
+          <p:nvCxnSpPr>
+            <p:cNvPr id="85" name="Google Shape;686;p64">
+              <a:extLst>
+                <a:ext uri="{FF2B5EF4-FFF2-40B4-BE49-F238E27FC236}">
+                  <a16:creationId xmlns:a16="http://schemas.microsoft.com/office/drawing/2014/main" id="{A9D04165-1161-484E-8238-2F421DBDB347}"/>
+                </a:ext>
+              </a:extLst>
+            </p:cNvPr>
+            <p:cNvCxnSpPr/>
+            <p:nvPr/>
+          </p:nvCxnSpPr>
+          <p:spPr>
+            <a:xfrm>
+              <a:off x="2246182" y="1056129"/>
+              <a:ext cx="0" cy="423476"/>
+            </a:xfrm>
+            <a:prstGeom prst="straightConnector1">
+              <a:avLst/>
+            </a:prstGeom>
+            <a:noFill/>
+            <a:ln w="28575" cap="flat" cmpd="sng">
+              <a:solidFill>
+                <a:schemeClr val="dk1"/>
+              </a:solidFill>
+              <a:prstDash val="solid"/>
+              <a:miter lim="800000"/>
+              <a:headEnd type="none" w="sm" len="sm"/>
+              <a:tailEnd type="none" w="sm" len="sm"/>
+            </a:ln>
+          </p:spPr>
+        </p:cxnSp>
+        <p:cxnSp>
+          <p:nvCxnSpPr>
+            <p:cNvPr id="87" name="Google Shape;687;p64">
+              <a:extLst>
+                <a:ext uri="{FF2B5EF4-FFF2-40B4-BE49-F238E27FC236}">
+                  <a16:creationId xmlns:a16="http://schemas.microsoft.com/office/drawing/2014/main" id="{C3322923-51D2-034E-8930-3E0D543E19C7}"/>
+                </a:ext>
+              </a:extLst>
+            </p:cNvPr>
+            <p:cNvCxnSpPr/>
+            <p:nvPr/>
+          </p:nvCxnSpPr>
+          <p:spPr>
+            <a:xfrm>
+              <a:off x="2740115" y="1056129"/>
+              <a:ext cx="0" cy="423476"/>
+            </a:xfrm>
+            <a:prstGeom prst="straightConnector1">
+              <a:avLst/>
+            </a:prstGeom>
+            <a:noFill/>
+            <a:ln w="28575" cap="flat" cmpd="sng">
+              <a:solidFill>
+                <a:schemeClr val="dk1"/>
+              </a:solidFill>
+              <a:prstDash val="solid"/>
+              <a:miter lim="800000"/>
+              <a:headEnd type="none" w="sm" len="sm"/>
+              <a:tailEnd type="none" w="sm" len="sm"/>
+            </a:ln>
+          </p:spPr>
+        </p:cxnSp>
+        <p:cxnSp>
+          <p:nvCxnSpPr>
+            <p:cNvPr id="102" name="Google Shape;681;p64">
+              <a:extLst>
+                <a:ext uri="{FF2B5EF4-FFF2-40B4-BE49-F238E27FC236}">
+                  <a16:creationId xmlns:a16="http://schemas.microsoft.com/office/drawing/2014/main" id="{58961B80-DDDB-C943-9BA6-5035DFA1010F}"/>
+                </a:ext>
+              </a:extLst>
+            </p:cNvPr>
+            <p:cNvCxnSpPr/>
+            <p:nvPr/>
+          </p:nvCxnSpPr>
+          <p:spPr>
+            <a:xfrm>
+              <a:off x="3266998" y="1056129"/>
+              <a:ext cx="0" cy="423476"/>
+            </a:xfrm>
+            <a:prstGeom prst="straightConnector1">
+              <a:avLst/>
+            </a:prstGeom>
+            <a:noFill/>
+            <a:ln w="28575" cap="flat" cmpd="sng">
+              <a:solidFill>
+                <a:schemeClr val="dk1"/>
+              </a:solidFill>
+              <a:prstDash val="solid"/>
+              <a:miter lim="800000"/>
+              <a:headEnd type="none" w="sm" len="sm"/>
+              <a:tailEnd type="none" w="sm" len="sm"/>
+            </a:ln>
+          </p:spPr>
+        </p:cxnSp>
         <p:sp>
           <p:nvSpPr>
-            <p:cNvPr id="114" name="Google Shape;703;p64">
+            <p:cNvPr id="106" name="Google Shape;694;p64">
               <a:extLst>
                 <a:ext uri="{FF2B5EF4-FFF2-40B4-BE49-F238E27FC236}">
-                  <a16:creationId xmlns:a16="http://schemas.microsoft.com/office/drawing/2014/main" id="{4BB93294-88E6-FA41-8D8A-2B5EF2207AEA}"/>
+                  <a16:creationId xmlns:a16="http://schemas.microsoft.com/office/drawing/2014/main" id="{6E3C588D-2F32-4344-9E55-9938FE26A530}"/>
+                </a:ext>
+              </a:extLst>
+            </p:cNvPr>
+            <p:cNvSpPr txBox="1"/>
+            <p:nvPr/>
+          </p:nvSpPr>
+          <p:spPr>
+            <a:xfrm>
+              <a:off x="3024464" y="1458798"/>
+              <a:ext cx="485069" cy="321135"/>
+            </a:xfrm>
+            <a:prstGeom prst="rect">
+              <a:avLst/>
+            </a:prstGeom>
+            <a:noFill/>
+            <a:ln>
+              <a:noFill/>
+            </a:ln>
+          </p:spPr>
+          <p:txBody>
+            <a:bodyPr spcFirstLastPara="1" wrap="square" lIns="73332" tIns="36652" rIns="73332" bIns="36652" anchor="t" anchorCtr="0">
+              <a:noAutofit/>
+            </a:bodyPr>
+            <a:lstStyle/>
+            <a:p>
+              <a:pPr algn="ctr"/>
+              <a:r>
+                <a:rPr lang="en" sz="1604" dirty="0">
+                  <a:solidFill>
+                    <a:schemeClr val="dk1"/>
+                  </a:solidFill>
+                  <a:latin typeface="Calibri"/>
+                  <a:cs typeface="Calibri"/>
+                  <a:sym typeface="Calibri"/>
+                </a:rPr>
+                <a:t>10</a:t>
+              </a:r>
+            </a:p>
+            <a:p>
+              <a:pPr algn="ctr"/>
+              <a:endParaRPr sz="1177" dirty="0"/>
+            </a:p>
+          </p:txBody>
+        </p:sp>
+        <p:sp>
+          <p:nvSpPr>
+            <p:cNvPr id="107" name="Google Shape;658;p64">
+              <a:extLst>
+                <a:ext uri="{FF2B5EF4-FFF2-40B4-BE49-F238E27FC236}">
+                  <a16:creationId xmlns:a16="http://schemas.microsoft.com/office/drawing/2014/main" id="{ECEF656C-0434-B74F-9129-A24EE5ADACBF}"/>
                 </a:ext>
               </a:extLst>
             </p:cNvPr>
@@ -4493,9 +4153,76 @@
             <p:nvPr/>
           </p:nvSpPr>
           <p:spPr>
-            <a:xfrm rot="16200000">
-              <a:off x="1367936" y="2392324"/>
-              <a:ext cx="490016" cy="523564"/>
+            <a:xfrm>
+              <a:off x="1412070" y="1704056"/>
+              <a:ext cx="1171289" cy="419624"/>
+            </a:xfrm>
+            <a:prstGeom prst="rect">
+              <a:avLst/>
+            </a:prstGeom>
+            <a:noFill/>
+            <a:ln>
+              <a:noFill/>
+            </a:ln>
+          </p:spPr>
+          <p:txBody>
+            <a:bodyPr spcFirstLastPara="1" wrap="square" lIns="73332" tIns="36652" rIns="73332" bIns="36652" anchor="t" anchorCtr="0">
+              <a:noAutofit/>
+            </a:bodyPr>
+            <a:lstStyle/>
+            <a:p>
+              <a:pPr algn="ctr"/>
+              <a:r>
+                <a:rPr lang="en" sz="1177" dirty="0" err="1">
+                  <a:latin typeface="Calibri"/>
+                  <a:ea typeface="Calibri"/>
+                  <a:cs typeface="Calibri"/>
+                  <a:sym typeface="Calibri"/>
+                </a:rPr>
+                <a:t>Clind</a:t>
+              </a:r>
+              <a:r>
+                <a:rPr lang="en" sz="1177" dirty="0">
+                  <a:latin typeface="Calibri"/>
+                  <a:ea typeface="Calibri"/>
+                  <a:cs typeface="Calibri"/>
+                  <a:sym typeface="Calibri"/>
+                </a:rPr>
+                <a:t>.</a:t>
+              </a:r>
+              <a:endParaRPr sz="1177" dirty="0"/>
+            </a:p>
+            <a:p>
+              <a:pPr algn="ctr"/>
+              <a:r>
+                <a:rPr lang="en" sz="1177" dirty="0">
+                  <a:latin typeface="Calibri"/>
+                  <a:ea typeface="Calibri"/>
+                  <a:cs typeface="Calibri"/>
+                  <a:sym typeface="Calibri"/>
+                </a:rPr>
+                <a:t>IP</a:t>
+              </a:r>
+              <a:endParaRPr sz="1177" dirty="0"/>
+            </a:p>
+          </p:txBody>
+        </p:sp>
+        <p:sp>
+          <p:nvSpPr>
+            <p:cNvPr id="108" name="Google Shape;674;p64">
+              <a:extLst>
+                <a:ext uri="{FF2B5EF4-FFF2-40B4-BE49-F238E27FC236}">
+                  <a16:creationId xmlns:a16="http://schemas.microsoft.com/office/drawing/2014/main" id="{B78D0F1C-FC88-AD4A-8CB0-F0C9B4D7A746}"/>
+                </a:ext>
+              </a:extLst>
+            </p:cNvPr>
+            <p:cNvSpPr/>
+            <p:nvPr/>
+          </p:nvSpPr>
+          <p:spPr>
+            <a:xfrm rot="10800000">
+              <a:off x="2154080" y="1709541"/>
+              <a:ext cx="161209" cy="264482"/>
             </a:xfrm>
             <a:prstGeom prst="downArrow">
               <a:avLst>
@@ -4504,11 +4231,11 @@
               </a:avLst>
             </a:prstGeom>
             <a:solidFill>
-              <a:srgbClr val="88419D"/>
+              <a:srgbClr val="238B45"/>
             </a:solidFill>
             <a:ln w="12700" cap="flat" cmpd="sng">
               <a:solidFill>
-                <a:srgbClr val="88419D"/>
+                <a:srgbClr val="238B45"/>
               </a:solidFill>
               <a:prstDash val="solid"/>
               <a:miter lim="800000"/>
@@ -4523,7 +4250,7 @@
             <a:lstStyle/>
             <a:p>
               <a:pPr algn="ctr"/>
-              <a:endParaRPr sz="1496" dirty="0">
+              <a:endParaRPr sz="1496">
                 <a:solidFill>
                   <a:schemeClr val="lt1"/>
                 </a:solidFill>
@@ -4537,20 +4264,68 @@
         </p:sp>
         <p:sp>
           <p:nvSpPr>
-            <p:cNvPr id="115" name="Google Shape;677;p64">
+            <p:cNvPr id="109" name="Google Shape;692;p64">
               <a:extLst>
                 <a:ext uri="{FF2B5EF4-FFF2-40B4-BE49-F238E27FC236}">
-                  <a16:creationId xmlns:a16="http://schemas.microsoft.com/office/drawing/2014/main" id="{E50F65B1-1EFC-F540-907E-95FD62BC3225}"/>
+                  <a16:creationId xmlns:a16="http://schemas.microsoft.com/office/drawing/2014/main" id="{0A1BC7CF-6C32-794C-BCB1-97EE9FB322FD}"/>
                 </a:ext>
               </a:extLst>
             </p:cNvPr>
-            <p:cNvSpPr/>
+            <p:cNvSpPr txBox="1"/>
             <p:nvPr/>
           </p:nvSpPr>
           <p:spPr>
             <a:xfrm>
-              <a:off x="1324142" y="2478517"/>
-              <a:ext cx="741504" cy="337083"/>
+              <a:off x="1114679" y="1430551"/>
+              <a:ext cx="348724" cy="321135"/>
+            </a:xfrm>
+            <a:prstGeom prst="rect">
+              <a:avLst/>
+            </a:prstGeom>
+            <a:noFill/>
+            <a:ln>
+              <a:noFill/>
+            </a:ln>
+          </p:spPr>
+          <p:txBody>
+            <a:bodyPr spcFirstLastPara="1" wrap="square" lIns="73332" tIns="36652" rIns="73332" bIns="36652" anchor="t" anchorCtr="0">
+              <a:noAutofit/>
+            </a:bodyPr>
+            <a:lstStyle/>
+            <a:p>
+              <a:pPr algn="ctr"/>
+              <a:r>
+                <a:rPr lang="en" sz="1604" dirty="0">
+                  <a:solidFill>
+                    <a:schemeClr val="dk1"/>
+                  </a:solidFill>
+                  <a:latin typeface="Calibri"/>
+                  <a:ea typeface="Calibri"/>
+                  <a:cs typeface="Calibri"/>
+                  <a:sym typeface="Calibri"/>
+                </a:rPr>
+                <a:t>-3</a:t>
+              </a:r>
+              <a:endParaRPr sz="1177" dirty="0"/>
+            </a:p>
+          </p:txBody>
+        </p:sp>
+        <p:sp>
+          <p:nvSpPr>
+            <p:cNvPr id="110" name="Google Shape;698;p64">
+              <a:extLst>
+                <a:ext uri="{FF2B5EF4-FFF2-40B4-BE49-F238E27FC236}">
+                  <a16:creationId xmlns:a16="http://schemas.microsoft.com/office/drawing/2014/main" id="{5548D782-8ABD-F647-8FFC-3457B161CA0E}"/>
+                </a:ext>
+              </a:extLst>
+            </p:cNvPr>
+            <p:cNvSpPr txBox="1"/>
+            <p:nvPr/>
+          </p:nvSpPr>
+          <p:spPr>
+            <a:xfrm>
+              <a:off x="226694" y="1800484"/>
+              <a:ext cx="4137333" cy="1092359"/>
             </a:xfrm>
             <a:prstGeom prst="rect">
               <a:avLst/>
@@ -4567,205 +4342,451 @@
             <a:lstStyle/>
             <a:p>
               <a:r>
-                <a:rPr lang="en-US" sz="1171" dirty="0">
+                <a:rPr lang="en" sz="1604" b="1" u="sng" dirty="0">
                   <a:solidFill>
-                    <a:schemeClr val="bg1"/>
+                    <a:schemeClr val="dk1"/>
+                  </a:solidFill>
+                  <a:latin typeface="Calibri"/>
+                  <a:ea typeface="Calibri"/>
+                  <a:cs typeface="Calibri"/>
+                  <a:sym typeface="Calibri"/>
+                </a:rPr>
+                <a:t>Groups</a:t>
+              </a:r>
+              <a:endParaRPr lang="en-US" sz="1604" dirty="0">
+                <a:solidFill>
+                  <a:schemeClr val="dk1"/>
+                </a:solidFill>
+                <a:ea typeface="Calibri"/>
+                <a:cs typeface="Calibri"/>
+                <a:sym typeface="Calibri"/>
+              </a:endParaRPr>
+            </a:p>
+            <a:p>
+              <a:r>
+                <a:rPr lang="en-US" sz="1604" dirty="0">
+                  <a:solidFill>
+                    <a:srgbClr val="238B45"/>
                   </a:solidFill>
                   <a:ea typeface="Calibri"/>
                   <a:cs typeface="Calibri"/>
                   <a:sym typeface="Calibri"/>
                 </a:rPr>
-                <a:t>PEG</a:t>
+                <a:t>Clindamycin: 10mg/kg (N = 6)</a:t>
               </a:r>
+            </a:p>
+            <a:p>
+              <a:r>
+                <a:rPr lang="en-US" sz="1604" dirty="0">
+                  <a:solidFill>
+                    <a:srgbClr val="88419D"/>
+                  </a:solidFill>
+                  <a:ea typeface="Calibri"/>
+                  <a:cs typeface="Calibri"/>
+                  <a:sym typeface="Calibri"/>
+                </a:rPr>
+                <a:t>1-day of 15% PEG 3350 in drinking water (N = 6) </a:t>
+              </a:r>
+              <a:r>
+                <a:rPr lang="en-US" sz="1604" dirty="0">
+                  <a:solidFill>
+                    <a:schemeClr val="dk1"/>
+                  </a:solidFill>
+                  <a:ea typeface="Calibri"/>
+                  <a:cs typeface="Calibri"/>
+                  <a:sym typeface="Calibri"/>
+                </a:rPr>
+                <a:t> </a:t>
+              </a:r>
+            </a:p>
+            <a:p>
+              <a:r>
+                <a:rPr lang="en-US" sz="1604" dirty="0">
+                  <a:solidFill>
+                    <a:srgbClr val="225EA8"/>
+                  </a:solidFill>
+                  <a:ea typeface="Calibri"/>
+                  <a:cs typeface="Calibri"/>
+                  <a:sym typeface="Calibri"/>
+                </a:rPr>
+                <a:t>1-day PEG 3350 + 1-day recovery (N = 6)</a:t>
+              </a:r>
+              <a:br>
+                <a:rPr lang="en-US" sz="1604" dirty="0">
+                  <a:solidFill>
+                    <a:srgbClr val="225EA8"/>
+                  </a:solidFill>
+                  <a:ea typeface="Calibri"/>
+                  <a:cs typeface="Calibri"/>
+                  <a:sym typeface="Calibri"/>
+                </a:rPr>
+              </a:br>
+              <a:endParaRPr lang="en-US" sz="1604" dirty="0">
+                <a:solidFill>
+                  <a:schemeClr val="dk1"/>
+                </a:solidFill>
+                <a:ea typeface="Calibri"/>
+                <a:cs typeface="Calibri"/>
+                <a:sym typeface="Calibri"/>
+              </a:endParaRPr>
+            </a:p>
+          </p:txBody>
+        </p:sp>
+        <p:sp>
+          <p:nvSpPr>
+            <p:cNvPr id="112" name="Google Shape;692;p64">
+              <a:extLst>
+                <a:ext uri="{FF2B5EF4-FFF2-40B4-BE49-F238E27FC236}">
+                  <a16:creationId xmlns:a16="http://schemas.microsoft.com/office/drawing/2014/main" id="{A7308918-56D7-5348-89C1-4CDF83B3130F}"/>
+                </a:ext>
+              </a:extLst>
+            </p:cNvPr>
+            <p:cNvSpPr txBox="1"/>
+            <p:nvPr/>
+          </p:nvSpPr>
+          <p:spPr>
+            <a:xfrm>
+              <a:off x="1579803" y="1425714"/>
+              <a:ext cx="348724" cy="321135"/>
+            </a:xfrm>
+            <a:prstGeom prst="rect">
+              <a:avLst/>
+            </a:prstGeom>
+            <a:noFill/>
+            <a:ln>
+              <a:noFill/>
+            </a:ln>
+          </p:spPr>
+          <p:txBody>
+            <a:bodyPr spcFirstLastPara="1" wrap="square" lIns="73332" tIns="36652" rIns="73332" bIns="36652" anchor="t" anchorCtr="0">
+              <a:noAutofit/>
+            </a:bodyPr>
+            <a:lstStyle/>
+            <a:p>
+              <a:pPr algn="ctr"/>
+              <a:r>
+                <a:rPr lang="en" sz="1604" dirty="0">
+                  <a:solidFill>
+                    <a:schemeClr val="dk1"/>
+                  </a:solidFill>
+                  <a:latin typeface="Calibri"/>
+                  <a:ea typeface="Calibri"/>
+                  <a:cs typeface="Calibri"/>
+                  <a:sym typeface="Calibri"/>
+                </a:rPr>
+                <a:t>-2</a:t>
+              </a:r>
+              <a:endParaRPr sz="1177" dirty="0"/>
+            </a:p>
+          </p:txBody>
+        </p:sp>
+        <p:grpSp>
+          <p:nvGrpSpPr>
+            <p:cNvPr id="113" name="Group 112">
+              <a:extLst>
+                <a:ext uri="{FF2B5EF4-FFF2-40B4-BE49-F238E27FC236}">
+                  <a16:creationId xmlns:a16="http://schemas.microsoft.com/office/drawing/2014/main" id="{DDF1859F-D54A-1741-8050-23B6A32399D8}"/>
+                </a:ext>
+              </a:extLst>
+            </p:cNvPr>
+            <p:cNvGrpSpPr/>
+            <p:nvPr/>
+          </p:nvGrpSpPr>
+          <p:grpSpPr>
+            <a:xfrm>
+              <a:off x="2271297" y="579265"/>
+              <a:ext cx="698161" cy="393010"/>
+              <a:chOff x="1324141" y="2409098"/>
+              <a:chExt cx="783997" cy="490016"/>
+            </a:xfrm>
+          </p:grpSpPr>
+          <p:sp>
+            <p:nvSpPr>
+              <p:cNvPr id="114" name="Google Shape;703;p64">
+                <a:extLst>
+                  <a:ext uri="{FF2B5EF4-FFF2-40B4-BE49-F238E27FC236}">
+                    <a16:creationId xmlns:a16="http://schemas.microsoft.com/office/drawing/2014/main" id="{4BB93294-88E6-FA41-8D8A-2B5EF2207AEA}"/>
+                  </a:ext>
+                </a:extLst>
+              </p:cNvPr>
+              <p:cNvSpPr/>
+              <p:nvPr/>
+            </p:nvSpPr>
+            <p:spPr>
+              <a:xfrm rot="16200000">
+                <a:off x="1367936" y="2392324"/>
+                <a:ext cx="490016" cy="523564"/>
+              </a:xfrm>
+              <a:prstGeom prst="downArrow">
+                <a:avLst>
+                  <a:gd name="adj1" fmla="val 50000"/>
+                  <a:gd name="adj2" fmla="val 50000"/>
+                </a:avLst>
+              </a:prstGeom>
+              <a:solidFill>
+                <a:srgbClr val="88419D"/>
+              </a:solidFill>
+              <a:ln w="12700" cap="flat" cmpd="sng">
+                <a:solidFill>
+                  <a:srgbClr val="88419D"/>
+                </a:solidFill>
+                <a:prstDash val="solid"/>
+                <a:miter lim="800000"/>
+                <a:headEnd type="none" w="sm" len="sm"/>
+                <a:tailEnd type="none" w="sm" len="sm"/>
+              </a:ln>
+            </p:spPr>
+            <p:txBody>
+              <a:bodyPr spcFirstLastPara="1" wrap="square" lIns="73332" tIns="36652" rIns="73332" bIns="36652" anchor="ctr" anchorCtr="0">
+                <a:noAutofit/>
+              </a:bodyPr>
+              <a:lstStyle/>
+              <a:p>
+                <a:pPr algn="ctr"/>
+                <a:endParaRPr sz="1496" dirty="0">
+                  <a:solidFill>
+                    <a:schemeClr val="lt1"/>
+                  </a:solidFill>
+                  <a:latin typeface="Calibri"/>
+                  <a:ea typeface="Calibri"/>
+                  <a:cs typeface="Calibri"/>
+                  <a:sym typeface="Calibri"/>
+                </a:endParaRPr>
+              </a:p>
+            </p:txBody>
+          </p:sp>
+          <p:sp>
+            <p:nvSpPr>
+              <p:cNvPr id="115" name="Google Shape;677;p64">
+                <a:extLst>
+                  <a:ext uri="{FF2B5EF4-FFF2-40B4-BE49-F238E27FC236}">
+                    <a16:creationId xmlns:a16="http://schemas.microsoft.com/office/drawing/2014/main" id="{E50F65B1-1EFC-F540-907E-95FD62BC3225}"/>
+                  </a:ext>
+                </a:extLst>
+              </p:cNvPr>
+              <p:cNvSpPr/>
+              <p:nvPr/>
+            </p:nvSpPr>
+            <p:spPr>
+              <a:xfrm>
+                <a:off x="1324141" y="2478515"/>
+                <a:ext cx="783997" cy="373982"/>
+              </a:xfrm>
+              <a:prstGeom prst="rect">
+                <a:avLst/>
+              </a:prstGeom>
+              <a:noFill/>
+              <a:ln>
+                <a:noFill/>
+              </a:ln>
+            </p:spPr>
+            <p:txBody>
+              <a:bodyPr spcFirstLastPara="1" wrap="square" lIns="73332" tIns="36652" rIns="73332" bIns="36652" anchor="t" anchorCtr="0">
+                <a:noAutofit/>
+              </a:bodyPr>
+              <a:lstStyle/>
+              <a:p>
+                <a:r>
+                  <a:rPr lang="en-US" sz="1171" dirty="0">
+                    <a:solidFill>
+                      <a:schemeClr val="bg1"/>
+                    </a:solidFill>
+                    <a:ea typeface="Calibri"/>
+                    <a:cs typeface="Calibri"/>
+                    <a:sym typeface="Calibri"/>
+                  </a:rPr>
+                  <a:t>PEG</a:t>
+                </a:r>
+              </a:p>
+            </p:txBody>
+          </p:sp>
+        </p:grpSp>
+        <p:sp>
+          <p:nvSpPr>
+            <p:cNvPr id="118" name="Google Shape;656;p64">
+              <a:extLst>
+                <a:ext uri="{FF2B5EF4-FFF2-40B4-BE49-F238E27FC236}">
+                  <a16:creationId xmlns:a16="http://schemas.microsoft.com/office/drawing/2014/main" id="{65941FD9-28C1-8D4C-9E1D-A34C1F0B2926}"/>
+                </a:ext>
+              </a:extLst>
+            </p:cNvPr>
+            <p:cNvSpPr txBox="1"/>
+            <p:nvPr/>
+          </p:nvSpPr>
+          <p:spPr>
+            <a:xfrm>
+              <a:off x="2733066" y="1772453"/>
+              <a:ext cx="1296227" cy="432627"/>
+            </a:xfrm>
+            <a:prstGeom prst="rect">
+              <a:avLst/>
+            </a:prstGeom>
+            <a:noFill/>
+            <a:ln>
+              <a:noFill/>
+            </a:ln>
+          </p:spPr>
+          <p:txBody>
+            <a:bodyPr spcFirstLastPara="1" wrap="square" lIns="73332" tIns="36652" rIns="73332" bIns="36652" anchor="t" anchorCtr="0">
+              <a:noAutofit/>
+            </a:bodyPr>
+            <a:lstStyle/>
+            <a:p>
+              <a:pPr algn="ctr"/>
+              <a:r>
+                <a:rPr lang="en" sz="1177" dirty="0">
+                  <a:latin typeface="Calibri"/>
+                  <a:ea typeface="Calibri"/>
+                  <a:cs typeface="Calibri"/>
+                  <a:sym typeface="Calibri"/>
+                </a:rPr>
+                <a:t>Gavage 10</a:t>
+              </a:r>
+              <a:r>
+                <a:rPr lang="en" sz="1177" baseline="30000" dirty="0">
+                  <a:latin typeface="Calibri"/>
+                  <a:ea typeface="Calibri"/>
+                  <a:cs typeface="Calibri"/>
+                  <a:sym typeface="Calibri"/>
+                </a:rPr>
+                <a:t>5</a:t>
+              </a:r>
+              <a:r>
+                <a:rPr lang="en" sz="1177" dirty="0">
+                  <a:latin typeface="Calibri"/>
+                  <a:ea typeface="Calibri"/>
+                  <a:cs typeface="Calibri"/>
+                  <a:sym typeface="Calibri"/>
+                </a:rPr>
+                <a:t> spores </a:t>
+              </a:r>
+              <a:r>
+                <a:rPr lang="en" sz="1177" i="1" dirty="0">
+                  <a:latin typeface="Calibri"/>
+                  <a:ea typeface="Calibri"/>
+                  <a:cs typeface="Calibri"/>
+                  <a:sym typeface="Calibri"/>
+                </a:rPr>
+                <a:t>C. difficile </a:t>
+              </a:r>
+              <a:r>
+                <a:rPr lang="en" sz="1177" dirty="0">
+                  <a:latin typeface="Calibri"/>
+                  <a:ea typeface="Calibri"/>
+                  <a:cs typeface="Calibri"/>
+                  <a:sym typeface="Calibri"/>
+                </a:rPr>
+                <a:t>630</a:t>
+              </a:r>
+              <a:endParaRPr sz="1177" dirty="0"/>
+            </a:p>
+          </p:txBody>
+        </p:sp>
+        <p:sp>
+          <p:nvSpPr>
+            <p:cNvPr id="120" name="Google Shape;675;p64">
+              <a:extLst>
+                <a:ext uri="{FF2B5EF4-FFF2-40B4-BE49-F238E27FC236}">
+                  <a16:creationId xmlns:a16="http://schemas.microsoft.com/office/drawing/2014/main" id="{64610CCC-3534-BD4B-80EC-80129F609487}"/>
+                </a:ext>
+              </a:extLst>
+            </p:cNvPr>
+            <p:cNvSpPr/>
+            <p:nvPr/>
+          </p:nvSpPr>
+          <p:spPr>
+            <a:xfrm rot="10800000">
+              <a:off x="2658717" y="1689886"/>
+              <a:ext cx="161208" cy="284128"/>
+            </a:xfrm>
+            <a:prstGeom prst="downArrow">
+              <a:avLst>
+                <a:gd name="adj1" fmla="val 50000"/>
+                <a:gd name="adj2" fmla="val 50000"/>
+              </a:avLst>
+            </a:prstGeom>
+            <a:solidFill>
+              <a:schemeClr val="tx1"/>
+            </a:solidFill>
+            <a:ln w="12700" cap="flat" cmpd="sng">
+              <a:solidFill>
+                <a:schemeClr val="tx1"/>
+              </a:solidFill>
+              <a:prstDash val="solid"/>
+              <a:miter lim="800000"/>
+              <a:headEnd type="none" w="sm" len="sm"/>
+              <a:tailEnd type="none" w="sm" len="sm"/>
+            </a:ln>
+          </p:spPr>
+          <p:txBody>
+            <a:bodyPr spcFirstLastPara="1" wrap="square" lIns="73332" tIns="36652" rIns="73332" bIns="36652" anchor="ctr" anchorCtr="0">
+              <a:noAutofit/>
+            </a:bodyPr>
+            <a:lstStyle/>
+            <a:p>
+              <a:pPr algn="ctr"/>
+              <a:endParaRPr sz="1496">
+                <a:latin typeface="Calibri"/>
+                <a:ea typeface="Calibri"/>
+                <a:cs typeface="Calibri"/>
+                <a:sym typeface="Calibri"/>
+              </a:endParaRPr>
+            </a:p>
+          </p:txBody>
+        </p:sp>
+        <p:sp>
+          <p:nvSpPr>
+            <p:cNvPr id="122" name="Google Shape;655;p64">
+              <a:extLst>
+                <a:ext uri="{FF2B5EF4-FFF2-40B4-BE49-F238E27FC236}">
+                  <a16:creationId xmlns:a16="http://schemas.microsoft.com/office/drawing/2014/main" id="{ECEE8685-CB38-4A40-8315-AA60888B590D}"/>
+                </a:ext>
+              </a:extLst>
+            </p:cNvPr>
+            <p:cNvSpPr/>
+            <p:nvPr/>
+          </p:nvSpPr>
+          <p:spPr>
+            <a:xfrm flipH="1">
+              <a:off x="3214681" y="784623"/>
+              <a:ext cx="112304" cy="249028"/>
+            </a:xfrm>
+            <a:prstGeom prst="downArrow">
+              <a:avLst>
+                <a:gd name="adj1" fmla="val 50000"/>
+                <a:gd name="adj2" fmla="val 50000"/>
+              </a:avLst>
+            </a:prstGeom>
+            <a:solidFill>
+              <a:schemeClr val="tx1"/>
+            </a:solidFill>
+            <a:ln w="12700" cap="flat" cmpd="sng">
+              <a:solidFill>
+                <a:schemeClr val="tx1"/>
+              </a:solidFill>
+              <a:prstDash val="solid"/>
+              <a:miter lim="800000"/>
+              <a:headEnd type="none" w="sm" len="sm"/>
+              <a:tailEnd type="none" w="sm" len="sm"/>
+            </a:ln>
+          </p:spPr>
+          <p:txBody>
+            <a:bodyPr spcFirstLastPara="1" wrap="square" lIns="73332" tIns="36652" rIns="73332" bIns="36652" anchor="ctr" anchorCtr="0">
+              <a:noAutofit/>
+            </a:bodyPr>
+            <a:lstStyle/>
+            <a:p>
+              <a:pPr algn="ctr"/>
+              <a:endParaRPr sz="1496">
+                <a:latin typeface="Calibri"/>
+                <a:ea typeface="Calibri"/>
+                <a:cs typeface="Calibri"/>
+                <a:sym typeface="Calibri"/>
+              </a:endParaRPr>
             </a:p>
           </p:txBody>
         </p:sp>
       </p:grpSp>
-      <p:sp>
-        <p:nvSpPr>
-          <p:cNvPr id="118" name="Google Shape;656;p64">
-            <a:extLst>
-              <a:ext uri="{FF2B5EF4-FFF2-40B4-BE49-F238E27FC236}">
-                <a16:creationId xmlns:a16="http://schemas.microsoft.com/office/drawing/2014/main" id="{65941FD9-28C1-8D4C-9E1D-A34C1F0B2926}"/>
-              </a:ext>
-            </a:extLst>
-          </p:cNvPr>
-          <p:cNvSpPr txBox="1"/>
-          <p:nvPr/>
-        </p:nvSpPr>
-        <p:spPr>
-          <a:xfrm>
-            <a:off x="2663561" y="1560866"/>
-            <a:ext cx="1344528" cy="419624"/>
-          </a:xfrm>
-          <a:prstGeom prst="rect">
-            <a:avLst/>
-          </a:prstGeom>
-          <a:noFill/>
-          <a:ln>
-            <a:noFill/>
-          </a:ln>
-        </p:spPr>
-        <p:txBody>
-          <a:bodyPr spcFirstLastPara="1" wrap="square" lIns="73332" tIns="36652" rIns="73332" bIns="36652" anchor="t" anchorCtr="0">
-            <a:noAutofit/>
-          </a:bodyPr>
-          <a:lstStyle/>
-          <a:p>
-            <a:pPr algn="ctr"/>
-            <a:r>
-              <a:rPr lang="en" sz="1177" dirty="0">
-                <a:latin typeface="Calibri"/>
-                <a:ea typeface="Calibri"/>
-                <a:cs typeface="Calibri"/>
-                <a:sym typeface="Calibri"/>
-              </a:rPr>
-              <a:t>Gavage 10</a:t>
-            </a:r>
-            <a:r>
-              <a:rPr lang="en" sz="1177" baseline="30000" dirty="0">
-                <a:latin typeface="Calibri"/>
-                <a:ea typeface="Calibri"/>
-                <a:cs typeface="Calibri"/>
-                <a:sym typeface="Calibri"/>
-              </a:rPr>
-              <a:t>5</a:t>
-            </a:r>
-            <a:r>
-              <a:rPr lang="en" sz="1177" dirty="0">
-                <a:latin typeface="Calibri"/>
-                <a:ea typeface="Calibri"/>
-                <a:cs typeface="Calibri"/>
-                <a:sym typeface="Calibri"/>
-              </a:rPr>
-              <a:t> spores </a:t>
-            </a:r>
-            <a:r>
-              <a:rPr lang="en" sz="1177" i="1" dirty="0">
-                <a:latin typeface="Calibri"/>
-                <a:ea typeface="Calibri"/>
-                <a:cs typeface="Calibri"/>
-                <a:sym typeface="Calibri"/>
-              </a:rPr>
-              <a:t>C. difficile </a:t>
-            </a:r>
-            <a:r>
-              <a:rPr lang="en" sz="1177" dirty="0">
-                <a:latin typeface="Calibri"/>
-                <a:ea typeface="Calibri"/>
-                <a:cs typeface="Calibri"/>
-                <a:sym typeface="Calibri"/>
-              </a:rPr>
-              <a:t>630</a:t>
-            </a:r>
-            <a:endParaRPr sz="1177" dirty="0"/>
-          </a:p>
-        </p:txBody>
-      </p:sp>
-      <p:sp>
-        <p:nvSpPr>
-          <p:cNvPr id="120" name="Google Shape;675;p64">
-            <a:extLst>
-              <a:ext uri="{FF2B5EF4-FFF2-40B4-BE49-F238E27FC236}">
-                <a16:creationId xmlns:a16="http://schemas.microsoft.com/office/drawing/2014/main" id="{64610CCC-3534-BD4B-80EC-80129F609487}"/>
-              </a:ext>
-            </a:extLst>
-          </p:cNvPr>
-          <p:cNvSpPr/>
-          <p:nvPr/>
-        </p:nvSpPr>
-        <p:spPr>
-          <a:xfrm rot="10800000">
-            <a:off x="2573373" y="1580158"/>
-            <a:ext cx="161208" cy="284128"/>
-          </a:xfrm>
-          <a:prstGeom prst="downArrow">
-            <a:avLst>
-              <a:gd name="adj1" fmla="val 50000"/>
-              <a:gd name="adj2" fmla="val 50000"/>
-            </a:avLst>
-          </a:prstGeom>
-          <a:solidFill>
-            <a:schemeClr val="tx1"/>
-          </a:solidFill>
-          <a:ln w="12700" cap="flat" cmpd="sng">
-            <a:solidFill>
-              <a:schemeClr val="tx1"/>
-            </a:solidFill>
-            <a:prstDash val="solid"/>
-            <a:miter lim="800000"/>
-            <a:headEnd type="none" w="sm" len="sm"/>
-            <a:tailEnd type="none" w="sm" len="sm"/>
-          </a:ln>
-        </p:spPr>
-        <p:txBody>
-          <a:bodyPr spcFirstLastPara="1" wrap="square" lIns="73332" tIns="36652" rIns="73332" bIns="36652" anchor="ctr" anchorCtr="0">
-            <a:noAutofit/>
-          </a:bodyPr>
-          <a:lstStyle/>
-          <a:p>
-            <a:pPr algn="ctr"/>
-            <a:endParaRPr sz="1496">
-              <a:latin typeface="Calibri"/>
-              <a:ea typeface="Calibri"/>
-              <a:cs typeface="Calibri"/>
-              <a:sym typeface="Calibri"/>
-            </a:endParaRPr>
-          </a:p>
-        </p:txBody>
-      </p:sp>
-      <p:sp>
-        <p:nvSpPr>
-          <p:cNvPr id="122" name="Google Shape;655;p64">
-            <a:extLst>
-              <a:ext uri="{FF2B5EF4-FFF2-40B4-BE49-F238E27FC236}">
-                <a16:creationId xmlns:a16="http://schemas.microsoft.com/office/drawing/2014/main" id="{ECEE8685-CB38-4A40-8315-AA60888B590D}"/>
-              </a:ext>
-            </a:extLst>
-          </p:cNvPr>
-          <p:cNvSpPr/>
-          <p:nvPr/>
-        </p:nvSpPr>
-        <p:spPr>
-          <a:xfrm flipH="1">
-            <a:off x="5200516" y="586438"/>
-            <a:ext cx="208097" cy="329838"/>
-          </a:xfrm>
-          <a:prstGeom prst="downArrow">
-            <a:avLst>
-              <a:gd name="adj1" fmla="val 50000"/>
-              <a:gd name="adj2" fmla="val 50000"/>
-            </a:avLst>
-          </a:prstGeom>
-          <a:solidFill>
-            <a:schemeClr val="tx1"/>
-          </a:solidFill>
-          <a:ln w="12700" cap="flat" cmpd="sng">
-            <a:solidFill>
-              <a:schemeClr val="tx1"/>
-            </a:solidFill>
-            <a:prstDash val="solid"/>
-            <a:miter lim="800000"/>
-            <a:headEnd type="none" w="sm" len="sm"/>
-            <a:tailEnd type="none" w="sm" len="sm"/>
-          </a:ln>
-        </p:spPr>
-        <p:txBody>
-          <a:bodyPr spcFirstLastPara="1" wrap="square" lIns="73332" tIns="36652" rIns="73332" bIns="36652" anchor="ctr" anchorCtr="0">
-            <a:noAutofit/>
-          </a:bodyPr>
-          <a:lstStyle/>
-          <a:p>
-            <a:pPr algn="ctr"/>
-            <a:endParaRPr sz="1496">
-              <a:latin typeface="Calibri"/>
-              <a:ea typeface="Calibri"/>
-              <a:cs typeface="Calibri"/>
-              <a:sym typeface="Calibri"/>
-            </a:endParaRPr>
-          </a:p>
-        </p:txBody>
-      </p:sp>
     </p:spTree>
     <p:extLst>
       <p:ext uri="{BB962C8B-B14F-4D97-AF65-F5344CB8AC3E}">
@@ -4776,320 +4797,6 @@
   <p:clrMapOvr>
     <a:masterClrMapping/>
   </p:clrMapOvr>
-  <p:timing>
-    <p:tnLst>
-      <p:par>
-        <p:cTn id="1" dur="indefinite" restart="never" nodeType="tmRoot">
-          <p:childTnLst>
-            <p:seq concurrent="1" nextAc="seek">
-              <p:cTn id="2" dur="indefinite" nodeType="mainSeq">
-                <p:childTnLst>
-                  <p:par>
-                    <p:cTn id="3" fill="hold">
-                      <p:stCondLst>
-                        <p:cond delay="indefinite"/>
-                      </p:stCondLst>
-                      <p:childTnLst>
-                        <p:par>
-                          <p:cTn id="4" fill="hold">
-                            <p:stCondLst>
-                              <p:cond delay="0"/>
-                            </p:stCondLst>
-                            <p:childTnLst>
-                              <p:par>
-                                <p:cTn id="5" presetID="9" presetClass="entr" presetSubtype="0" fill="hold" nodeType="clickEffect">
-                                  <p:stCondLst>
-                                    <p:cond delay="0"/>
-                                  </p:stCondLst>
-                                  <p:childTnLst>
-                                    <p:set>
-                                      <p:cBhvr>
-                                        <p:cTn id="6" dur="1" fill="hold">
-                                          <p:stCondLst>
-                                            <p:cond delay="0"/>
-                                          </p:stCondLst>
-                                        </p:cTn>
-                                        <p:tgtEl>
-                                          <p:spTgt spid="113"/>
-                                        </p:tgtEl>
-                                        <p:attrNameLst>
-                                          <p:attrName>style.visibility</p:attrName>
-                                        </p:attrNameLst>
-                                      </p:cBhvr>
-                                      <p:to>
-                                        <p:strVal val="visible"/>
-                                      </p:to>
-                                    </p:set>
-                                    <p:animEffect transition="in" filter="dissolve">
-                                      <p:cBhvr>
-                                        <p:cTn id="7" dur="500"/>
-                                        <p:tgtEl>
-                                          <p:spTgt spid="113"/>
-                                        </p:tgtEl>
-                                      </p:cBhvr>
-                                    </p:animEffect>
-                                  </p:childTnLst>
-                                </p:cTn>
-                              </p:par>
-                              <p:par>
-                                <p:cTn id="8" presetID="9" presetClass="entr" presetSubtype="0" fill="hold" nodeType="withEffect">
-                                  <p:stCondLst>
-                                    <p:cond delay="0"/>
-                                  </p:stCondLst>
-                                  <p:childTnLst>
-                                    <p:set>
-                                      <p:cBhvr>
-                                        <p:cTn id="9" dur="1" fill="hold">
-                                          <p:stCondLst>
-                                            <p:cond delay="0"/>
-                                          </p:stCondLst>
-                                        </p:cTn>
-                                        <p:tgtEl>
-                                          <p:spTgt spid="110">
-                                            <p:txEl>
-                                              <p:pRg st="2" end="2"/>
-                                            </p:txEl>
-                                          </p:spTgt>
-                                        </p:tgtEl>
-                                        <p:attrNameLst>
-                                          <p:attrName>style.visibility</p:attrName>
-                                        </p:attrNameLst>
-                                      </p:cBhvr>
-                                      <p:to>
-                                        <p:strVal val="visible"/>
-                                      </p:to>
-                                    </p:set>
-                                    <p:animEffect transition="in" filter="dissolve">
-                                      <p:cBhvr>
-                                        <p:cTn id="10" dur="500"/>
-                                        <p:tgtEl>
-                                          <p:spTgt spid="110">
-                                            <p:txEl>
-                                              <p:pRg st="2" end="2"/>
-                                            </p:txEl>
-                                          </p:spTgt>
-                                        </p:tgtEl>
-                                      </p:cBhvr>
-                                    </p:animEffect>
-                                  </p:childTnLst>
-                                </p:cTn>
-                              </p:par>
-                            </p:childTnLst>
-                          </p:cTn>
-                        </p:par>
-                      </p:childTnLst>
-                    </p:cTn>
-                  </p:par>
-                  <p:par>
-                    <p:cTn id="11" fill="hold">
-                      <p:stCondLst>
-                        <p:cond delay="indefinite"/>
-                      </p:stCondLst>
-                      <p:childTnLst>
-                        <p:par>
-                          <p:cTn id="12" fill="hold">
-                            <p:stCondLst>
-                              <p:cond delay="0"/>
-                            </p:stCondLst>
-                            <p:childTnLst>
-                              <p:par>
-                                <p:cTn id="13" presetID="9" presetClass="entr" presetSubtype="0" fill="hold" nodeType="clickEffect">
-                                  <p:stCondLst>
-                                    <p:cond delay="0"/>
-                                  </p:stCondLst>
-                                  <p:childTnLst>
-                                    <p:set>
-                                      <p:cBhvr>
-                                        <p:cTn id="14" dur="1" fill="hold">
-                                          <p:stCondLst>
-                                            <p:cond delay="0"/>
-                                          </p:stCondLst>
-                                        </p:cTn>
-                                        <p:tgtEl>
-                                          <p:spTgt spid="55"/>
-                                        </p:tgtEl>
-                                        <p:attrNameLst>
-                                          <p:attrName>style.visibility</p:attrName>
-                                        </p:attrNameLst>
-                                      </p:cBhvr>
-                                      <p:to>
-                                        <p:strVal val="visible"/>
-                                      </p:to>
-                                    </p:set>
-                                    <p:animEffect transition="in" filter="dissolve">
-                                      <p:cBhvr>
-                                        <p:cTn id="15" dur="500"/>
-                                        <p:tgtEl>
-                                          <p:spTgt spid="55"/>
-                                        </p:tgtEl>
-                                      </p:cBhvr>
-                                    </p:animEffect>
-                                  </p:childTnLst>
-                                </p:cTn>
-                              </p:par>
-                              <p:par>
-                                <p:cTn id="16" presetID="9" presetClass="entr" presetSubtype="0" fill="hold" nodeType="withEffect">
-                                  <p:stCondLst>
-                                    <p:cond delay="0"/>
-                                  </p:stCondLst>
-                                  <p:childTnLst>
-                                    <p:set>
-                                      <p:cBhvr>
-                                        <p:cTn id="17" dur="1" fill="hold">
-                                          <p:stCondLst>
-                                            <p:cond delay="0"/>
-                                          </p:stCondLst>
-                                        </p:cTn>
-                                        <p:tgtEl>
-                                          <p:spTgt spid="110">
-                                            <p:txEl>
-                                              <p:pRg st="3" end="3"/>
-                                            </p:txEl>
-                                          </p:spTgt>
-                                        </p:tgtEl>
-                                        <p:attrNameLst>
-                                          <p:attrName>style.visibility</p:attrName>
-                                        </p:attrNameLst>
-                                      </p:cBhvr>
-                                      <p:to>
-                                        <p:strVal val="visible"/>
-                                      </p:to>
-                                    </p:set>
-                                    <p:animEffect transition="in" filter="dissolve">
-                                      <p:cBhvr>
-                                        <p:cTn id="18" dur="500"/>
-                                        <p:tgtEl>
-                                          <p:spTgt spid="110">
-                                            <p:txEl>
-                                              <p:pRg st="3" end="3"/>
-                                            </p:txEl>
-                                          </p:spTgt>
-                                        </p:tgtEl>
-                                      </p:cBhvr>
-                                    </p:animEffect>
-                                  </p:childTnLst>
-                                </p:cTn>
-                              </p:par>
-                            </p:childTnLst>
-                          </p:cTn>
-                        </p:par>
-                      </p:childTnLst>
-                    </p:cTn>
-                  </p:par>
-                  <p:par>
-                    <p:cTn id="19" fill="hold">
-                      <p:stCondLst>
-                        <p:cond delay="indefinite"/>
-                      </p:stCondLst>
-                      <p:childTnLst>
-                        <p:par>
-                          <p:cTn id="20" fill="hold">
-                            <p:stCondLst>
-                              <p:cond delay="0"/>
-                            </p:stCondLst>
-                            <p:childTnLst>
-                              <p:par>
-                                <p:cTn id="21" presetID="9" presetClass="entr" presetSubtype="0" fill="hold" grpId="0" nodeType="clickEffect">
-                                  <p:stCondLst>
-                                    <p:cond delay="0"/>
-                                  </p:stCondLst>
-                                  <p:childTnLst>
-                                    <p:set>
-                                      <p:cBhvr>
-                                        <p:cTn id="22" dur="1" fill="hold">
-                                          <p:stCondLst>
-                                            <p:cond delay="0"/>
-                                          </p:stCondLst>
-                                        </p:cTn>
-                                        <p:tgtEl>
-                                          <p:spTgt spid="122"/>
-                                        </p:tgtEl>
-                                        <p:attrNameLst>
-                                          <p:attrName>style.visibility</p:attrName>
-                                        </p:attrNameLst>
-                                      </p:cBhvr>
-                                      <p:to>
-                                        <p:strVal val="visible"/>
-                                      </p:to>
-                                    </p:set>
-                                    <p:animEffect transition="in" filter="dissolve">
-                                      <p:cBhvr>
-                                        <p:cTn id="23" dur="500"/>
-                                        <p:tgtEl>
-                                          <p:spTgt spid="122"/>
-                                        </p:tgtEl>
-                                      </p:cBhvr>
-                                    </p:animEffect>
-                                  </p:childTnLst>
-                                </p:cTn>
-                              </p:par>
-                              <p:par>
-                                <p:cTn id="24" presetID="9" presetClass="entr" presetSubtype="0" fill="hold" grpId="0" nodeType="withEffect">
-                                  <p:stCondLst>
-                                    <p:cond delay="0"/>
-                                  </p:stCondLst>
-                                  <p:childTnLst>
-                                    <p:set>
-                                      <p:cBhvr>
-                                        <p:cTn id="25" dur="1" fill="hold">
-                                          <p:stCondLst>
-                                            <p:cond delay="0"/>
-                                          </p:stCondLst>
-                                        </p:cTn>
-                                        <p:tgtEl>
-                                          <p:spTgt spid="659"/>
-                                        </p:tgtEl>
-                                        <p:attrNameLst>
-                                          <p:attrName>style.visibility</p:attrName>
-                                        </p:attrNameLst>
-                                      </p:cBhvr>
-                                      <p:to>
-                                        <p:strVal val="visible"/>
-                                      </p:to>
-                                    </p:set>
-                                    <p:animEffect transition="in" filter="dissolve">
-                                      <p:cBhvr>
-                                        <p:cTn id="26" dur="500"/>
-                                        <p:tgtEl>
-                                          <p:spTgt spid="659"/>
-                                        </p:tgtEl>
-                                      </p:cBhvr>
-                                    </p:animEffect>
-                                  </p:childTnLst>
-                                </p:cTn>
-                              </p:par>
-                            </p:childTnLst>
-                          </p:cTn>
-                        </p:par>
-                      </p:childTnLst>
-                    </p:cTn>
-                  </p:par>
-                </p:childTnLst>
-              </p:cTn>
-              <p:prevCondLst>
-                <p:cond evt="onPrev" delay="0">
-                  <p:tgtEl>
-                    <p:sldTgt/>
-                  </p:tgtEl>
-                </p:cond>
-              </p:prevCondLst>
-              <p:nextCondLst>
-                <p:cond evt="onNext" delay="0">
-                  <p:tgtEl>
-                    <p:sldTgt/>
-                  </p:tgtEl>
-                </p:cond>
-              </p:nextCondLst>
-            </p:seq>
-          </p:childTnLst>
-        </p:cTn>
-      </p:par>
-    </p:tnLst>
-    <p:bldLst>
-      <p:bldP spid="659" grpId="0"/>
-      <p:bldP spid="122" grpId="0" animBg="1"/>
-    </p:bldLst>
-  </p:timing>
 </p:sld>
 </file>
 

</xml_diff>

<commit_message>
Remove 3350 from fig 4 schematic
</commit_message>
<xml_diff>
--- a/results/figures/1_Day_PEG_Schematic.pptx
+++ b/results/figures/1_Day_PEG_Schematic.pptx
@@ -197,7 +197,7 @@
           <a:p>
             <a:fld id="{77734EDB-3B6B-CA48-BB41-C96E8374FD30}" type="datetimeFigureOut">
               <a:rPr lang="en-US" smtClean="0"/>
-              <a:t>3/4/21</a:t>
+              <a:t>4/7/21</a:t>
             </a:fld>
             <a:endParaRPr lang="en-US"/>
           </a:p>
@@ -806,7 +806,7 @@
           <a:p>
             <a:fld id="{30AF97BF-8750-4713-9C5B-3A2A8059BBA3}" type="datetimeFigureOut">
               <a:rPr lang="en-US" smtClean="0"/>
-              <a:t>3/4/21</a:t>
+              <a:t>4/7/21</a:t>
             </a:fld>
             <a:endParaRPr lang="en-US"/>
           </a:p>
@@ -976,7 +976,7 @@
           <a:p>
             <a:fld id="{30AF97BF-8750-4713-9C5B-3A2A8059BBA3}" type="datetimeFigureOut">
               <a:rPr lang="en-US" smtClean="0"/>
-              <a:t>3/4/21</a:t>
+              <a:t>4/7/21</a:t>
             </a:fld>
             <a:endParaRPr lang="en-US"/>
           </a:p>
@@ -1156,7 +1156,7 @@
           <a:p>
             <a:fld id="{30AF97BF-8750-4713-9C5B-3A2A8059BBA3}" type="datetimeFigureOut">
               <a:rPr lang="en-US" smtClean="0"/>
-              <a:t>3/4/21</a:t>
+              <a:t>4/7/21</a:t>
             </a:fld>
             <a:endParaRPr lang="en-US"/>
           </a:p>
@@ -1326,7 +1326,7 @@
           <a:p>
             <a:fld id="{30AF97BF-8750-4713-9C5B-3A2A8059BBA3}" type="datetimeFigureOut">
               <a:rPr lang="en-US" smtClean="0"/>
-              <a:t>3/4/21</a:t>
+              <a:t>4/7/21</a:t>
             </a:fld>
             <a:endParaRPr lang="en-US"/>
           </a:p>
@@ -1572,7 +1572,7 @@
           <a:p>
             <a:fld id="{30AF97BF-8750-4713-9C5B-3A2A8059BBA3}" type="datetimeFigureOut">
               <a:rPr lang="en-US" smtClean="0"/>
-              <a:t>3/4/21</a:t>
+              <a:t>4/7/21</a:t>
             </a:fld>
             <a:endParaRPr lang="en-US"/>
           </a:p>
@@ -1804,7 +1804,7 @@
           <a:p>
             <a:fld id="{30AF97BF-8750-4713-9C5B-3A2A8059BBA3}" type="datetimeFigureOut">
               <a:rPr lang="en-US" smtClean="0"/>
-              <a:t>3/4/21</a:t>
+              <a:t>4/7/21</a:t>
             </a:fld>
             <a:endParaRPr lang="en-US"/>
           </a:p>
@@ -2171,7 +2171,7 @@
           <a:p>
             <a:fld id="{30AF97BF-8750-4713-9C5B-3A2A8059BBA3}" type="datetimeFigureOut">
               <a:rPr lang="en-US" smtClean="0"/>
-              <a:t>3/4/21</a:t>
+              <a:t>4/7/21</a:t>
             </a:fld>
             <a:endParaRPr lang="en-US"/>
           </a:p>
@@ -2289,7 +2289,7 @@
           <a:p>
             <a:fld id="{30AF97BF-8750-4713-9C5B-3A2A8059BBA3}" type="datetimeFigureOut">
               <a:rPr lang="en-US" smtClean="0"/>
-              <a:t>3/4/21</a:t>
+              <a:t>4/7/21</a:t>
             </a:fld>
             <a:endParaRPr lang="en-US"/>
           </a:p>
@@ -2384,7 +2384,7 @@
           <a:p>
             <a:fld id="{30AF97BF-8750-4713-9C5B-3A2A8059BBA3}" type="datetimeFigureOut">
               <a:rPr lang="en-US" smtClean="0"/>
-              <a:t>3/4/21</a:t>
+              <a:t>4/7/21</a:t>
             </a:fld>
             <a:endParaRPr lang="en-US"/>
           </a:p>
@@ -2661,7 +2661,7 @@
           <a:p>
             <a:fld id="{30AF97BF-8750-4713-9C5B-3A2A8059BBA3}" type="datetimeFigureOut">
               <a:rPr lang="en-US" smtClean="0"/>
-              <a:t>3/4/21</a:t>
+              <a:t>4/7/21</a:t>
             </a:fld>
             <a:endParaRPr lang="en-US"/>
           </a:p>
@@ -2918,7 +2918,7 @@
           <a:p>
             <a:fld id="{30AF97BF-8750-4713-9C5B-3A2A8059BBA3}" type="datetimeFigureOut">
               <a:rPr lang="en-US" smtClean="0"/>
-              <a:t>3/4/21</a:t>
+              <a:t>4/7/21</a:t>
             </a:fld>
             <a:endParaRPr lang="en-US"/>
           </a:p>
@@ -3131,7 +3131,7 @@
           <a:p>
             <a:fld id="{30AF97BF-8750-4713-9C5B-3A2A8059BBA3}" type="datetimeFigureOut">
               <a:rPr lang="en-US" smtClean="0"/>
-              <a:t>3/4/21</a:t>
+              <a:t>4/7/21</a:t>
             </a:fld>
             <a:endParaRPr lang="en-US"/>
           </a:p>
@@ -4385,7 +4385,7 @@
                   <a:cs typeface="Calibri"/>
                   <a:sym typeface="Calibri"/>
                 </a:rPr>
-                <a:t>1-day of 15% PEG 3350 in drinking water (N = 6) </a:t>
+                <a:t>1-day of 15% PEG in drinking water (N = 6) </a:t>
               </a:r>
               <a:r>
                 <a:rPr lang="en-US" sz="1604" dirty="0">
@@ -4409,7 +4409,7 @@
                   <a:cs typeface="Calibri"/>
                   <a:sym typeface="Calibri"/>
                 </a:rPr>
-                <a:t>1-day PEG 3350 + 1-day recovery (N = 6)</a:t>
+                <a:t>1-day PEG + 1-day recovery (N = 6)</a:t>
               </a:r>
               <a:br>
                 <a:rPr lang="en-US" sz="1604" dirty="0">

</xml_diff>

<commit_message>
Fig 4 schematic edits
</commit_message>
<xml_diff>
--- a/results/figures/1_Day_PEG_Schematic.pptx
+++ b/results/figures/1_Day_PEG_Schematic.pptx
@@ -197,7 +197,7 @@
           <a:p>
             <a:fld id="{77734EDB-3B6B-CA48-BB41-C96E8374FD30}" type="datetimeFigureOut">
               <a:rPr lang="en-US" smtClean="0"/>
-              <a:t>4/7/21</a:t>
+              <a:t>4/19/21</a:t>
             </a:fld>
             <a:endParaRPr lang="en-US"/>
           </a:p>
@@ -806,7 +806,7 @@
           <a:p>
             <a:fld id="{30AF97BF-8750-4713-9C5B-3A2A8059BBA3}" type="datetimeFigureOut">
               <a:rPr lang="en-US" smtClean="0"/>
-              <a:t>4/7/21</a:t>
+              <a:t>4/19/21</a:t>
             </a:fld>
             <a:endParaRPr lang="en-US"/>
           </a:p>
@@ -976,7 +976,7 @@
           <a:p>
             <a:fld id="{30AF97BF-8750-4713-9C5B-3A2A8059BBA3}" type="datetimeFigureOut">
               <a:rPr lang="en-US" smtClean="0"/>
-              <a:t>4/7/21</a:t>
+              <a:t>4/19/21</a:t>
             </a:fld>
             <a:endParaRPr lang="en-US"/>
           </a:p>
@@ -1156,7 +1156,7 @@
           <a:p>
             <a:fld id="{30AF97BF-8750-4713-9C5B-3A2A8059BBA3}" type="datetimeFigureOut">
               <a:rPr lang="en-US" smtClean="0"/>
-              <a:t>4/7/21</a:t>
+              <a:t>4/19/21</a:t>
             </a:fld>
             <a:endParaRPr lang="en-US"/>
           </a:p>
@@ -1326,7 +1326,7 @@
           <a:p>
             <a:fld id="{30AF97BF-8750-4713-9C5B-3A2A8059BBA3}" type="datetimeFigureOut">
               <a:rPr lang="en-US" smtClean="0"/>
-              <a:t>4/7/21</a:t>
+              <a:t>4/19/21</a:t>
             </a:fld>
             <a:endParaRPr lang="en-US"/>
           </a:p>
@@ -1572,7 +1572,7 @@
           <a:p>
             <a:fld id="{30AF97BF-8750-4713-9C5B-3A2A8059BBA3}" type="datetimeFigureOut">
               <a:rPr lang="en-US" smtClean="0"/>
-              <a:t>4/7/21</a:t>
+              <a:t>4/19/21</a:t>
             </a:fld>
             <a:endParaRPr lang="en-US"/>
           </a:p>
@@ -1804,7 +1804,7 @@
           <a:p>
             <a:fld id="{30AF97BF-8750-4713-9C5B-3A2A8059BBA3}" type="datetimeFigureOut">
               <a:rPr lang="en-US" smtClean="0"/>
-              <a:t>4/7/21</a:t>
+              <a:t>4/19/21</a:t>
             </a:fld>
             <a:endParaRPr lang="en-US"/>
           </a:p>
@@ -2171,7 +2171,7 @@
           <a:p>
             <a:fld id="{30AF97BF-8750-4713-9C5B-3A2A8059BBA3}" type="datetimeFigureOut">
               <a:rPr lang="en-US" smtClean="0"/>
-              <a:t>4/7/21</a:t>
+              <a:t>4/19/21</a:t>
             </a:fld>
             <a:endParaRPr lang="en-US"/>
           </a:p>
@@ -2289,7 +2289,7 @@
           <a:p>
             <a:fld id="{30AF97BF-8750-4713-9C5B-3A2A8059BBA3}" type="datetimeFigureOut">
               <a:rPr lang="en-US" smtClean="0"/>
-              <a:t>4/7/21</a:t>
+              <a:t>4/19/21</a:t>
             </a:fld>
             <a:endParaRPr lang="en-US"/>
           </a:p>
@@ -2384,7 +2384,7 @@
           <a:p>
             <a:fld id="{30AF97BF-8750-4713-9C5B-3A2A8059BBA3}" type="datetimeFigureOut">
               <a:rPr lang="en-US" smtClean="0"/>
-              <a:t>4/7/21</a:t>
+              <a:t>4/19/21</a:t>
             </a:fld>
             <a:endParaRPr lang="en-US"/>
           </a:p>
@@ -2661,7 +2661,7 @@
           <a:p>
             <a:fld id="{30AF97BF-8750-4713-9C5B-3A2A8059BBA3}" type="datetimeFigureOut">
               <a:rPr lang="en-US" smtClean="0"/>
-              <a:t>4/7/21</a:t>
+              <a:t>4/19/21</a:t>
             </a:fld>
             <a:endParaRPr lang="en-US"/>
           </a:p>
@@ -2918,7 +2918,7 @@
           <a:p>
             <a:fld id="{30AF97BF-8750-4713-9C5B-3A2A8059BBA3}" type="datetimeFigureOut">
               <a:rPr lang="en-US" smtClean="0"/>
-              <a:t>4/7/21</a:t>
+              <a:t>4/19/21</a:t>
             </a:fld>
             <a:endParaRPr lang="en-US"/>
           </a:p>
@@ -3131,7 +3131,7 @@
           <a:p>
             <a:fld id="{30AF97BF-8750-4713-9C5B-3A2A8059BBA3}" type="datetimeFigureOut">
               <a:rPr lang="en-US" smtClean="0"/>
-              <a:t>4/7/21</a:t>
+              <a:t>4/19/21</a:t>
             </a:fld>
             <a:endParaRPr lang="en-US"/>
           </a:p>
@@ -4372,7 +4372,7 @@
                   <a:cs typeface="Calibri"/>
                   <a:sym typeface="Calibri"/>
                 </a:rPr>
-                <a:t>Clindamycin: 10mg/kg (N = 6)</a:t>
+                <a:t>Clindamycin  (N = 6)</a:t>
               </a:r>
             </a:p>
             <a:p>
@@ -4385,7 +4385,7 @@
                   <a:cs typeface="Calibri"/>
                   <a:sym typeface="Calibri"/>
                 </a:rPr>
-                <a:t>1-day of 15% PEG in drinking water (N = 6) </a:t>
+                <a:t>1-day PEG (N = 6) </a:t>
               </a:r>
               <a:r>
                 <a:rPr lang="en-US" sz="1604" dirty="0">

</xml_diff>

<commit_message>
Add numbers to treatment groups
</commit_message>
<xml_diff>
--- a/results/figures/1_Day_PEG_Schematic.pptx
+++ b/results/figures/1_Day_PEG_Schematic.pptx
@@ -197,7 +197,7 @@
           <a:p>
             <a:fld id="{77734EDB-3B6B-CA48-BB41-C96E8374FD30}" type="datetimeFigureOut">
               <a:rPr lang="en-US" smtClean="0"/>
-              <a:t>4/19/21</a:t>
+              <a:t>6/25/21</a:t>
             </a:fld>
             <a:endParaRPr lang="en-US"/>
           </a:p>
@@ -806,7 +806,7 @@
           <a:p>
             <a:fld id="{30AF97BF-8750-4713-9C5B-3A2A8059BBA3}" type="datetimeFigureOut">
               <a:rPr lang="en-US" smtClean="0"/>
-              <a:t>4/19/21</a:t>
+              <a:t>6/25/21</a:t>
             </a:fld>
             <a:endParaRPr lang="en-US"/>
           </a:p>
@@ -976,7 +976,7 @@
           <a:p>
             <a:fld id="{30AF97BF-8750-4713-9C5B-3A2A8059BBA3}" type="datetimeFigureOut">
               <a:rPr lang="en-US" smtClean="0"/>
-              <a:t>4/19/21</a:t>
+              <a:t>6/25/21</a:t>
             </a:fld>
             <a:endParaRPr lang="en-US"/>
           </a:p>
@@ -1156,7 +1156,7 @@
           <a:p>
             <a:fld id="{30AF97BF-8750-4713-9C5B-3A2A8059BBA3}" type="datetimeFigureOut">
               <a:rPr lang="en-US" smtClean="0"/>
-              <a:t>4/19/21</a:t>
+              <a:t>6/25/21</a:t>
             </a:fld>
             <a:endParaRPr lang="en-US"/>
           </a:p>
@@ -1326,7 +1326,7 @@
           <a:p>
             <a:fld id="{30AF97BF-8750-4713-9C5B-3A2A8059BBA3}" type="datetimeFigureOut">
               <a:rPr lang="en-US" smtClean="0"/>
-              <a:t>4/19/21</a:t>
+              <a:t>6/25/21</a:t>
             </a:fld>
             <a:endParaRPr lang="en-US"/>
           </a:p>
@@ -1572,7 +1572,7 @@
           <a:p>
             <a:fld id="{30AF97BF-8750-4713-9C5B-3A2A8059BBA3}" type="datetimeFigureOut">
               <a:rPr lang="en-US" smtClean="0"/>
-              <a:t>4/19/21</a:t>
+              <a:t>6/25/21</a:t>
             </a:fld>
             <a:endParaRPr lang="en-US"/>
           </a:p>
@@ -1804,7 +1804,7 @@
           <a:p>
             <a:fld id="{30AF97BF-8750-4713-9C5B-3A2A8059BBA3}" type="datetimeFigureOut">
               <a:rPr lang="en-US" smtClean="0"/>
-              <a:t>4/19/21</a:t>
+              <a:t>6/25/21</a:t>
             </a:fld>
             <a:endParaRPr lang="en-US"/>
           </a:p>
@@ -2171,7 +2171,7 @@
           <a:p>
             <a:fld id="{30AF97BF-8750-4713-9C5B-3A2A8059BBA3}" type="datetimeFigureOut">
               <a:rPr lang="en-US" smtClean="0"/>
-              <a:t>4/19/21</a:t>
+              <a:t>6/25/21</a:t>
             </a:fld>
             <a:endParaRPr lang="en-US"/>
           </a:p>
@@ -2289,7 +2289,7 @@
           <a:p>
             <a:fld id="{30AF97BF-8750-4713-9C5B-3A2A8059BBA3}" type="datetimeFigureOut">
               <a:rPr lang="en-US" smtClean="0"/>
-              <a:t>4/19/21</a:t>
+              <a:t>6/25/21</a:t>
             </a:fld>
             <a:endParaRPr lang="en-US"/>
           </a:p>
@@ -2384,7 +2384,7 @@
           <a:p>
             <a:fld id="{30AF97BF-8750-4713-9C5B-3A2A8059BBA3}" type="datetimeFigureOut">
               <a:rPr lang="en-US" smtClean="0"/>
-              <a:t>4/19/21</a:t>
+              <a:t>6/25/21</a:t>
             </a:fld>
             <a:endParaRPr lang="en-US"/>
           </a:p>
@@ -2661,7 +2661,7 @@
           <a:p>
             <a:fld id="{30AF97BF-8750-4713-9C5B-3A2A8059BBA3}" type="datetimeFigureOut">
               <a:rPr lang="en-US" smtClean="0"/>
-              <a:t>4/19/21</a:t>
+              <a:t>6/25/21</a:t>
             </a:fld>
             <a:endParaRPr lang="en-US"/>
           </a:p>
@@ -2918,7 +2918,7 @@
           <a:p>
             <a:fld id="{30AF97BF-8750-4713-9C5B-3A2A8059BBA3}" type="datetimeFigureOut">
               <a:rPr lang="en-US" smtClean="0"/>
-              <a:t>4/19/21</a:t>
+              <a:t>6/25/21</a:t>
             </a:fld>
             <a:endParaRPr lang="en-US"/>
           </a:p>
@@ -3131,7 +3131,7 @@
           <a:p>
             <a:fld id="{30AF97BF-8750-4713-9C5B-3A2A8059BBA3}" type="datetimeFigureOut">
               <a:rPr lang="en-US" smtClean="0"/>
-              <a:t>4/19/21</a:t>
+              <a:t>6/25/21</a:t>
             </a:fld>
             <a:endParaRPr lang="en-US"/>
           </a:p>
@@ -4372,7 +4372,7 @@
                   <a:cs typeface="Calibri"/>
                   <a:sym typeface="Calibri"/>
                 </a:rPr>
-                <a:t>Clindamycin  (N = 6)</a:t>
+                <a:t>1. Clindamycin  (N = 6)</a:t>
               </a:r>
             </a:p>
             <a:p>
@@ -4385,7 +4385,7 @@
                   <a:cs typeface="Calibri"/>
                   <a:sym typeface="Calibri"/>
                 </a:rPr>
-                <a:t>1-day PEG (N = 6) </a:t>
+                <a:t>2. 1-day PEG (N = 6) </a:t>
               </a:r>
               <a:r>
                 <a:rPr lang="en-US" sz="1604" dirty="0">
@@ -4401,6 +4401,17 @@
             </a:p>
             <a:p>
               <a:r>
+                <a:rPr lang="en-US" sz="1604">
+                  <a:solidFill>
+                    <a:srgbClr val="225EA8"/>
+                  </a:solidFill>
+                  <a:ea typeface="Calibri"/>
+                  <a:cs typeface="Calibri"/>
+                  <a:sym typeface="Calibri"/>
+                </a:rPr>
+                <a:t>3. 1-day </a:t>
+              </a:r>
+              <a:r>
                 <a:rPr lang="en-US" sz="1604" dirty="0">
                   <a:solidFill>
                     <a:srgbClr val="225EA8"/>
@@ -4409,7 +4420,7 @@
                   <a:cs typeface="Calibri"/>
                   <a:sym typeface="Calibri"/>
                 </a:rPr>
-                <a:t>1-day PEG + 1-day recovery (N = 6)</a:t>
+                <a:t>PEG + 1-day recovery (N = 6)</a:t>
               </a:r>
               <a:br>
                 <a:rPr lang="en-US" sz="1604" dirty="0">

</xml_diff>